<commit_message>
Grundlagen weiter, race_right aufgeräumt
</commit_message>
<xml_diff>
--- a/Dokumente/Präsentationen/Abschlusspräsentation.pptx
+++ b/Dokumente/Präsentationen/Abschlusspräsentation.pptx
@@ -192,7 +192,7 @@
   </p:defaultTextStyle>
   <p:extLst>
     <p:ext uri="{EFAFB233-063F-42B5-8137-9DF3F51BA10A}">
-      <p15:sldGuideLst xmlns="" xmlns:p15="http://schemas.microsoft.com/office/powerpoint/2012/main">
+      <p15:sldGuideLst xmlns:p15="http://schemas.microsoft.com/office/powerpoint/2012/main" xmlns="">
         <p15:guide id="1" orient="horz" pos="4319">
           <p15:clr>
             <a:srgbClr val="A4A3A4"/>
@@ -206,7 +206,7 @@
       </p15:sldGuideLst>
     </p:ext>
     <p:ext uri="{2D200454-40CA-4A62-9FC3-DE9A4176ACB9}">
-      <p15:notesGuideLst xmlns="" xmlns:p15="http://schemas.microsoft.com/office/powerpoint/2012/main">
+      <p15:notesGuideLst xmlns:p15="http://schemas.microsoft.com/office/powerpoint/2012/main" xmlns="">
         <p15:guide id="1" orient="horz" pos="2874">
           <p15:clr>
             <a:srgbClr val="A4A3A4"/>
@@ -458,7 +458,7 @@
     </p:spTree>
     <p:extLst>
       <p:ext uri="{BB962C8B-B14F-4D97-AF65-F5344CB8AC3E}">
-        <p14:creationId xmlns="" xmlns:p14="http://schemas.microsoft.com/office/powerpoint/2010/main" val="3306506664"/>
+        <p14:creationId xmlns:p14="http://schemas.microsoft.com/office/powerpoint/2010/main" val="3306506664"/>
       </p:ext>
     </p:extLst>
   </p:cSld>
@@ -1034,7 +1034,7 @@
     </p:spTree>
     <p:extLst>
       <p:ext uri="{BB962C8B-B14F-4D97-AF65-F5344CB8AC3E}">
-        <p14:creationId xmlns="" xmlns:p14="http://schemas.microsoft.com/office/powerpoint/2010/main" val="3290858648"/>
+        <p14:creationId xmlns:p14="http://schemas.microsoft.com/office/powerpoint/2010/main" val="3290858648"/>
       </p:ext>
     </p:extLst>
   </p:cSld>
@@ -2005,7 +2005,7 @@
     </p:spTree>
     <p:extLst>
       <p:ext uri="{BB962C8B-B14F-4D97-AF65-F5344CB8AC3E}">
-        <p14:creationId xmlns="" xmlns:p14="http://schemas.microsoft.com/office/powerpoint/2010/main" val="3579872104"/>
+        <p14:creationId xmlns:p14="http://schemas.microsoft.com/office/powerpoint/2010/main" val="3579872104"/>
       </p:ext>
     </p:extLst>
   </p:cSld>
@@ -2141,7 +2141,7 @@
     </p:spTree>
     <p:extLst>
       <p:ext uri="{BB962C8B-B14F-4D97-AF65-F5344CB8AC3E}">
-        <p14:creationId xmlns="" xmlns:p14="http://schemas.microsoft.com/office/powerpoint/2010/main" val="4086205857"/>
+        <p14:creationId xmlns:p14="http://schemas.microsoft.com/office/powerpoint/2010/main" val="4086205857"/>
       </p:ext>
     </p:extLst>
   </p:cSld>
@@ -2277,7 +2277,7 @@
     </p:spTree>
     <p:extLst>
       <p:ext uri="{BB962C8B-B14F-4D97-AF65-F5344CB8AC3E}">
-        <p14:creationId xmlns="" xmlns:p14="http://schemas.microsoft.com/office/powerpoint/2010/main" val="3979630434"/>
+        <p14:creationId xmlns:p14="http://schemas.microsoft.com/office/powerpoint/2010/main" val="3979630434"/>
       </p:ext>
     </p:extLst>
   </p:cSld>
@@ -2413,7 +2413,7 @@
     </p:spTree>
     <p:extLst>
       <p:ext uri="{BB962C8B-B14F-4D97-AF65-F5344CB8AC3E}">
-        <p14:creationId xmlns="" xmlns:p14="http://schemas.microsoft.com/office/powerpoint/2010/main" val="894590783"/>
+        <p14:creationId xmlns:p14="http://schemas.microsoft.com/office/powerpoint/2010/main" val="894590783"/>
       </p:ext>
     </p:extLst>
   </p:cSld>
@@ -2549,7 +2549,7 @@
     </p:spTree>
     <p:extLst>
       <p:ext uri="{BB962C8B-B14F-4D97-AF65-F5344CB8AC3E}">
-        <p14:creationId xmlns="" xmlns:p14="http://schemas.microsoft.com/office/powerpoint/2010/main" val="894590783"/>
+        <p14:creationId xmlns:p14="http://schemas.microsoft.com/office/powerpoint/2010/main" val="894590783"/>
       </p:ext>
     </p:extLst>
   </p:cSld>
@@ -2685,7 +2685,7 @@
     </p:spTree>
     <p:extLst>
       <p:ext uri="{BB962C8B-B14F-4D97-AF65-F5344CB8AC3E}">
-        <p14:creationId xmlns="" xmlns:p14="http://schemas.microsoft.com/office/powerpoint/2010/main" val="894590783"/>
+        <p14:creationId xmlns:p14="http://schemas.microsoft.com/office/powerpoint/2010/main" val="894590783"/>
       </p:ext>
     </p:extLst>
   </p:cSld>
@@ -2821,7 +2821,7 @@
     </p:spTree>
     <p:extLst>
       <p:ext uri="{BB962C8B-B14F-4D97-AF65-F5344CB8AC3E}">
-        <p14:creationId xmlns="" xmlns:p14="http://schemas.microsoft.com/office/powerpoint/2010/main" val="894590783"/>
+        <p14:creationId xmlns:p14="http://schemas.microsoft.com/office/powerpoint/2010/main" val="894590783"/>
       </p:ext>
     </p:extLst>
   </p:cSld>
@@ -2957,7 +2957,7 @@
     </p:spTree>
     <p:extLst>
       <p:ext uri="{BB962C8B-B14F-4D97-AF65-F5344CB8AC3E}">
-        <p14:creationId xmlns="" xmlns:p14="http://schemas.microsoft.com/office/powerpoint/2010/main" val="894590783"/>
+        <p14:creationId xmlns:p14="http://schemas.microsoft.com/office/powerpoint/2010/main" val="894590783"/>
       </p:ext>
     </p:extLst>
   </p:cSld>
@@ -3093,7 +3093,7 @@
     </p:spTree>
     <p:extLst>
       <p:ext uri="{BB962C8B-B14F-4D97-AF65-F5344CB8AC3E}">
-        <p14:creationId xmlns="" xmlns:p14="http://schemas.microsoft.com/office/powerpoint/2010/main" val="1472061649"/>
+        <p14:creationId xmlns:p14="http://schemas.microsoft.com/office/powerpoint/2010/main" val="1472061649"/>
       </p:ext>
     </p:extLst>
   </p:cSld>
@@ -7613,7 +7613,7 @@
                 <a:buFont typeface="Arial" pitchFamily="34" charset="0"/>
                 <a:buNone/>
               </a:pPr>
-              <a:t>26. Februar 2019</a:t>
+              <a:t>27. Februar 2019</a:t>
             </a:fld>
             <a:r>
               <a:rPr kumimoji="0" lang="en-US" sz="1100" b="0" i="0" u="none" strike="noStrike" kern="1200" cap="none" spc="0" normalizeH="0" baseline="0" noProof="0" dirty="0">
@@ -8581,7 +8581,7 @@
           <p:cNvPr id="2" name="Titel 1">
             <a:extLst>
               <a:ext uri="{FF2B5EF4-FFF2-40B4-BE49-F238E27FC236}">
-                <a16:creationId xmlns="" xmlns:a16="http://schemas.microsoft.com/office/drawing/2014/main" id="{24452668-05B8-45C3-9C30-2FC567BF5B34}"/>
+                <a16:creationId xmlns:a16="http://schemas.microsoft.com/office/drawing/2014/main" xmlns="" id="{24452668-05B8-45C3-9C30-2FC567BF5B34}"/>
               </a:ext>
             </a:extLst>
           </p:cNvPr>
@@ -8610,7 +8610,7 @@
           <p:cNvPr id="3" name="Inhaltsplatzhalter 2">
             <a:extLst>
               <a:ext uri="{FF2B5EF4-FFF2-40B4-BE49-F238E27FC236}">
-                <a16:creationId xmlns="" xmlns:a16="http://schemas.microsoft.com/office/drawing/2014/main" id="{6F95FF9C-402A-4AAD-8E88-8EE33D2499FD}"/>
+                <a16:creationId xmlns:a16="http://schemas.microsoft.com/office/drawing/2014/main" xmlns="" id="{6F95FF9C-402A-4AAD-8E88-8EE33D2499FD}"/>
               </a:ext>
             </a:extLst>
           </p:cNvPr>
@@ -8701,7 +8701,7 @@
     </p:spTree>
     <p:extLst>
       <p:ext uri="{BB962C8B-B14F-4D97-AF65-F5344CB8AC3E}">
-        <p14:creationId xmlns="" xmlns:p14="http://schemas.microsoft.com/office/powerpoint/2010/main" val="2622745934"/>
+        <p14:creationId xmlns:p14="http://schemas.microsoft.com/office/powerpoint/2010/main" val="2622745934"/>
       </p:ext>
     </p:extLst>
   </p:cSld>
@@ -8780,15 +8780,7 @@
           <a:p>
             <a:r>
               <a:rPr lang="de-DE" dirty="0" smtClean="0"/>
-              <a:t>Mega geile Optik aufgrund von goldfarbenem Logo (es ist </a:t>
-            </a:r>
-            <a:r>
-              <a:rPr lang="de-DE" dirty="0" smtClean="0"/>
-              <a:t>eigentlich Bronze</a:t>
-            </a:r>
-            <a:r>
-              <a:rPr lang="de-DE" dirty="0" smtClean="0"/>
-              <a:t>, das halte ich aber für ungünstig, weil Bronze = 3. Platz)</a:t>
+              <a:t>Mega geile Optik aufgrund von goldfarbenem Logo (es ist eigentlich Bronze, das halte ich aber für ungünstig, weil Bronze = 3. Platz)</a:t>
             </a:r>
             <a:endParaRPr lang="de-DE" dirty="0"/>
           </a:p>
@@ -9017,11 +9009,7 @@
             <a:pPr lvl="1"/>
             <a:r>
               <a:rPr lang="de-DE" altLang="zh-CN" dirty="0" smtClean="0"/>
-              <a:t>Fahrmodus mit Hinderniserkennung und </a:t>
-            </a:r>
-            <a:r>
-              <a:rPr lang="de-DE" altLang="zh-CN" dirty="0" smtClean="0"/>
-              <a:t>Spurwechsel („</a:t>
+              <a:t>Fahrmodus mit Hinderniserkennung und Spurwechsel („</a:t>
             </a:r>
             <a:r>
               <a:rPr lang="de-DE" altLang="zh-CN" dirty="0" err="1" smtClean="0"/>
@@ -9039,17 +9027,12 @@
               <a:rPr lang="de-DE" altLang="zh-CN" dirty="0" smtClean="0"/>
               <a:t>“)</a:t>
             </a:r>
-            <a:endParaRPr lang="de-DE" altLang="zh-CN" dirty="0" smtClean="0"/>
           </a:p>
           <a:p>
             <a:pPr lvl="1"/>
             <a:r>
               <a:rPr lang="de-DE" altLang="zh-CN" dirty="0" smtClean="0"/>
-              <a:t>Fahrmodus mit optimierter Geschwindigkeit für das </a:t>
-            </a:r>
-            <a:r>
-              <a:rPr lang="de-DE" altLang="zh-CN" dirty="0" smtClean="0"/>
-              <a:t>Rennen („</a:t>
+              <a:t>Fahrmodus mit optimierter Geschwindigkeit für das Rennen („</a:t>
             </a:r>
             <a:r>
               <a:rPr lang="de-DE" altLang="zh-CN" dirty="0" err="1" smtClean="0"/>
@@ -9119,11 +9102,7 @@
             <a:pPr lvl="1"/>
             <a:r>
               <a:rPr lang="de-DE" altLang="zh-CN" dirty="0" smtClean="0"/>
-              <a:t>Parametrierung des </a:t>
-            </a:r>
-            <a:r>
-              <a:rPr lang="de-DE" altLang="zh-CN" dirty="0" smtClean="0"/>
-              <a:t>PD-Reglers</a:t>
+              <a:t>Parametrierung des PD-Reglers</a:t>
             </a:r>
           </a:p>
           <a:p>
@@ -9398,13 +9377,274 @@
             </a:r>
             <a:r>
               <a:rPr lang="de-DE" altLang="zh-CN" dirty="0" smtClean="0"/>
-              <a:t> irgendwie </a:t>
-            </a:r>
-            <a:r>
-              <a:rPr lang="de-DE" altLang="zh-CN" smtClean="0"/>
-              <a:t>grafisch darstellen</a:t>
-            </a:r>
-            <a:endParaRPr lang="de-DE" altLang="zh-CN" dirty="0" smtClean="0"/>
+              <a:t> irgendwie grafisch darstellen</a:t>
+            </a:r>
+          </a:p>
+        </p:txBody>
+      </p:sp>
+      <p:sp>
+        <p:nvSpPr>
+          <p:cNvPr id="2" name="Textfeld 1"/>
+          <p:cNvSpPr txBox="1"/>
+          <p:nvPr/>
+        </p:nvSpPr>
+        <p:spPr>
+          <a:xfrm>
+            <a:off x="611560" y="2060848"/>
+            <a:ext cx="8208912" cy="1895775"/>
+          </a:xfrm>
+          <a:prstGeom prst="rect">
+            <a:avLst/>
+          </a:prstGeom>
+          <a:noFill/>
+        </p:spPr>
+        <p:txBody>
+          <a:bodyPr wrap="square" rtlCol="0">
+            <a:spAutoFit/>
+          </a:bodyPr>
+          <a:lstStyle/>
+          <a:p>
+            <a:pPr algn="l"/>
+            <a:r>
+              <a:rPr lang="de-DE" b="1" dirty="0" err="1" smtClean="0">
+                <a:solidFill>
+                  <a:schemeClr val="tx1"/>
+                </a:solidFill>
+              </a:rPr>
+              <a:t>drive_state</a:t>
+            </a:r>
+            <a:r>
+              <a:rPr lang="de-DE" b="1" dirty="0" smtClean="0">
+                <a:solidFill>
+                  <a:schemeClr val="tx1"/>
+                </a:solidFill>
+              </a:rPr>
+              <a:t>:</a:t>
+            </a:r>
+          </a:p>
+          <a:p>
+            <a:pPr algn="l"/>
+            <a:r>
+              <a:rPr lang="de-DE" b="1" dirty="0">
+                <a:solidFill>
+                  <a:schemeClr val="tx1"/>
+                </a:solidFill>
+              </a:rPr>
+              <a:t>	</a:t>
+            </a:r>
+            <a:r>
+              <a:rPr lang="de-DE" b="1" dirty="0" err="1" smtClean="0">
+                <a:solidFill>
+                  <a:schemeClr val="tx1"/>
+                </a:solidFill>
+              </a:rPr>
+              <a:t>if</a:t>
+            </a:r>
+            <a:r>
+              <a:rPr lang="de-DE" b="1" dirty="0" smtClean="0">
+                <a:solidFill>
+                  <a:schemeClr val="tx1"/>
+                </a:solidFill>
+              </a:rPr>
+              <a:t> </a:t>
+            </a:r>
+            <a:r>
+              <a:rPr lang="de-DE" dirty="0" smtClean="0">
+                <a:solidFill>
+                  <a:schemeClr val="tx1"/>
+                </a:solidFill>
+              </a:rPr>
+              <a:t>(Differenz Linienpunkte groß genug &amp;&amp; vergangene Differenzen auch groß genug):</a:t>
+            </a:r>
+          </a:p>
+          <a:p>
+            <a:pPr algn="l"/>
+            <a:r>
+              <a:rPr lang="de-DE" b="1" dirty="0">
+                <a:solidFill>
+                  <a:schemeClr val="tx1"/>
+                </a:solidFill>
+              </a:rPr>
+              <a:t>	</a:t>
+            </a:r>
+            <a:r>
+              <a:rPr lang="de-DE" b="1" dirty="0" smtClean="0">
+                <a:solidFill>
+                  <a:schemeClr val="tx1"/>
+                </a:solidFill>
+              </a:rPr>
+              <a:t>	</a:t>
+            </a:r>
+            <a:r>
+              <a:rPr lang="de-DE" dirty="0" err="1" smtClean="0">
+                <a:solidFill>
+                  <a:schemeClr val="tx1"/>
+                </a:solidFill>
+              </a:rPr>
+              <a:t>curve</a:t>
+            </a:r>
+            <a:r>
+              <a:rPr lang="de-DE" dirty="0" smtClean="0">
+                <a:solidFill>
+                  <a:schemeClr val="tx1"/>
+                </a:solidFill>
+              </a:rPr>
+              <a:t>=</a:t>
+            </a:r>
+            <a:r>
+              <a:rPr lang="de-DE" dirty="0" err="1" smtClean="0">
+                <a:solidFill>
+                  <a:schemeClr val="tx1"/>
+                </a:solidFill>
+              </a:rPr>
+              <a:t>true</a:t>
+            </a:r>
+            <a:r>
+              <a:rPr lang="de-DE" dirty="0" smtClean="0">
+                <a:solidFill>
+                  <a:schemeClr val="tx1"/>
+                </a:solidFill>
+              </a:rPr>
+              <a:t>;</a:t>
+            </a:r>
+          </a:p>
+          <a:p>
+            <a:pPr algn="l"/>
+            <a:r>
+              <a:rPr lang="de-DE" dirty="0" smtClean="0">
+                <a:solidFill>
+                  <a:schemeClr val="tx1"/>
+                </a:solidFill>
+              </a:rPr>
+              <a:t>		</a:t>
+            </a:r>
+            <a:r>
+              <a:rPr lang="de-DE" dirty="0" err="1" smtClean="0">
+                <a:solidFill>
+                  <a:schemeClr val="tx1"/>
+                </a:solidFill>
+              </a:rPr>
+              <a:t>wait</a:t>
+            </a:r>
+            <a:r>
+              <a:rPr lang="de-DE" dirty="0" smtClean="0">
+                <a:solidFill>
+                  <a:schemeClr val="tx1"/>
+                </a:solidFill>
+              </a:rPr>
+              <a:t> </a:t>
+            </a:r>
+            <a:r>
+              <a:rPr lang="de-DE" dirty="0" err="1" smtClean="0">
+                <a:solidFill>
+                  <a:schemeClr val="tx1"/>
+                </a:solidFill>
+              </a:rPr>
+              <a:t>until</a:t>
+            </a:r>
+            <a:r>
+              <a:rPr lang="de-DE" dirty="0" smtClean="0">
+                <a:solidFill>
+                  <a:schemeClr val="tx1"/>
+                </a:solidFill>
+              </a:rPr>
+              <a:t> in </a:t>
+            </a:r>
+            <a:r>
+              <a:rPr lang="de-DE" dirty="0" err="1" smtClean="0">
+                <a:solidFill>
+                  <a:schemeClr val="tx1"/>
+                </a:solidFill>
+              </a:rPr>
+              <a:t>curve</a:t>
+            </a:r>
+            <a:r>
+              <a:rPr lang="de-DE" dirty="0" smtClean="0">
+                <a:solidFill>
+                  <a:schemeClr val="tx1"/>
+                </a:solidFill>
+              </a:rPr>
+              <a:t>: DS_CURVE_SLOW </a:t>
+            </a:r>
+            <a:r>
+              <a:rPr lang="de-DE" dirty="0" smtClean="0">
+                <a:solidFill>
+                  <a:schemeClr val="tx1"/>
+                </a:solidFill>
+                <a:sym typeface="Wingdings" panose="05000000000000000000" pitchFamily="2" charset="2"/>
+              </a:rPr>
+              <a:t> DS_CURVE_AP_SLOW</a:t>
+            </a:r>
+          </a:p>
+          <a:p>
+            <a:pPr algn="l"/>
+            <a:r>
+              <a:rPr lang="de-DE" dirty="0">
+                <a:solidFill>
+                  <a:schemeClr val="tx1"/>
+                </a:solidFill>
+                <a:sym typeface="Wingdings" panose="05000000000000000000" pitchFamily="2" charset="2"/>
+              </a:rPr>
+              <a:t>	</a:t>
+            </a:r>
+            <a:r>
+              <a:rPr lang="de-DE" dirty="0" smtClean="0">
+                <a:solidFill>
+                  <a:schemeClr val="tx1"/>
+                </a:solidFill>
+                <a:sym typeface="Wingdings" panose="05000000000000000000" pitchFamily="2" charset="2"/>
+              </a:rPr>
+              <a:t>	</a:t>
+            </a:r>
+            <a:r>
+              <a:rPr lang="de-DE" dirty="0" err="1" smtClean="0">
+                <a:solidFill>
+                  <a:schemeClr val="tx1"/>
+                </a:solidFill>
+                <a:sym typeface="Wingdings" panose="05000000000000000000" pitchFamily="2" charset="2"/>
+              </a:rPr>
+              <a:t>leave</a:t>
+            </a:r>
+            <a:r>
+              <a:rPr lang="de-DE" dirty="0" smtClean="0">
+                <a:solidFill>
+                  <a:schemeClr val="tx1"/>
+                </a:solidFill>
+                <a:sym typeface="Wingdings" panose="05000000000000000000" pitchFamily="2" charset="2"/>
+              </a:rPr>
+              <a:t> </a:t>
+            </a:r>
+            <a:r>
+              <a:rPr lang="de-DE" dirty="0" err="1" smtClean="0">
+                <a:solidFill>
+                  <a:schemeClr val="tx1"/>
+                </a:solidFill>
+                <a:sym typeface="Wingdings" panose="05000000000000000000" pitchFamily="2" charset="2"/>
+              </a:rPr>
+              <a:t>curve</a:t>
+            </a:r>
+            <a:r>
+              <a:rPr lang="de-DE" dirty="0" smtClean="0">
+                <a:solidFill>
+                  <a:schemeClr val="tx1"/>
+                </a:solidFill>
+                <a:sym typeface="Wingdings" panose="05000000000000000000" pitchFamily="2" charset="2"/>
+              </a:rPr>
+              <a:t>: DS_STRAIGHT_SLOW  DS_STRAIGHT_AP_SLOW</a:t>
+            </a:r>
+            <a:endParaRPr lang="de-DE" dirty="0" smtClean="0">
+              <a:solidFill>
+                <a:schemeClr val="tx1"/>
+              </a:solidFill>
+            </a:endParaRPr>
+          </a:p>
+          <a:p>
+            <a:pPr algn="l"/>
+            <a:endParaRPr lang="de-DE" dirty="0">
+              <a:solidFill>
+                <a:schemeClr val="tx1"/>
+              </a:solidFill>
+            </a:endParaRPr>
           </a:p>
         </p:txBody>
       </p:sp>
@@ -9450,11 +9690,7 @@
           <a:p>
             <a:r>
               <a:rPr lang="de-DE" altLang="zh-CN" dirty="0" smtClean="0"/>
-              <a:t>Fahrmodus 1: Hinderniserkennung und </a:t>
-            </a:r>
-            <a:r>
-              <a:rPr lang="de-DE" altLang="zh-CN" dirty="0" smtClean="0"/>
-              <a:t>Spurwechsel („</a:t>
+              <a:t>Fahrmodus 1: Hinderniserkennung und Spurwechsel („</a:t>
             </a:r>
             <a:r>
               <a:rPr lang="de-DE" altLang="zh-CN" dirty="0" err="1" smtClean="0"/>
@@ -9472,7 +9708,6 @@
               <a:rPr lang="de-DE" altLang="zh-CN" dirty="0" smtClean="0"/>
               <a:t>“)</a:t>
             </a:r>
-            <a:endParaRPr lang="de-DE" altLang="zh-CN" dirty="0" smtClean="0"/>
           </a:p>
         </p:txBody>
       </p:sp>
@@ -9542,19 +9777,11 @@
           <a:p>
             <a:r>
               <a:rPr lang="de-DE" altLang="zh-CN" dirty="0" smtClean="0"/>
-              <a:t>Fahrmodus 2: optimierte Geschwindigkeit </a:t>
-            </a:r>
-            <a:r>
-              <a:rPr lang="de-DE" altLang="zh-CN" dirty="0" smtClean="0"/>
-              <a:t>(„</a:t>
+              <a:t>Fahrmodus 2: optimierte Geschwindigkeit („</a:t>
             </a:r>
             <a:r>
               <a:rPr lang="de-DE" altLang="zh-CN" dirty="0" err="1" smtClean="0"/>
-              <a:t>r</a:t>
-            </a:r>
-            <a:r>
-              <a:rPr lang="de-DE" altLang="zh-CN" dirty="0" err="1" smtClean="0"/>
-              <a:t>ace</a:t>
+              <a:t>race</a:t>
             </a:r>
             <a:r>
               <a:rPr lang="de-DE" altLang="zh-CN" dirty="0" smtClean="0"/>
@@ -9591,6 +9818,30 @@
           <a:bodyPr/>
           <a:lstStyle/>
           <a:p>
+            <a:r>
+              <a:rPr lang="de-DE" altLang="zh-CN" dirty="0" smtClean="0"/>
+              <a:t>Keine Spurhaltung</a:t>
+            </a:r>
+          </a:p>
+          <a:p>
+            <a:r>
+              <a:rPr lang="de-DE" altLang="zh-CN" dirty="0" smtClean="0"/>
+              <a:t>Geraden erkennen und schneller werden</a:t>
+            </a:r>
+          </a:p>
+          <a:p>
+            <a:r>
+              <a:rPr lang="de-DE" altLang="zh-CN" dirty="0" smtClean="0"/>
+              <a:t>In Kurven </a:t>
+            </a:r>
+            <a:r>
+              <a:rPr lang="de-DE" altLang="zh-CN" dirty="0" err="1" smtClean="0"/>
+              <a:t>Reglerwerte</a:t>
+            </a:r>
+            <a:r>
+              <a:rPr lang="de-DE" altLang="zh-CN" smtClean="0"/>
+              <a:t> anpassen</a:t>
+            </a:r>
             <a:endParaRPr lang="de-DE" altLang="zh-CN" dirty="0" smtClean="0"/>
           </a:p>
         </p:txBody>

</xml_diff>

<commit_message>
Praesentation Organisation und Endfolie
</commit_message>
<xml_diff>
--- a/Dokumente/Präsentationen/Abschlusspräsentation.pptx
+++ b/Dokumente/Präsentationen/Abschlusspräsentation.pptx
@@ -5,23 +5,26 @@
     <p:sldMasterId id="2147483648" r:id="rId1"/>
   </p:sldMasterIdLst>
   <p:notesMasterIdLst>
-    <p:notesMasterId r:id="rId13"/>
+    <p:notesMasterId r:id="rId16"/>
   </p:notesMasterIdLst>
   <p:handoutMasterIdLst>
-    <p:handoutMasterId r:id="rId14"/>
+    <p:handoutMasterId r:id="rId17"/>
   </p:handoutMasterIdLst>
   <p:sldIdLst>
     <p:sldId id="257" r:id="rId2"/>
     <p:sldId id="266" r:id="rId3"/>
-    <p:sldId id="267" r:id="rId4"/>
-    <p:sldId id="265" r:id="rId5"/>
-    <p:sldId id="259" r:id="rId6"/>
-    <p:sldId id="270" r:id="rId7"/>
-    <p:sldId id="271" r:id="rId8"/>
-    <p:sldId id="269" r:id="rId9"/>
-    <p:sldId id="268" r:id="rId10"/>
-    <p:sldId id="261" r:id="rId11"/>
-    <p:sldId id="262" r:id="rId12"/>
+    <p:sldId id="272" r:id="rId4"/>
+    <p:sldId id="274" r:id="rId5"/>
+    <p:sldId id="267" r:id="rId6"/>
+    <p:sldId id="265" r:id="rId7"/>
+    <p:sldId id="259" r:id="rId8"/>
+    <p:sldId id="270" r:id="rId9"/>
+    <p:sldId id="271" r:id="rId10"/>
+    <p:sldId id="269" r:id="rId11"/>
+    <p:sldId id="268" r:id="rId12"/>
+    <p:sldId id="261" r:id="rId13"/>
+    <p:sldId id="262" r:id="rId14"/>
+    <p:sldId id="275" r:id="rId15"/>
   </p:sldIdLst>
   <p:sldSz cx="9144000" cy="6858000" type="screen4x3"/>
   <p:notesSz cx="6797675" cy="9926638"/>
@@ -192,7 +195,7 @@
   </p:defaultTextStyle>
   <p:extLst>
     <p:ext uri="{EFAFB233-063F-42B5-8137-9DF3F51BA10A}">
-      <p15:sldGuideLst xmlns:p15="http://schemas.microsoft.com/office/powerpoint/2012/main" xmlns="">
+      <p15:sldGuideLst xmlns="" xmlns:p15="http://schemas.microsoft.com/office/powerpoint/2012/main">
         <p15:guide id="1" orient="horz" pos="4319">
           <p15:clr>
             <a:srgbClr val="A4A3A4"/>
@@ -206,7 +209,7 @@
       </p15:sldGuideLst>
     </p:ext>
     <p:ext uri="{2D200454-40CA-4A62-9FC3-DE9A4176ACB9}">
-      <p15:notesGuideLst xmlns:p15="http://schemas.microsoft.com/office/powerpoint/2012/main" xmlns="">
+      <p15:notesGuideLst xmlns="" xmlns:p15="http://schemas.microsoft.com/office/powerpoint/2012/main">
         <p15:guide id="1" orient="horz" pos="2874">
           <p15:clr>
             <a:srgbClr val="A4A3A4"/>
@@ -2131,6 +2134,13 @@
         </dgm:presLayoutVars>
       </dgm:prSet>
       <dgm:spPr/>
+      <dgm:t>
+        <a:bodyPr/>
+        <a:lstStyle/>
+        <a:p>
+          <a:endParaRPr lang="de-DE"/>
+        </a:p>
+      </dgm:t>
     </dgm:pt>
     <dgm:pt modelId="{322F2889-427F-4255-96FE-7A663EF3A95F}" type="pres">
       <dgm:prSet presAssocID="{FF517022-E8A5-401C-BEFF-859908823049}" presName="node" presStyleLbl="node1" presStyleIdx="0" presStyleCnt="6" custScaleX="163525" custScaleY="125976" custRadScaleRad="94162" custRadScaleInc="-9979">
@@ -2154,6 +2164,13 @@
     <dgm:pt modelId="{E04CC487-1C5B-45B6-8D5E-C8D4066D0943}" type="pres">
       <dgm:prSet presAssocID="{B14546C0-114D-408B-9FD0-5FFE00C38A13}" presName="sibTrans" presStyleLbl="sibTrans1D1" presStyleIdx="0" presStyleCnt="6"/>
       <dgm:spPr/>
+      <dgm:t>
+        <a:bodyPr/>
+        <a:lstStyle/>
+        <a:p>
+          <a:endParaRPr lang="de-DE"/>
+        </a:p>
+      </dgm:t>
     </dgm:pt>
     <dgm:pt modelId="{0EC62B5A-E703-4913-9127-81806E8ABEC7}" type="pres">
       <dgm:prSet presAssocID="{8946F9DE-07C3-4686-9856-6B2582DD3106}" presName="node" presStyleLbl="node1" presStyleIdx="1" presStyleCnt="6" custScaleX="141874" custRadScaleRad="107605" custRadScaleInc="43942">
@@ -2177,6 +2194,13 @@
     <dgm:pt modelId="{5627CC50-5788-4218-BE49-84D13277FE07}" type="pres">
       <dgm:prSet presAssocID="{EFAA9E13-0438-42E3-A7FC-26537FB853BC}" presName="sibTrans" presStyleLbl="sibTrans1D1" presStyleIdx="1" presStyleCnt="6"/>
       <dgm:spPr/>
+      <dgm:t>
+        <a:bodyPr/>
+        <a:lstStyle/>
+        <a:p>
+          <a:endParaRPr lang="de-DE"/>
+        </a:p>
+      </dgm:t>
     </dgm:pt>
     <dgm:pt modelId="{7DF9A944-9651-4414-985F-9C465760A763}" type="pres">
       <dgm:prSet presAssocID="{17393C64-41B8-4541-B793-D79216D0230D}" presName="node" presStyleLbl="node1" presStyleIdx="2" presStyleCnt="6" custScaleX="128693" custRadScaleRad="102747" custRadScaleInc="-78648">
@@ -2200,6 +2224,13 @@
     <dgm:pt modelId="{C2088CE8-813B-404D-9C15-5986F4B492B7}" type="pres">
       <dgm:prSet presAssocID="{256E034F-7A83-4132-AD3E-FC88A31B3171}" presName="sibTrans" presStyleLbl="sibTrans1D1" presStyleIdx="2" presStyleCnt="6"/>
       <dgm:spPr/>
+      <dgm:t>
+        <a:bodyPr/>
+        <a:lstStyle/>
+        <a:p>
+          <a:endParaRPr lang="de-DE"/>
+        </a:p>
+      </dgm:t>
     </dgm:pt>
     <dgm:pt modelId="{51070C73-9ABB-4CBE-BF7F-197499FA4E9F}" type="pres">
       <dgm:prSet presAssocID="{097DC993-72A3-4244-AFD6-0815E77788A4}" presName="node" presStyleLbl="node1" presStyleIdx="3" presStyleCnt="6" custScaleX="170260" custScaleY="130813" custRadScaleRad="88999" custRadScaleInc="3471">
@@ -2223,6 +2254,13 @@
     <dgm:pt modelId="{0E8FB463-07BE-482A-BC43-61AF7FD595C1}" type="pres">
       <dgm:prSet presAssocID="{12DBF135-D93E-4E14-AEB2-5C4A533E7B5D}" presName="sibTrans" presStyleLbl="sibTrans1D1" presStyleIdx="3" presStyleCnt="6"/>
       <dgm:spPr/>
+      <dgm:t>
+        <a:bodyPr/>
+        <a:lstStyle/>
+        <a:p>
+          <a:endParaRPr lang="de-DE"/>
+        </a:p>
+      </dgm:t>
     </dgm:pt>
     <dgm:pt modelId="{F289F93E-06E5-4979-920E-3478F87B263A}" type="pres">
       <dgm:prSet presAssocID="{5B0E89E7-AC0B-4EB0-A717-91ED139CDD67}" presName="node" presStyleLbl="node1" presStyleIdx="4" presStyleCnt="6" custScaleX="155752" custRadScaleRad="94940" custRadScaleInc="72639">
@@ -2246,6 +2284,13 @@
     <dgm:pt modelId="{92E93751-1EDC-4F0A-98BC-A5C9AA6C1D5F}" type="pres">
       <dgm:prSet presAssocID="{2D86A2BF-5B6A-4D76-94CC-99797484151B}" presName="sibTrans" presStyleLbl="sibTrans1D1" presStyleIdx="4" presStyleCnt="6"/>
       <dgm:spPr/>
+      <dgm:t>
+        <a:bodyPr/>
+        <a:lstStyle/>
+        <a:p>
+          <a:endParaRPr lang="de-DE"/>
+        </a:p>
+      </dgm:t>
     </dgm:pt>
     <dgm:pt modelId="{06095F51-3C94-4EFF-917D-25EAB90C3F30}" type="pres">
       <dgm:prSet presAssocID="{D7962C6A-858D-4AB6-AAF5-72BB61C3BCC6}" presName="node" presStyleLbl="node1" presStyleIdx="5" presStyleCnt="6" custScaleX="138416" custRadScaleRad="102617" custRadScaleInc="-38518">
@@ -2269,36 +2314,43 @@
     <dgm:pt modelId="{21E62269-EC77-4B92-819E-7AD572501D51}" type="pres">
       <dgm:prSet presAssocID="{477FC51F-3263-43C0-8AF5-0B7CB46EA1BD}" presName="sibTrans" presStyleLbl="sibTrans1D1" presStyleIdx="5" presStyleCnt="6"/>
       <dgm:spPr/>
+      <dgm:t>
+        <a:bodyPr/>
+        <a:lstStyle/>
+        <a:p>
+          <a:endParaRPr lang="de-DE"/>
+        </a:p>
+      </dgm:t>
     </dgm:pt>
   </dgm:ptLst>
   <dgm:cxnLst>
-    <dgm:cxn modelId="{0AEE111E-0CF7-46B6-B51F-F81DA5D8D01F}" type="presOf" srcId="{D62CCB92-B222-40DF-8910-3148B3994A10}" destId="{51070C73-9ABB-4CBE-BF7F-197499FA4E9F}" srcOrd="0" destOrd="1" presId="urn:microsoft.com/office/officeart/2005/8/layout/cycle5"/>
+    <dgm:cxn modelId="{6F7BB68A-0B71-491E-8D6E-DC8B76730EB3}" type="presOf" srcId="{9C262D38-C23F-46A9-B2F7-AD02E33616FF}" destId="{ADCC66F3-B14D-44B1-8B1E-5A57D0293F83}" srcOrd="0" destOrd="0" presId="urn:microsoft.com/office/officeart/2005/8/layout/cycle5"/>
+    <dgm:cxn modelId="{6749EC41-312E-4702-AE93-417101E72446}" type="presOf" srcId="{12DBF135-D93E-4E14-AEB2-5C4A533E7B5D}" destId="{0E8FB463-07BE-482A-BC43-61AF7FD595C1}" srcOrd="0" destOrd="0" presId="urn:microsoft.com/office/officeart/2005/8/layout/cycle5"/>
+    <dgm:cxn modelId="{8E92716F-26B5-48CB-9A00-5C3373317CD3}" type="presOf" srcId="{8946F9DE-07C3-4686-9856-6B2582DD3106}" destId="{0EC62B5A-E703-4913-9127-81806E8ABEC7}" srcOrd="0" destOrd="0" presId="urn:microsoft.com/office/officeart/2005/8/layout/cycle5"/>
+    <dgm:cxn modelId="{7C9F5033-8032-4928-BA9F-5E3EA4B9BF79}" srcId="{097DC993-72A3-4244-AFD6-0815E77788A4}" destId="{ACE2CC2F-AAD9-4D05-8B40-547E3B539AA8}" srcOrd="1" destOrd="0" parTransId="{247F8999-C927-44AD-A8A4-ACF4DF7446C5}" sibTransId="{8B9E9675-B7D5-4D3D-AA5A-60329BC021AC}"/>
+    <dgm:cxn modelId="{866FAEBD-B319-41E9-8E07-12BC3EDA4B0E}" type="presOf" srcId="{FF517022-E8A5-401C-BEFF-859908823049}" destId="{322F2889-427F-4255-96FE-7A663EF3A95F}" srcOrd="0" destOrd="0" presId="urn:microsoft.com/office/officeart/2005/8/layout/cycle5"/>
+    <dgm:cxn modelId="{A8A36C32-F17B-4246-9A36-013688B8CADE}" type="presOf" srcId="{17393C64-41B8-4541-B793-D79216D0230D}" destId="{7DF9A944-9651-4414-985F-9C465760A763}" srcOrd="0" destOrd="0" presId="urn:microsoft.com/office/officeart/2005/8/layout/cycle5"/>
     <dgm:cxn modelId="{3AB39C81-ACA0-4389-93FD-F278E26CC96D}" srcId="{9C262D38-C23F-46A9-B2F7-AD02E33616FF}" destId="{8946F9DE-07C3-4686-9856-6B2582DD3106}" srcOrd="1" destOrd="0" parTransId="{975B95CE-EE56-4169-AE2B-9ACD786ED702}" sibTransId="{EFAA9E13-0438-42E3-A7FC-26537FB853BC}"/>
     <dgm:cxn modelId="{9350CCA3-652E-4BF3-9834-DDA1168358CB}" type="presOf" srcId="{097DC993-72A3-4244-AFD6-0815E77788A4}" destId="{51070C73-9ABB-4CBE-BF7F-197499FA4E9F}" srcOrd="0" destOrd="0" presId="urn:microsoft.com/office/officeart/2005/8/layout/cycle5"/>
+    <dgm:cxn modelId="{521A4830-26D1-4BA7-AC54-7A0EEFE775FD}" type="presOf" srcId="{EAE6104A-0D3A-40D0-B9AA-3C115D31E63D}" destId="{322F2889-427F-4255-96FE-7A663EF3A95F}" srcOrd="0" destOrd="2" presId="urn:microsoft.com/office/officeart/2005/8/layout/cycle5"/>
+    <dgm:cxn modelId="{BC416615-A145-46B5-BFA3-B5DC7DB689E8}" srcId="{9C262D38-C23F-46A9-B2F7-AD02E33616FF}" destId="{097DC993-72A3-4244-AFD6-0815E77788A4}" srcOrd="3" destOrd="0" parTransId="{A9F536AC-C72D-492A-AE1B-9C1C204A8896}" sibTransId="{12DBF135-D93E-4E14-AEB2-5C4A533E7B5D}"/>
+    <dgm:cxn modelId="{47A7DB7C-BE0F-4751-A725-2CB710F1F10D}" srcId="{FF517022-E8A5-401C-BEFF-859908823049}" destId="{EA98858B-2958-46B2-B90A-604982431D71}" srcOrd="0" destOrd="0" parTransId="{F0D89781-7E9B-42B4-9C21-DEAE5EC81703}" sibTransId="{4FAAD27D-EE34-40E4-9E67-FFAFB62FB61F}"/>
+    <dgm:cxn modelId="{92C98818-1344-408C-BB49-BB4B253A5100}" type="presOf" srcId="{2D86A2BF-5B6A-4D76-94CC-99797484151B}" destId="{92E93751-1EDC-4F0A-98BC-A5C9AA6C1D5F}" srcOrd="0" destOrd="0" presId="urn:microsoft.com/office/officeart/2005/8/layout/cycle5"/>
+    <dgm:cxn modelId="{2F84FA07-936E-4B7E-A03B-A194E9052312}" type="presOf" srcId="{B14546C0-114D-408B-9FD0-5FFE00C38A13}" destId="{E04CC487-1C5B-45B6-8D5E-C8D4066D0943}" srcOrd="0" destOrd="0" presId="urn:microsoft.com/office/officeart/2005/8/layout/cycle5"/>
+    <dgm:cxn modelId="{C247594F-E5B6-4B62-830C-92DEEA205355}" type="presOf" srcId="{EFAA9E13-0438-42E3-A7FC-26537FB853BC}" destId="{5627CC50-5788-4218-BE49-84D13277FE07}" srcOrd="0" destOrd="0" presId="urn:microsoft.com/office/officeart/2005/8/layout/cycle5"/>
+    <dgm:cxn modelId="{F4874C69-53D7-4214-A10B-196EA99201CB}" type="presOf" srcId="{EA98858B-2958-46B2-B90A-604982431D71}" destId="{322F2889-427F-4255-96FE-7A663EF3A95F}" srcOrd="0" destOrd="1" presId="urn:microsoft.com/office/officeart/2005/8/layout/cycle5"/>
+    <dgm:cxn modelId="{DBE0F657-601C-4DD8-A03D-5355C31A7FDF}" type="presOf" srcId="{D7962C6A-858D-4AB6-AAF5-72BB61C3BCC6}" destId="{06095F51-3C94-4EFF-917D-25EAB90C3F30}" srcOrd="0" destOrd="0" presId="urn:microsoft.com/office/officeart/2005/8/layout/cycle5"/>
+    <dgm:cxn modelId="{3E697076-F8A8-4CD1-B192-113D0F0FC04A}" type="presOf" srcId="{ACE2CC2F-AAD9-4D05-8B40-547E3B539AA8}" destId="{51070C73-9ABB-4CBE-BF7F-197499FA4E9F}" srcOrd="0" destOrd="2" presId="urn:microsoft.com/office/officeart/2005/8/layout/cycle5"/>
+    <dgm:cxn modelId="{24394471-5ADE-4691-8F52-2F36A64596C8}" type="presOf" srcId="{477FC51F-3263-43C0-8AF5-0B7CB46EA1BD}" destId="{21E62269-EC77-4B92-819E-7AD572501D51}" srcOrd="0" destOrd="0" presId="urn:microsoft.com/office/officeart/2005/8/layout/cycle5"/>
+    <dgm:cxn modelId="{865AAAEF-C0D8-4B99-8355-9BA75E218C62}" srcId="{9C262D38-C23F-46A9-B2F7-AD02E33616FF}" destId="{17393C64-41B8-4541-B793-D79216D0230D}" srcOrd="2" destOrd="0" parTransId="{3C0033BF-238A-4AAE-BE08-3C2F777F0BAB}" sibTransId="{256E034F-7A83-4132-AD3E-FC88A31B3171}"/>
+    <dgm:cxn modelId="{F2047F85-9621-4FCB-B383-604EB64D5252}" srcId="{FF517022-E8A5-401C-BEFF-859908823049}" destId="{EAE6104A-0D3A-40D0-B9AA-3C115D31E63D}" srcOrd="1" destOrd="0" parTransId="{DF429748-4078-437E-91B8-F006D4A71A50}" sibTransId="{82834DA9-4A09-4E78-B60B-A67DACB77507}"/>
     <dgm:cxn modelId="{7BAC0309-2F85-440B-A73B-E46466658077}" type="presOf" srcId="{256E034F-7A83-4132-AD3E-FC88A31B3171}" destId="{C2088CE8-813B-404D-9C15-5986F4B492B7}" srcOrd="0" destOrd="0" presId="urn:microsoft.com/office/officeart/2005/8/layout/cycle5"/>
-    <dgm:cxn modelId="{7C9F5033-8032-4928-BA9F-5E3EA4B9BF79}" srcId="{097DC993-72A3-4244-AFD6-0815E77788A4}" destId="{ACE2CC2F-AAD9-4D05-8B40-547E3B539AA8}" srcOrd="1" destOrd="0" parTransId="{247F8999-C927-44AD-A8A4-ACF4DF7446C5}" sibTransId="{8B9E9675-B7D5-4D3D-AA5A-60329BC021AC}"/>
-    <dgm:cxn modelId="{DBE0F657-601C-4DD8-A03D-5355C31A7FDF}" type="presOf" srcId="{D7962C6A-858D-4AB6-AAF5-72BB61C3BCC6}" destId="{06095F51-3C94-4EFF-917D-25EAB90C3F30}" srcOrd="0" destOrd="0" presId="urn:microsoft.com/office/officeart/2005/8/layout/cycle5"/>
+    <dgm:cxn modelId="{314F8DD0-0B29-4706-8EEE-BAAFD74FBEB6}" srcId="{097DC993-72A3-4244-AFD6-0815E77788A4}" destId="{D62CCB92-B222-40DF-8910-3148B3994A10}" srcOrd="0" destOrd="0" parTransId="{D152CB20-4ABC-4DDA-A92D-C16D4F2B7CD2}" sibTransId="{57CDC721-343F-44D8-90E2-558FDBF3070C}"/>
     <dgm:cxn modelId="{ECE19E7E-DAB2-4039-85CD-2A4A148F666B}" srcId="{9C262D38-C23F-46A9-B2F7-AD02E33616FF}" destId="{5B0E89E7-AC0B-4EB0-A717-91ED139CDD67}" srcOrd="4" destOrd="0" parTransId="{BA3E99B5-3D07-45F0-9FD6-DBF9FBFAFCB3}" sibTransId="{2D86A2BF-5B6A-4D76-94CC-99797484151B}"/>
-    <dgm:cxn modelId="{24394471-5ADE-4691-8F52-2F36A64596C8}" type="presOf" srcId="{477FC51F-3263-43C0-8AF5-0B7CB46EA1BD}" destId="{21E62269-EC77-4B92-819E-7AD572501D51}" srcOrd="0" destOrd="0" presId="urn:microsoft.com/office/officeart/2005/8/layout/cycle5"/>
     <dgm:cxn modelId="{8B41DED6-B2BA-4000-9CC0-7E8CC3DEB9EE}" type="presOf" srcId="{5B0E89E7-AC0B-4EB0-A717-91ED139CDD67}" destId="{F289F93E-06E5-4979-920E-3478F87B263A}" srcOrd="0" destOrd="0" presId="urn:microsoft.com/office/officeart/2005/8/layout/cycle5"/>
-    <dgm:cxn modelId="{6749EC41-312E-4702-AE93-417101E72446}" type="presOf" srcId="{12DBF135-D93E-4E14-AEB2-5C4A533E7B5D}" destId="{0E8FB463-07BE-482A-BC43-61AF7FD595C1}" srcOrd="0" destOrd="0" presId="urn:microsoft.com/office/officeart/2005/8/layout/cycle5"/>
-    <dgm:cxn modelId="{866FAEBD-B319-41E9-8E07-12BC3EDA4B0E}" type="presOf" srcId="{FF517022-E8A5-401C-BEFF-859908823049}" destId="{322F2889-427F-4255-96FE-7A663EF3A95F}" srcOrd="0" destOrd="0" presId="urn:microsoft.com/office/officeart/2005/8/layout/cycle5"/>
-    <dgm:cxn modelId="{47A7DB7C-BE0F-4751-A725-2CB710F1F10D}" srcId="{FF517022-E8A5-401C-BEFF-859908823049}" destId="{EA98858B-2958-46B2-B90A-604982431D71}" srcOrd="0" destOrd="0" parTransId="{F0D89781-7E9B-42B4-9C21-DEAE5EC81703}" sibTransId="{4FAAD27D-EE34-40E4-9E67-FFAFB62FB61F}"/>
-    <dgm:cxn modelId="{3E697076-F8A8-4CD1-B192-113D0F0FC04A}" type="presOf" srcId="{ACE2CC2F-AAD9-4D05-8B40-547E3B539AA8}" destId="{51070C73-9ABB-4CBE-BF7F-197499FA4E9F}" srcOrd="0" destOrd="2" presId="urn:microsoft.com/office/officeart/2005/8/layout/cycle5"/>
-    <dgm:cxn modelId="{F4874C69-53D7-4214-A10B-196EA99201CB}" type="presOf" srcId="{EA98858B-2958-46B2-B90A-604982431D71}" destId="{322F2889-427F-4255-96FE-7A663EF3A95F}" srcOrd="0" destOrd="1" presId="urn:microsoft.com/office/officeart/2005/8/layout/cycle5"/>
-    <dgm:cxn modelId="{C247594F-E5B6-4B62-830C-92DEEA205355}" type="presOf" srcId="{EFAA9E13-0438-42E3-A7FC-26537FB853BC}" destId="{5627CC50-5788-4218-BE49-84D13277FE07}" srcOrd="0" destOrd="0" presId="urn:microsoft.com/office/officeart/2005/8/layout/cycle5"/>
-    <dgm:cxn modelId="{A8A36C32-F17B-4246-9A36-013688B8CADE}" type="presOf" srcId="{17393C64-41B8-4541-B793-D79216D0230D}" destId="{7DF9A944-9651-4414-985F-9C465760A763}" srcOrd="0" destOrd="0" presId="urn:microsoft.com/office/officeart/2005/8/layout/cycle5"/>
-    <dgm:cxn modelId="{314F8DD0-0B29-4706-8EEE-BAAFD74FBEB6}" srcId="{097DC993-72A3-4244-AFD6-0815E77788A4}" destId="{D62CCB92-B222-40DF-8910-3148B3994A10}" srcOrd="0" destOrd="0" parTransId="{D152CB20-4ABC-4DDA-A92D-C16D4F2B7CD2}" sibTransId="{57CDC721-343F-44D8-90E2-558FDBF3070C}"/>
-    <dgm:cxn modelId="{F2047F85-9621-4FCB-B383-604EB64D5252}" srcId="{FF517022-E8A5-401C-BEFF-859908823049}" destId="{EAE6104A-0D3A-40D0-B9AA-3C115D31E63D}" srcOrd="1" destOrd="0" parTransId="{DF429748-4078-437E-91B8-F006D4A71A50}" sibTransId="{82834DA9-4A09-4E78-B60B-A67DACB77507}"/>
-    <dgm:cxn modelId="{8E92716F-26B5-48CB-9A00-5C3373317CD3}" type="presOf" srcId="{8946F9DE-07C3-4686-9856-6B2582DD3106}" destId="{0EC62B5A-E703-4913-9127-81806E8ABEC7}" srcOrd="0" destOrd="0" presId="urn:microsoft.com/office/officeart/2005/8/layout/cycle5"/>
-    <dgm:cxn modelId="{2F84FA07-936E-4B7E-A03B-A194E9052312}" type="presOf" srcId="{B14546C0-114D-408B-9FD0-5FFE00C38A13}" destId="{E04CC487-1C5B-45B6-8D5E-C8D4066D0943}" srcOrd="0" destOrd="0" presId="urn:microsoft.com/office/officeart/2005/8/layout/cycle5"/>
+    <dgm:cxn modelId="{2BD4F86B-4469-454E-86A1-0BABCC4E1081}" srcId="{9C262D38-C23F-46A9-B2F7-AD02E33616FF}" destId="{D7962C6A-858D-4AB6-AAF5-72BB61C3BCC6}" srcOrd="5" destOrd="0" parTransId="{D726EDDA-5EDB-4813-8144-3C7BAC923A21}" sibTransId="{477FC51F-3263-43C0-8AF5-0B7CB46EA1BD}"/>
+    <dgm:cxn modelId="{0AEE111E-0CF7-46B6-B51F-F81DA5D8D01F}" type="presOf" srcId="{D62CCB92-B222-40DF-8910-3148B3994A10}" destId="{51070C73-9ABB-4CBE-BF7F-197499FA4E9F}" srcOrd="0" destOrd="1" presId="urn:microsoft.com/office/officeart/2005/8/layout/cycle5"/>
     <dgm:cxn modelId="{F148F9A0-762A-46AE-82B5-003BC8579357}" srcId="{9C262D38-C23F-46A9-B2F7-AD02E33616FF}" destId="{FF517022-E8A5-401C-BEFF-859908823049}" srcOrd="0" destOrd="0" parTransId="{DA34CBC9-6E5B-4881-9037-B6C720FFA15E}" sibTransId="{B14546C0-114D-408B-9FD0-5FFE00C38A13}"/>
-    <dgm:cxn modelId="{865AAAEF-C0D8-4B99-8355-9BA75E218C62}" srcId="{9C262D38-C23F-46A9-B2F7-AD02E33616FF}" destId="{17393C64-41B8-4541-B793-D79216D0230D}" srcOrd="2" destOrd="0" parTransId="{3C0033BF-238A-4AAE-BE08-3C2F777F0BAB}" sibTransId="{256E034F-7A83-4132-AD3E-FC88A31B3171}"/>
-    <dgm:cxn modelId="{6F7BB68A-0B71-491E-8D6E-DC8B76730EB3}" type="presOf" srcId="{9C262D38-C23F-46A9-B2F7-AD02E33616FF}" destId="{ADCC66F3-B14D-44B1-8B1E-5A57D0293F83}" srcOrd="0" destOrd="0" presId="urn:microsoft.com/office/officeart/2005/8/layout/cycle5"/>
-    <dgm:cxn modelId="{BC416615-A145-46B5-BFA3-B5DC7DB689E8}" srcId="{9C262D38-C23F-46A9-B2F7-AD02E33616FF}" destId="{097DC993-72A3-4244-AFD6-0815E77788A4}" srcOrd="3" destOrd="0" parTransId="{A9F536AC-C72D-492A-AE1B-9C1C204A8896}" sibTransId="{12DBF135-D93E-4E14-AEB2-5C4A533E7B5D}"/>
-    <dgm:cxn modelId="{521A4830-26D1-4BA7-AC54-7A0EEFE775FD}" type="presOf" srcId="{EAE6104A-0D3A-40D0-B9AA-3C115D31E63D}" destId="{322F2889-427F-4255-96FE-7A663EF3A95F}" srcOrd="0" destOrd="2" presId="urn:microsoft.com/office/officeart/2005/8/layout/cycle5"/>
-    <dgm:cxn modelId="{2BD4F86B-4469-454E-86A1-0BABCC4E1081}" srcId="{9C262D38-C23F-46A9-B2F7-AD02E33616FF}" destId="{D7962C6A-858D-4AB6-AAF5-72BB61C3BCC6}" srcOrd="5" destOrd="0" parTransId="{D726EDDA-5EDB-4813-8144-3C7BAC923A21}" sibTransId="{477FC51F-3263-43C0-8AF5-0B7CB46EA1BD}"/>
-    <dgm:cxn modelId="{92C98818-1344-408C-BB49-BB4B253A5100}" type="presOf" srcId="{2D86A2BF-5B6A-4D76-94CC-99797484151B}" destId="{92E93751-1EDC-4F0A-98BC-A5C9AA6C1D5F}" srcOrd="0" destOrd="0" presId="urn:microsoft.com/office/officeart/2005/8/layout/cycle5"/>
     <dgm:cxn modelId="{801764BC-29FB-4785-96D9-841BC3CBC9A2}" type="presParOf" srcId="{ADCC66F3-B14D-44B1-8B1E-5A57D0293F83}" destId="{322F2889-427F-4255-96FE-7A663EF3A95F}" srcOrd="0" destOrd="0" presId="urn:microsoft.com/office/officeart/2005/8/layout/cycle5"/>
     <dgm:cxn modelId="{5CD37A18-92DD-4ACF-BC50-73AE0766C367}" type="presParOf" srcId="{ADCC66F3-B14D-44B1-8B1E-5A57D0293F83}" destId="{BBF5FDF9-DFFC-4812-ACBB-83C47312AC25}" srcOrd="1" destOrd="0" presId="urn:microsoft.com/office/officeart/2005/8/layout/cycle5"/>
     <dgm:cxn modelId="{2589A008-D537-4A14-9AA3-9F201D07A230}" type="presParOf" srcId="{ADCC66F3-B14D-44B1-8B1E-5A57D0293F83}" destId="{E04CC487-1C5B-45B6-8D5E-C8D4066D0943}" srcOrd="2" destOrd="0" presId="urn:microsoft.com/office/officeart/2005/8/layout/cycle5"/>
@@ -2322,7 +2374,7 @@
   <dgm:whole/>
   <dgm:extLst>
     <a:ext uri="http://schemas.microsoft.com/office/drawing/2008/diagram">
-      <dsp:dataModelExt xmlns:dsp="http://schemas.microsoft.com/office/drawing/2008/diagram" xmlns="" relId="rId9" minVer="http://schemas.openxmlformats.org/drawingml/2006/diagram"/>
+      <dsp:dataModelExt xmlns:dsp="http://schemas.microsoft.com/office/drawing/2008/diagram" relId="rId9" minVer="http://schemas.openxmlformats.org/drawingml/2006/diagram"/>
     </a:ext>
   </dgm:extLst>
 </dgm:dataModel>
@@ -2577,14 +2629,35 @@
         </dgm:presLayoutVars>
       </dgm:prSet>
       <dgm:spPr/>
+      <dgm:t>
+        <a:bodyPr/>
+        <a:lstStyle/>
+        <a:p>
+          <a:endParaRPr lang="de-DE"/>
+        </a:p>
+      </dgm:t>
     </dgm:pt>
     <dgm:pt modelId="{07284E07-4408-4BF2-9E53-8B0D5A353C3A}" type="pres">
       <dgm:prSet presAssocID="{0A5440AC-4116-4C27-9264-16AACB669E12}" presName="sibTrans" presStyleLbl="sibTrans2D1" presStyleIdx="0" presStyleCnt="5"/>
       <dgm:spPr/>
+      <dgm:t>
+        <a:bodyPr/>
+        <a:lstStyle/>
+        <a:p>
+          <a:endParaRPr lang="de-DE"/>
+        </a:p>
+      </dgm:t>
     </dgm:pt>
     <dgm:pt modelId="{F8FFB6C0-E03E-4022-8398-9AFF5BF916E4}" type="pres">
       <dgm:prSet presAssocID="{0A5440AC-4116-4C27-9264-16AACB669E12}" presName="connectorText" presStyleLbl="sibTrans2D1" presStyleIdx="0" presStyleCnt="5"/>
       <dgm:spPr/>
+      <dgm:t>
+        <a:bodyPr/>
+        <a:lstStyle/>
+        <a:p>
+          <a:endParaRPr lang="de-DE"/>
+        </a:p>
+      </dgm:t>
     </dgm:pt>
     <dgm:pt modelId="{EB0F924E-08B8-4496-8F7C-D75A9D314B30}" type="pres">
       <dgm:prSet presAssocID="{6883C271-93CE-4F53-B3DB-E78414E06855}" presName="node" presStyleLbl="node1" presStyleIdx="1" presStyleCnt="6" custScaleX="102074" custScaleY="73700" custLinFactNeighborX="-11371" custLinFactNeighborY="-818">
@@ -2593,14 +2666,35 @@
         </dgm:presLayoutVars>
       </dgm:prSet>
       <dgm:spPr/>
+      <dgm:t>
+        <a:bodyPr/>
+        <a:lstStyle/>
+        <a:p>
+          <a:endParaRPr lang="de-DE"/>
+        </a:p>
+      </dgm:t>
     </dgm:pt>
     <dgm:pt modelId="{87601AF7-0F9F-46ED-B4EE-1B62860D4BA5}" type="pres">
       <dgm:prSet presAssocID="{FE6047D0-FF2D-42A2-B389-DB220F2BDF26}" presName="sibTrans" presStyleLbl="sibTrans2D1" presStyleIdx="1" presStyleCnt="5"/>
       <dgm:spPr/>
+      <dgm:t>
+        <a:bodyPr/>
+        <a:lstStyle/>
+        <a:p>
+          <a:endParaRPr lang="de-DE"/>
+        </a:p>
+      </dgm:t>
     </dgm:pt>
     <dgm:pt modelId="{8EE4ED0A-418E-4458-84B0-1C7F6B4889D0}" type="pres">
       <dgm:prSet presAssocID="{FE6047D0-FF2D-42A2-B389-DB220F2BDF26}" presName="connectorText" presStyleLbl="sibTrans2D1" presStyleIdx="1" presStyleCnt="5"/>
       <dgm:spPr/>
+      <dgm:t>
+        <a:bodyPr/>
+        <a:lstStyle/>
+        <a:p>
+          <a:endParaRPr lang="de-DE"/>
+        </a:p>
+      </dgm:t>
     </dgm:pt>
     <dgm:pt modelId="{3ECB9AC3-8324-4FBC-8785-044F1DD81182}" type="pres">
       <dgm:prSet presAssocID="{D2E27AEE-DE18-437E-8ED4-085C407B02F4}" presName="node" presStyleLbl="node1" presStyleIdx="2" presStyleCnt="6" custScaleY="80152" custLinFactNeighborX="-3780" custLinFactNeighborY="-3015">
@@ -2620,10 +2714,24 @@
     <dgm:pt modelId="{57D1F035-83D0-404D-822E-A0E9FF1B02F1}" type="pres">
       <dgm:prSet presAssocID="{AF275174-F4D7-4107-9340-9F31FFAE84C6}" presName="sibTrans" presStyleLbl="sibTrans2D1" presStyleIdx="2" presStyleCnt="5"/>
       <dgm:spPr/>
+      <dgm:t>
+        <a:bodyPr/>
+        <a:lstStyle/>
+        <a:p>
+          <a:endParaRPr lang="de-DE"/>
+        </a:p>
+      </dgm:t>
     </dgm:pt>
     <dgm:pt modelId="{B064BFA8-682D-4757-ADFC-2CABBAA0A8B1}" type="pres">
       <dgm:prSet presAssocID="{AF275174-F4D7-4107-9340-9F31FFAE84C6}" presName="connectorText" presStyleLbl="sibTrans2D1" presStyleIdx="2" presStyleCnt="5"/>
       <dgm:spPr/>
+      <dgm:t>
+        <a:bodyPr/>
+        <a:lstStyle/>
+        <a:p>
+          <a:endParaRPr lang="de-DE"/>
+        </a:p>
+      </dgm:t>
     </dgm:pt>
     <dgm:pt modelId="{0C959095-7882-4471-98AD-EDED72A06E2D}" type="pres">
       <dgm:prSet presAssocID="{7D600DAC-9587-44B5-AA91-D1DB1E8AF259}" presName="node" presStyleLbl="node1" presStyleIdx="3" presStyleCnt="6" custScaleY="80325" custLinFactNeighborX="-3780" custLinFactNeighborY="-25113">
@@ -2643,10 +2751,24 @@
     <dgm:pt modelId="{C187702E-51EF-4FC5-95AA-90B3C81FA086}" type="pres">
       <dgm:prSet presAssocID="{DD3CB5CF-4595-4EEC-846B-6102664F2F05}" presName="sibTrans" presStyleLbl="sibTrans2D1" presStyleIdx="3" presStyleCnt="5"/>
       <dgm:spPr/>
+      <dgm:t>
+        <a:bodyPr/>
+        <a:lstStyle/>
+        <a:p>
+          <a:endParaRPr lang="de-DE"/>
+        </a:p>
+      </dgm:t>
     </dgm:pt>
     <dgm:pt modelId="{CAFDA7F7-B46C-4359-A129-AB4E2CE5A598}" type="pres">
       <dgm:prSet presAssocID="{DD3CB5CF-4595-4EEC-846B-6102664F2F05}" presName="connectorText" presStyleLbl="sibTrans2D1" presStyleIdx="3" presStyleCnt="5"/>
       <dgm:spPr/>
+      <dgm:t>
+        <a:bodyPr/>
+        <a:lstStyle/>
+        <a:p>
+          <a:endParaRPr lang="de-DE"/>
+        </a:p>
+      </dgm:t>
     </dgm:pt>
     <dgm:pt modelId="{FAC03DC4-EE0B-4F48-810D-D7D90D29CDA7}" type="pres">
       <dgm:prSet presAssocID="{BA46942A-95B1-4525-A038-6C19F1DA6537}" presName="node" presStyleLbl="node1" presStyleIdx="4" presStyleCnt="6" custScaleY="77420" custLinFactNeighborX="-3684" custLinFactNeighborY="-26565">
@@ -2666,10 +2788,24 @@
     <dgm:pt modelId="{B11A5A4A-6892-4B2E-B725-ECE29BCF5F77}" type="pres">
       <dgm:prSet presAssocID="{7762B7C6-4F36-4B61-B445-F6FF0509CF25}" presName="sibTrans" presStyleLbl="sibTrans2D1" presStyleIdx="4" presStyleCnt="5"/>
       <dgm:spPr/>
+      <dgm:t>
+        <a:bodyPr/>
+        <a:lstStyle/>
+        <a:p>
+          <a:endParaRPr lang="de-DE"/>
+        </a:p>
+      </dgm:t>
     </dgm:pt>
     <dgm:pt modelId="{4CD77A7A-0F40-4ABE-A7EB-ED19FB09158A}" type="pres">
       <dgm:prSet presAssocID="{7762B7C6-4F36-4B61-B445-F6FF0509CF25}" presName="connectorText" presStyleLbl="sibTrans2D1" presStyleIdx="4" presStyleCnt="5"/>
       <dgm:spPr/>
+      <dgm:t>
+        <a:bodyPr/>
+        <a:lstStyle/>
+        <a:p>
+          <a:endParaRPr lang="de-DE"/>
+        </a:p>
+      </dgm:t>
     </dgm:pt>
     <dgm:pt modelId="{25B326A3-A87D-4B61-8CBD-2F11BDEA96BC}" type="pres">
       <dgm:prSet presAssocID="{685F4625-0840-46FA-B858-0C8623E3CC8D}" presName="node" presStyleLbl="node1" presStyleIdx="5" presStyleCnt="6" custScaleY="75395" custLinFactNeighborX="-335" custLinFactNeighborY="-27578">
@@ -2678,32 +2814,39 @@
         </dgm:presLayoutVars>
       </dgm:prSet>
       <dgm:spPr/>
+      <dgm:t>
+        <a:bodyPr/>
+        <a:lstStyle/>
+        <a:p>
+          <a:endParaRPr lang="de-DE"/>
+        </a:p>
+      </dgm:t>
     </dgm:pt>
   </dgm:ptLst>
   <dgm:cxnLst>
-    <dgm:cxn modelId="{F8FCC4ED-399C-4EBC-8501-E7E94B934A37}" srcId="{F6E47ECC-1CC7-4BF8-A40F-F7C26A4BFA09}" destId="{7D600DAC-9587-44B5-AA91-D1DB1E8AF259}" srcOrd="3" destOrd="0" parTransId="{C6630763-DE36-4591-8A63-8451E61C4B79}" sibTransId="{DD3CB5CF-4595-4EEC-846B-6102664F2F05}"/>
     <dgm:cxn modelId="{BF074302-ADFE-4998-83F4-B5B8D4077EC4}" srcId="{F6E47ECC-1CC7-4BF8-A40F-F7C26A4BFA09}" destId="{685F4625-0840-46FA-B858-0C8623E3CC8D}" srcOrd="5" destOrd="0" parTransId="{7D57000E-778C-4CFD-B686-F2117CC1C858}" sibTransId="{067EF79F-A2B5-4E85-B591-BE8A5BA165D0}"/>
-    <dgm:cxn modelId="{5D1DC38D-36E9-4345-9BDA-5F37D04D90AB}" type="presOf" srcId="{FE6047D0-FF2D-42A2-B389-DB220F2BDF26}" destId="{87601AF7-0F9F-46ED-B4EE-1B62860D4BA5}" srcOrd="0" destOrd="0" presId="urn:microsoft.com/office/officeart/2005/8/layout/process5"/>
-    <dgm:cxn modelId="{D877C6B4-A0E6-4AC1-AF28-FDA315E921DB}" type="presOf" srcId="{FE6047D0-FF2D-42A2-B389-DB220F2BDF26}" destId="{8EE4ED0A-418E-4458-84B0-1C7F6B4889D0}" srcOrd="1" destOrd="0" presId="urn:microsoft.com/office/officeart/2005/8/layout/process5"/>
+    <dgm:cxn modelId="{122B0E85-1F4F-4FBF-88BC-60F4A6515555}" type="presOf" srcId="{D9C1DE2A-C919-439D-83D8-65D74A775FB6}" destId="{F750DCCB-0DB3-4943-9436-F897320A4A5D}" srcOrd="0" destOrd="0" presId="urn:microsoft.com/office/officeart/2005/8/layout/process5"/>
+    <dgm:cxn modelId="{EB029169-2D09-4502-A4F8-18C1302FF6FA}" type="presOf" srcId="{AF275174-F4D7-4107-9340-9F31FFAE84C6}" destId="{B064BFA8-682D-4757-ADFC-2CABBAA0A8B1}" srcOrd="1" destOrd="0" presId="urn:microsoft.com/office/officeart/2005/8/layout/process5"/>
+    <dgm:cxn modelId="{F1B9939C-663B-47F3-A7C2-D59B6CD8ABAD}" type="presOf" srcId="{0A5440AC-4116-4C27-9264-16AACB669E12}" destId="{07284E07-4408-4BF2-9E53-8B0D5A353C3A}" srcOrd="0" destOrd="0" presId="urn:microsoft.com/office/officeart/2005/8/layout/process5"/>
+    <dgm:cxn modelId="{C5AF9FAD-37EE-43C3-A9CC-1DE309D0D09C}" type="presOf" srcId="{BA46942A-95B1-4525-A038-6C19F1DA6537}" destId="{FAC03DC4-EE0B-4F48-810D-D7D90D29CDA7}" srcOrd="0" destOrd="0" presId="urn:microsoft.com/office/officeart/2005/8/layout/process5"/>
+    <dgm:cxn modelId="{562BB721-6EDC-4053-B596-0A411EFAF9D6}" type="presOf" srcId="{F6E47ECC-1CC7-4BF8-A40F-F7C26A4BFA09}" destId="{B40BC887-7121-4751-9ED6-13E8470945BB}" srcOrd="0" destOrd="0" presId="urn:microsoft.com/office/officeart/2005/8/layout/process5"/>
     <dgm:cxn modelId="{6BBD4478-0FC8-4791-837D-3B86DC444DFA}" srcId="{F6E47ECC-1CC7-4BF8-A40F-F7C26A4BFA09}" destId="{D9C1DE2A-C919-439D-83D8-65D74A775FB6}" srcOrd="0" destOrd="0" parTransId="{24F33364-C041-4A46-9A2C-3365A4B35E4A}" sibTransId="{0A5440AC-4116-4C27-9264-16AACB669E12}"/>
-    <dgm:cxn modelId="{47CCF4E1-A68F-439A-BB94-DD05FAF1E159}" srcId="{F6E47ECC-1CC7-4BF8-A40F-F7C26A4BFA09}" destId="{BA46942A-95B1-4525-A038-6C19F1DA6537}" srcOrd="4" destOrd="0" parTransId="{F92269B3-4B49-4BEA-BE93-2AC05ED4A544}" sibTransId="{7762B7C6-4F36-4B61-B445-F6FF0509CF25}"/>
-    <dgm:cxn modelId="{A9D5091A-B7FB-49D9-9E39-33E16E32D6E5}" srcId="{F6E47ECC-1CC7-4BF8-A40F-F7C26A4BFA09}" destId="{6883C271-93CE-4F53-B3DB-E78414E06855}" srcOrd="1" destOrd="0" parTransId="{64D99E33-9629-4119-A130-DF85747D2256}" sibTransId="{FE6047D0-FF2D-42A2-B389-DB220F2BDF26}"/>
-    <dgm:cxn modelId="{2D69BF81-3E5F-4B08-8400-18604264860E}" type="presOf" srcId="{7762B7C6-4F36-4B61-B445-F6FF0509CF25}" destId="{4CD77A7A-0F40-4ABE-A7EB-ED19FB09158A}" srcOrd="1" destOrd="0" presId="urn:microsoft.com/office/officeart/2005/8/layout/process5"/>
     <dgm:cxn modelId="{1B9E96C9-9538-4A4B-916B-D10B947B15ED}" type="presOf" srcId="{685F4625-0840-46FA-B858-0C8623E3CC8D}" destId="{25B326A3-A87D-4B61-8CBD-2F11BDEA96BC}" srcOrd="0" destOrd="0" presId="urn:microsoft.com/office/officeart/2005/8/layout/process5"/>
     <dgm:cxn modelId="{1B4527FB-7E8B-4D52-83EC-FCCF26383C20}" type="presOf" srcId="{7D600DAC-9587-44B5-AA91-D1DB1E8AF259}" destId="{0C959095-7882-4471-98AD-EDED72A06E2D}" srcOrd="0" destOrd="0" presId="urn:microsoft.com/office/officeart/2005/8/layout/process5"/>
     <dgm:cxn modelId="{574CD3E9-96D9-455C-8E2F-35597C85EA16}" type="presOf" srcId="{D2E27AEE-DE18-437E-8ED4-085C407B02F4}" destId="{3ECB9AC3-8324-4FBC-8785-044F1DD81182}" srcOrd="0" destOrd="0" presId="urn:microsoft.com/office/officeart/2005/8/layout/process5"/>
-    <dgm:cxn modelId="{EB029169-2D09-4502-A4F8-18C1302FF6FA}" type="presOf" srcId="{AF275174-F4D7-4107-9340-9F31FFAE84C6}" destId="{B064BFA8-682D-4757-ADFC-2CABBAA0A8B1}" srcOrd="1" destOrd="0" presId="urn:microsoft.com/office/officeart/2005/8/layout/process5"/>
-    <dgm:cxn modelId="{122B0E85-1F4F-4FBF-88BC-60F4A6515555}" type="presOf" srcId="{D9C1DE2A-C919-439D-83D8-65D74A775FB6}" destId="{F750DCCB-0DB3-4943-9436-F897320A4A5D}" srcOrd="0" destOrd="0" presId="urn:microsoft.com/office/officeart/2005/8/layout/process5"/>
+    <dgm:cxn modelId="{F128F62D-D92C-4CC8-B306-60C9D8EEAB3A}" type="presOf" srcId="{0A5440AC-4116-4C27-9264-16AACB669E12}" destId="{F8FFB6C0-E03E-4022-8398-9AFF5BF916E4}" srcOrd="1" destOrd="0" presId="urn:microsoft.com/office/officeart/2005/8/layout/process5"/>
+    <dgm:cxn modelId="{2D69BF81-3E5F-4B08-8400-18604264860E}" type="presOf" srcId="{7762B7C6-4F36-4B61-B445-F6FF0509CF25}" destId="{4CD77A7A-0F40-4ABE-A7EB-ED19FB09158A}" srcOrd="1" destOrd="0" presId="urn:microsoft.com/office/officeart/2005/8/layout/process5"/>
+    <dgm:cxn modelId="{A1CD72F6-11A0-4594-87FC-291C4A70D512}" type="presOf" srcId="{7762B7C6-4F36-4B61-B445-F6FF0509CF25}" destId="{B11A5A4A-6892-4B2E-B725-ECE29BCF5F77}" srcOrd="0" destOrd="0" presId="urn:microsoft.com/office/officeart/2005/8/layout/process5"/>
+    <dgm:cxn modelId="{A9D5091A-B7FB-49D9-9E39-33E16E32D6E5}" srcId="{F6E47ECC-1CC7-4BF8-A40F-F7C26A4BFA09}" destId="{6883C271-93CE-4F53-B3DB-E78414E06855}" srcOrd="1" destOrd="0" parTransId="{64D99E33-9629-4119-A130-DF85747D2256}" sibTransId="{FE6047D0-FF2D-42A2-B389-DB220F2BDF26}"/>
+    <dgm:cxn modelId="{5D1DC38D-36E9-4345-9BDA-5F37D04D90AB}" type="presOf" srcId="{FE6047D0-FF2D-42A2-B389-DB220F2BDF26}" destId="{87601AF7-0F9F-46ED-B4EE-1B62860D4BA5}" srcOrd="0" destOrd="0" presId="urn:microsoft.com/office/officeart/2005/8/layout/process5"/>
+    <dgm:cxn modelId="{47CCF4E1-A68F-439A-BB94-DD05FAF1E159}" srcId="{F6E47ECC-1CC7-4BF8-A40F-F7C26A4BFA09}" destId="{BA46942A-95B1-4525-A038-6C19F1DA6537}" srcOrd="4" destOrd="0" parTransId="{F92269B3-4B49-4BEA-BE93-2AC05ED4A544}" sibTransId="{7762B7C6-4F36-4B61-B445-F6FF0509CF25}"/>
+    <dgm:cxn modelId="{26DB8064-CA9A-49BF-B110-4A1EB040AF44}" srcId="{F6E47ECC-1CC7-4BF8-A40F-F7C26A4BFA09}" destId="{D2E27AEE-DE18-437E-8ED4-085C407B02F4}" srcOrd="2" destOrd="0" parTransId="{6C0F99BB-1AE8-491E-9E77-BB81EC71D0A5}" sibTransId="{AF275174-F4D7-4107-9340-9F31FFAE84C6}"/>
     <dgm:cxn modelId="{3452DE59-B5DB-4659-B582-F21A0FA1069E}" type="presOf" srcId="{6883C271-93CE-4F53-B3DB-E78414E06855}" destId="{EB0F924E-08B8-4496-8F7C-D75A9D314B30}" srcOrd="0" destOrd="0" presId="urn:microsoft.com/office/officeart/2005/8/layout/process5"/>
-    <dgm:cxn modelId="{26DB8064-CA9A-49BF-B110-4A1EB040AF44}" srcId="{F6E47ECC-1CC7-4BF8-A40F-F7C26A4BFA09}" destId="{D2E27AEE-DE18-437E-8ED4-085C407B02F4}" srcOrd="2" destOrd="0" parTransId="{6C0F99BB-1AE8-491E-9E77-BB81EC71D0A5}" sibTransId="{AF275174-F4D7-4107-9340-9F31FFAE84C6}"/>
-    <dgm:cxn modelId="{A1CD72F6-11A0-4594-87FC-291C4A70D512}" type="presOf" srcId="{7762B7C6-4F36-4B61-B445-F6FF0509CF25}" destId="{B11A5A4A-6892-4B2E-B725-ECE29BCF5F77}" srcOrd="0" destOrd="0" presId="urn:microsoft.com/office/officeart/2005/8/layout/process5"/>
-    <dgm:cxn modelId="{F128F62D-D92C-4CC8-B306-60C9D8EEAB3A}" type="presOf" srcId="{0A5440AC-4116-4C27-9264-16AACB669E12}" destId="{F8FFB6C0-E03E-4022-8398-9AFF5BF916E4}" srcOrd="1" destOrd="0" presId="urn:microsoft.com/office/officeart/2005/8/layout/process5"/>
-    <dgm:cxn modelId="{C5AF9FAD-37EE-43C3-A9CC-1DE309D0D09C}" type="presOf" srcId="{BA46942A-95B1-4525-A038-6C19F1DA6537}" destId="{FAC03DC4-EE0B-4F48-810D-D7D90D29CDA7}" srcOrd="0" destOrd="0" presId="urn:microsoft.com/office/officeart/2005/8/layout/process5"/>
+    <dgm:cxn modelId="{F8FCC4ED-399C-4EBC-8501-E7E94B934A37}" srcId="{F6E47ECC-1CC7-4BF8-A40F-F7C26A4BFA09}" destId="{7D600DAC-9587-44B5-AA91-D1DB1E8AF259}" srcOrd="3" destOrd="0" parTransId="{C6630763-DE36-4591-8A63-8451E61C4B79}" sibTransId="{DD3CB5CF-4595-4EEC-846B-6102664F2F05}"/>
     <dgm:cxn modelId="{74C58CEF-53B4-4388-82CD-0CB7A6CAA27A}" type="presOf" srcId="{DD3CB5CF-4595-4EEC-846B-6102664F2F05}" destId="{C187702E-51EF-4FC5-95AA-90B3C81FA086}" srcOrd="0" destOrd="0" presId="urn:microsoft.com/office/officeart/2005/8/layout/process5"/>
+    <dgm:cxn modelId="{F1423178-391C-4B6B-8F65-8CA9DBD94E60}" type="presOf" srcId="{DD3CB5CF-4595-4EEC-846B-6102664F2F05}" destId="{CAFDA7F7-B46C-4359-A129-AB4E2CE5A598}" srcOrd="1" destOrd="0" presId="urn:microsoft.com/office/officeart/2005/8/layout/process5"/>
     <dgm:cxn modelId="{DFD6F5FA-8A31-42F7-BF3C-456A1F4586B1}" type="presOf" srcId="{AF275174-F4D7-4107-9340-9F31FFAE84C6}" destId="{57D1F035-83D0-404D-822E-A0E9FF1B02F1}" srcOrd="0" destOrd="0" presId="urn:microsoft.com/office/officeart/2005/8/layout/process5"/>
-    <dgm:cxn modelId="{562BB721-6EDC-4053-B596-0A411EFAF9D6}" type="presOf" srcId="{F6E47ECC-1CC7-4BF8-A40F-F7C26A4BFA09}" destId="{B40BC887-7121-4751-9ED6-13E8470945BB}" srcOrd="0" destOrd="0" presId="urn:microsoft.com/office/officeart/2005/8/layout/process5"/>
-    <dgm:cxn modelId="{F1423178-391C-4B6B-8F65-8CA9DBD94E60}" type="presOf" srcId="{DD3CB5CF-4595-4EEC-846B-6102664F2F05}" destId="{CAFDA7F7-B46C-4359-A129-AB4E2CE5A598}" srcOrd="1" destOrd="0" presId="urn:microsoft.com/office/officeart/2005/8/layout/process5"/>
-    <dgm:cxn modelId="{F1B9939C-663B-47F3-A7C2-D59B6CD8ABAD}" type="presOf" srcId="{0A5440AC-4116-4C27-9264-16AACB669E12}" destId="{07284E07-4408-4BF2-9E53-8B0D5A353C3A}" srcOrd="0" destOrd="0" presId="urn:microsoft.com/office/officeart/2005/8/layout/process5"/>
+    <dgm:cxn modelId="{D877C6B4-A0E6-4AC1-AF28-FDA315E921DB}" type="presOf" srcId="{FE6047D0-FF2D-42A2-B389-DB220F2BDF26}" destId="{8EE4ED0A-418E-4458-84B0-1C7F6B4889D0}" srcOrd="1" destOrd="0" presId="urn:microsoft.com/office/officeart/2005/8/layout/process5"/>
     <dgm:cxn modelId="{77C33F04-EC4C-4CB4-9EDE-8EF7E2C47CCA}" type="presParOf" srcId="{B40BC887-7121-4751-9ED6-13E8470945BB}" destId="{F750DCCB-0DB3-4943-9436-F897320A4A5D}" srcOrd="0" destOrd="0" presId="urn:microsoft.com/office/officeart/2005/8/layout/process5"/>
     <dgm:cxn modelId="{24402445-5195-4B9A-B6CD-28CA16B8D05E}" type="presParOf" srcId="{B40BC887-7121-4751-9ED6-13E8470945BB}" destId="{07284E07-4408-4BF2-9E53-8B0D5A353C3A}" srcOrd="1" destOrd="0" presId="urn:microsoft.com/office/officeart/2005/8/layout/process5"/>
     <dgm:cxn modelId="{D8BFFAC4-70EB-44CF-B73B-532597EF203E}" type="presParOf" srcId="{07284E07-4408-4BF2-9E53-8B0D5A353C3A}" destId="{F8FFB6C0-E03E-4022-8398-9AFF5BF916E4}" srcOrd="0" destOrd="0" presId="urn:microsoft.com/office/officeart/2005/8/layout/process5"/>
@@ -2725,14 +2868,14 @@
   <dgm:whole/>
   <dgm:extLst>
     <a:ext uri="http://schemas.microsoft.com/office/drawing/2008/diagram">
-      <dsp:dataModelExt xmlns:dsp="http://schemas.microsoft.com/office/drawing/2008/diagram" xmlns="" relId="rId7" minVer="http://schemas.openxmlformats.org/drawingml/2006/diagram"/>
+      <dsp:dataModelExt xmlns:dsp="http://schemas.microsoft.com/office/drawing/2008/diagram" relId="rId7" minVer="http://schemas.openxmlformats.org/drawingml/2006/diagram"/>
     </a:ext>
   </dgm:extLst>
 </dgm:dataModel>
 </file>
 
 <file path=ppt/diagrams/drawing1.xml><?xml version="1.0" encoding="utf-8"?>
-<dsp:drawing xmlns:dgm="http://schemas.openxmlformats.org/drawingml/2006/diagram" xmlns:a="http://schemas.openxmlformats.org/drawingml/2006/main" xmlns:dsp="http://schemas.microsoft.com/office/drawing/2008/diagram">
+<dsp:drawing xmlns:dgm="http://schemas.openxmlformats.org/drawingml/2006/diagram" xmlns:dsp="http://schemas.microsoft.com/office/drawing/2008/diagram" xmlns:a="http://schemas.openxmlformats.org/drawingml/2006/main">
   <dsp:spTree>
     <dsp:nvGrpSpPr>
       <dsp:cNvPr id="0" name=""/>
@@ -2864,8 +3007,8 @@
         </a:p>
       </dsp:txBody>
       <dsp:txXfrm>
-        <a:off x="2123729" y="-7"/>
-        <a:ext cx="2155945" cy="1079579"/>
+        <a:off x="2176430" y="52694"/>
+        <a:ext cx="2050543" cy="974177"/>
       </dsp:txXfrm>
     </dsp:sp>
     <dsp:sp modelId="{E04CC487-1C5B-45B6-8D5E-C8D4066D0943}">
@@ -3013,8 +3156,8 @@
         </a:p>
       </dsp:txBody>
       <dsp:txXfrm>
-        <a:off x="4355982" y="1224132"/>
-        <a:ext cx="1870494" cy="856972"/>
+        <a:off x="4397816" y="1265966"/>
+        <a:ext cx="1786826" cy="773304"/>
       </dsp:txXfrm>
     </dsp:sp>
     <dsp:sp modelId="{5627CC50-5788-4218-BE49-84D13277FE07}">
@@ -3162,8 +3305,8 @@
         </a:p>
       </dsp:txBody>
       <dsp:txXfrm>
-        <a:off x="4427982" y="2520276"/>
-        <a:ext cx="1696713" cy="856972"/>
+        <a:off x="4469816" y="2562110"/>
+        <a:ext cx="1613045" cy="773304"/>
       </dsp:txXfrm>
     </dsp:sp>
     <dsp:sp modelId="{C2088CE8-813B-404D-9C15-5986F4B492B7}">
@@ -3353,8 +3496,8 @@
         </a:p>
       </dsp:txBody>
       <dsp:txXfrm>
-        <a:off x="2123726" y="3672401"/>
-        <a:ext cx="2244741" cy="1121031"/>
+        <a:off x="2178450" y="3727125"/>
+        <a:ext cx="2135293" cy="1011583"/>
       </dsp:txXfrm>
     </dsp:sp>
     <dsp:sp modelId="{0E8FB463-07BE-482A-BC43-61AF7FD595C1}">
@@ -3502,8 +3645,8 @@
         </a:p>
       </dsp:txBody>
       <dsp:txXfrm>
-        <a:off x="395541" y="2520281"/>
-        <a:ext cx="2053464" cy="856972"/>
+        <a:off x="437375" y="2562115"/>
+        <a:ext cx="1969796" cy="773304"/>
       </dsp:txXfrm>
     </dsp:sp>
     <dsp:sp modelId="{92E93751-1EDC-4F0A-98BC-A5C9AA6C1D5F}">
@@ -3651,8 +3794,8 @@
         </a:p>
       </dsp:txBody>
       <dsp:txXfrm>
-        <a:off x="440328" y="1224137"/>
-        <a:ext cx="1824903" cy="856972"/>
+        <a:off x="482162" y="1265971"/>
+        <a:ext cx="1741235" cy="773304"/>
       </dsp:txXfrm>
     </dsp:sp>
     <dsp:sp modelId="{21E62269-EC77-4B92-819E-7AD572501D51}">
@@ -3722,7 +3865,7 @@
 </file>
 
 <file path=ppt/diagrams/drawing2.xml><?xml version="1.0" encoding="utf-8"?>
-<dsp:drawing xmlns:dgm="http://schemas.openxmlformats.org/drawingml/2006/diagram" xmlns:a="http://schemas.openxmlformats.org/drawingml/2006/main" xmlns:dsp="http://schemas.microsoft.com/office/drawing/2008/diagram">
+<dsp:drawing xmlns:dgm="http://schemas.openxmlformats.org/drawingml/2006/diagram" xmlns:dsp="http://schemas.microsoft.com/office/drawing/2008/diagram" xmlns:a="http://schemas.openxmlformats.org/drawingml/2006/main">
   <dsp:spTree>
     <dsp:nvGrpSpPr>
       <dsp:cNvPr id="0" name=""/>
@@ -3814,8 +3957,8 @@
         </a:p>
       </dsp:txBody>
       <dsp:txXfrm>
-        <a:off x="0" y="144019"/>
-        <a:ext cx="1403185" cy="929912"/>
+        <a:off x="27236" y="171255"/>
+        <a:ext cx="1348713" cy="875440"/>
       </dsp:txXfrm>
     </dsp:sp>
     <dsp:sp modelId="{07284E07-4408-4BF2-9E53-8B0D5A353C3A}">
@@ -3894,9 +4037,9 @@
           <a:endParaRPr lang="de-DE" sz="2000" kern="1200"/>
         </a:p>
       </dsp:txBody>
-      <dsp:txXfrm rot="25898">
-        <a:off x="1712301" y="344958"/>
-        <a:ext cx="744736" cy="548871"/>
+      <dsp:txXfrm>
+        <a:off x="1712303" y="454112"/>
+        <a:ext cx="580075" cy="329323"/>
       </dsp:txXfrm>
     </dsp:sp>
     <dsp:sp modelId="{EB0F924E-08B8-4496-8F7C-D75A9D314B30}">
@@ -3984,8 +4127,8 @@
         </a:p>
       </dsp:txBody>
       <dsp:txXfrm>
-        <a:off x="2808308" y="144019"/>
-        <a:ext cx="2259092" cy="978673"/>
+        <a:off x="2836972" y="172683"/>
+        <a:ext cx="2201764" cy="921345"/>
       </dsp:txXfrm>
     </dsp:sp>
     <dsp:sp modelId="{87601AF7-0F9F-46ED-B4EE-1B62860D4BA5}">
@@ -4064,9 +4207,9 @@
           <a:endParaRPr lang="de-DE" sz="2000" kern="1200"/>
         </a:p>
       </dsp:txBody>
-      <dsp:txXfrm rot="21569511">
-        <a:off x="5299112" y="344371"/>
-        <a:ext cx="558260" cy="548871"/>
+      <dsp:txXfrm>
+        <a:off x="5299115" y="454875"/>
+        <a:ext cx="393599" cy="329323"/>
       </dsp:txXfrm>
     </dsp:sp>
     <dsp:sp modelId="{3ECB9AC3-8324-4FBC-8785-044F1DD81182}">
@@ -4158,8 +4301,8 @@
         </a:p>
       </dsp:txBody>
       <dsp:txXfrm>
-        <a:off x="6120681" y="72006"/>
-        <a:ext cx="2213191" cy="1064350"/>
+        <a:off x="6151855" y="103180"/>
+        <a:ext cx="2150843" cy="1002002"/>
       </dsp:txXfrm>
     </dsp:sp>
     <dsp:sp modelId="{57D1F035-83D0-404D-822E-A0E9FF1B02F1}">
@@ -4238,9 +4381,9 @@
           <a:endParaRPr lang="de-DE" sz="2000" kern="1200"/>
         </a:p>
       </dsp:txBody>
-      <dsp:txXfrm rot="5400000">
-        <a:off x="7070441" y="1148960"/>
-        <a:ext cx="313671" cy="548871"/>
+      <dsp:txXfrm rot="-5400000">
+        <a:off x="7062616" y="1266560"/>
+        <a:ext cx="329323" cy="219570"/>
       </dsp:txXfrm>
     </dsp:sp>
     <dsp:sp modelId="{0C959095-7882-4471-98AD-EDED72A06E2D}">
@@ -4328,8 +4471,8 @@
         </a:p>
       </dsp:txBody>
       <dsp:txXfrm>
-        <a:off x="6120681" y="1728190"/>
-        <a:ext cx="2213191" cy="1066647"/>
+        <a:off x="6151922" y="1759431"/>
+        <a:ext cx="2150709" cy="1004165"/>
       </dsp:txXfrm>
     </dsp:sp>
     <dsp:sp modelId="{C187702E-51EF-4FC5-95AA-90B3C81FA086}">
@@ -4408,9 +4551,9 @@
           <a:endParaRPr lang="de-DE" sz="2500" kern="1200"/>
         </a:p>
       </dsp:txBody>
-      <dsp:txXfrm rot="10821407">
-        <a:off x="5458313" y="1977520"/>
-        <a:ext cx="468079" cy="548871"/>
+      <dsp:txXfrm rot="10800000">
+        <a:off x="5598736" y="2087731"/>
+        <a:ext cx="327655" cy="329323"/>
       </dsp:txXfrm>
     </dsp:sp>
     <dsp:sp modelId="{FAC03DC4-EE0B-4F48-810D-D7D90D29CDA7}">
@@ -4498,8 +4641,8 @@
         </a:p>
       </dsp:txBody>
       <dsp:txXfrm>
-        <a:off x="3024338" y="1728197"/>
-        <a:ext cx="2213191" cy="1028071"/>
+        <a:off x="3054449" y="1758308"/>
+        <a:ext cx="2152969" cy="967849"/>
       </dsp:txXfrm>
     </dsp:sp>
     <dsp:sp modelId="{B11A5A4A-6892-4B2E-B725-ECE29BCF5F77}">
@@ -4578,9 +4721,9 @@
           <a:endParaRPr lang="de-DE" sz="2500" kern="1200"/>
         </a:p>
       </dsp:txBody>
-      <dsp:txXfrm rot="10815290">
-        <a:off x="2415975" y="1961125"/>
-        <a:ext cx="429912" cy="548871"/>
+      <dsp:txXfrm rot="10800000">
+        <a:off x="2544948" y="2071186"/>
+        <a:ext cx="300938" cy="329323"/>
       </dsp:txXfrm>
     </dsp:sp>
     <dsp:sp modelId="{25B326A3-A87D-4B61-8CBD-2F11BDEA96BC}">
@@ -4668,8 +4811,8 @@
         </a:p>
       </dsp:txBody>
       <dsp:txXfrm>
-        <a:off x="0" y="1728190"/>
-        <a:ext cx="2213191" cy="1001181"/>
+        <a:off x="29324" y="1757514"/>
+        <a:ext cx="2154543" cy="942533"/>
       </dsp:txXfrm>
     </dsp:sp>
   </dsp:spTree>
@@ -7936,7 +8079,7 @@
     </p:spTree>
     <p:extLst>
       <p:ext uri="{BB962C8B-B14F-4D97-AF65-F5344CB8AC3E}">
-        <p14:creationId xmlns:p14="http://schemas.microsoft.com/office/powerpoint/2010/main" xmlns="" val="3306506664"/>
+        <p14:creationId xmlns:p14="http://schemas.microsoft.com/office/powerpoint/2010/main" val="3306506664"/>
       </p:ext>
     </p:extLst>
   </p:cSld>
@@ -8512,7 +8655,7 @@
     </p:spTree>
     <p:extLst>
       <p:ext uri="{BB962C8B-B14F-4D97-AF65-F5344CB8AC3E}">
-        <p14:creationId xmlns:p14="http://schemas.microsoft.com/office/powerpoint/2010/main" xmlns="" val="3290858648"/>
+        <p14:creationId xmlns:p14="http://schemas.microsoft.com/office/powerpoint/2010/main" val="3290858648"/>
       </p:ext>
     </p:extLst>
   </p:cSld>
@@ -9474,7 +9617,7 @@
             <a:fld id="{92C156F3-6C7D-4C62-B24F-CEC351458306}" type="slidenum">
               <a:rPr lang="en-GB" smtClean="0"/>
               <a:pPr/>
-              <a:t>11</a:t>
+              <a:t>13</a:t>
             </a:fld>
             <a:endParaRPr lang="en-GB"/>
           </a:p>
@@ -9483,7 +9626,7 @@
     </p:spTree>
     <p:extLst>
       <p:ext uri="{BB962C8B-B14F-4D97-AF65-F5344CB8AC3E}">
-        <p14:creationId xmlns:p14="http://schemas.microsoft.com/office/powerpoint/2010/main" xmlns="" val="3579872104"/>
+        <p14:creationId xmlns:p14="http://schemas.microsoft.com/office/powerpoint/2010/main" val="3579872104"/>
       </p:ext>
     </p:extLst>
   </p:cSld>
@@ -9619,7 +9762,7 @@
     </p:spTree>
     <p:extLst>
       <p:ext uri="{BB962C8B-B14F-4D97-AF65-F5344CB8AC3E}">
-        <p14:creationId xmlns:p14="http://schemas.microsoft.com/office/powerpoint/2010/main" xmlns="" val="4086205857"/>
+        <p14:creationId xmlns:p14="http://schemas.microsoft.com/office/powerpoint/2010/main" val="4086205857"/>
       </p:ext>
     </p:extLst>
   </p:cSld>
@@ -9746,7 +9889,7 @@
             <a:fld id="{92C156F3-6C7D-4C62-B24F-CEC351458306}" type="slidenum">
               <a:rPr lang="en-GB" smtClean="0"/>
               <a:pPr/>
-              <a:t>4</a:t>
+              <a:t>6</a:t>
             </a:fld>
             <a:endParaRPr lang="en-GB"/>
           </a:p>
@@ -9755,7 +9898,7 @@
     </p:spTree>
     <p:extLst>
       <p:ext uri="{BB962C8B-B14F-4D97-AF65-F5344CB8AC3E}">
-        <p14:creationId xmlns:p14="http://schemas.microsoft.com/office/powerpoint/2010/main" xmlns="" val="3979630434"/>
+        <p14:creationId xmlns:p14="http://schemas.microsoft.com/office/powerpoint/2010/main" val="3979630434"/>
       </p:ext>
     </p:extLst>
   </p:cSld>
@@ -9882,7 +10025,7 @@
             <a:fld id="{92C156F3-6C7D-4C62-B24F-CEC351458306}" type="slidenum">
               <a:rPr lang="en-GB" smtClean="0"/>
               <a:pPr/>
-              <a:t>5</a:t>
+              <a:t>7</a:t>
             </a:fld>
             <a:endParaRPr lang="en-GB"/>
           </a:p>
@@ -9891,7 +10034,7 @@
     </p:spTree>
     <p:extLst>
       <p:ext uri="{BB962C8B-B14F-4D97-AF65-F5344CB8AC3E}">
-        <p14:creationId xmlns:p14="http://schemas.microsoft.com/office/powerpoint/2010/main" xmlns="" val="894590783"/>
+        <p14:creationId xmlns:p14="http://schemas.microsoft.com/office/powerpoint/2010/main" val="894590783"/>
       </p:ext>
     </p:extLst>
   </p:cSld>
@@ -10018,7 +10161,7 @@
             <a:fld id="{92C156F3-6C7D-4C62-B24F-CEC351458306}" type="slidenum">
               <a:rPr lang="en-GB" smtClean="0"/>
               <a:pPr/>
-              <a:t>6</a:t>
+              <a:t>8</a:t>
             </a:fld>
             <a:endParaRPr lang="en-GB"/>
           </a:p>
@@ -10027,7 +10170,7 @@
     </p:spTree>
     <p:extLst>
       <p:ext uri="{BB962C8B-B14F-4D97-AF65-F5344CB8AC3E}">
-        <p14:creationId xmlns:p14="http://schemas.microsoft.com/office/powerpoint/2010/main" xmlns="" val="894590783"/>
+        <p14:creationId xmlns:p14="http://schemas.microsoft.com/office/powerpoint/2010/main" val="894590783"/>
       </p:ext>
     </p:extLst>
   </p:cSld>
@@ -10154,7 +10297,7 @@
             <a:fld id="{92C156F3-6C7D-4C62-B24F-CEC351458306}" type="slidenum">
               <a:rPr lang="en-GB" smtClean="0"/>
               <a:pPr/>
-              <a:t>7</a:t>
+              <a:t>9</a:t>
             </a:fld>
             <a:endParaRPr lang="en-GB"/>
           </a:p>
@@ -10163,7 +10306,7 @@
     </p:spTree>
     <p:extLst>
       <p:ext uri="{BB962C8B-B14F-4D97-AF65-F5344CB8AC3E}">
-        <p14:creationId xmlns:p14="http://schemas.microsoft.com/office/powerpoint/2010/main" xmlns="" val="894590783"/>
+        <p14:creationId xmlns:p14="http://schemas.microsoft.com/office/powerpoint/2010/main" val="894590783"/>
       </p:ext>
     </p:extLst>
   </p:cSld>
@@ -10290,7 +10433,7 @@
             <a:fld id="{92C156F3-6C7D-4C62-B24F-CEC351458306}" type="slidenum">
               <a:rPr lang="en-GB" smtClean="0"/>
               <a:pPr/>
-              <a:t>8</a:t>
+              <a:t>10</a:t>
             </a:fld>
             <a:endParaRPr lang="en-GB"/>
           </a:p>
@@ -10299,7 +10442,7 @@
     </p:spTree>
     <p:extLst>
       <p:ext uri="{BB962C8B-B14F-4D97-AF65-F5344CB8AC3E}">
-        <p14:creationId xmlns:p14="http://schemas.microsoft.com/office/powerpoint/2010/main" xmlns="" val="894590783"/>
+        <p14:creationId xmlns:p14="http://schemas.microsoft.com/office/powerpoint/2010/main" val="894590783"/>
       </p:ext>
     </p:extLst>
   </p:cSld>
@@ -10426,7 +10569,7 @@
             <a:fld id="{92C156F3-6C7D-4C62-B24F-CEC351458306}" type="slidenum">
               <a:rPr lang="en-GB" smtClean="0"/>
               <a:pPr/>
-              <a:t>9</a:t>
+              <a:t>11</a:t>
             </a:fld>
             <a:endParaRPr lang="en-GB"/>
           </a:p>
@@ -10435,7 +10578,7 @@
     </p:spTree>
     <p:extLst>
       <p:ext uri="{BB962C8B-B14F-4D97-AF65-F5344CB8AC3E}">
-        <p14:creationId xmlns:p14="http://schemas.microsoft.com/office/powerpoint/2010/main" xmlns="" val="894590783"/>
+        <p14:creationId xmlns:p14="http://schemas.microsoft.com/office/powerpoint/2010/main" val="894590783"/>
       </p:ext>
     </p:extLst>
   </p:cSld>
@@ -10562,7 +10705,7 @@
             <a:fld id="{92C156F3-6C7D-4C62-B24F-CEC351458306}" type="slidenum">
               <a:rPr lang="en-GB" smtClean="0"/>
               <a:pPr/>
-              <a:t>10</a:t>
+              <a:t>12</a:t>
             </a:fld>
             <a:endParaRPr lang="en-GB"/>
           </a:p>
@@ -10571,7 +10714,7 @@
     </p:spTree>
     <p:extLst>
       <p:ext uri="{BB962C8B-B14F-4D97-AF65-F5344CB8AC3E}">
-        <p14:creationId xmlns:p14="http://schemas.microsoft.com/office/powerpoint/2010/main" xmlns="" val="1472061649"/>
+        <p14:creationId xmlns:p14="http://schemas.microsoft.com/office/powerpoint/2010/main" val="1472061649"/>
       </p:ext>
     </p:extLst>
   </p:cSld>
@@ -15117,7 +15260,7 @@
                 <a:buFont typeface="Arial" pitchFamily="34" charset="0"/>
                 <a:buNone/>
               </a:pPr>
-              <a:t>27. Februar 2019</a:t>
+              <a:t>28. Februar 2019</a:t>
             </a:fld>
             <a:r>
               <a:rPr kumimoji="0" lang="en-US" sz="1100" b="0" i="0" u="none" strike="noStrike" kern="1200" cap="none" spc="0" normalizeH="0" baseline="0" noProof="0" dirty="0">
@@ -15919,10 +16062,295 @@
     <a:masterClrMapping/>
   </p:clrMapOvr>
   <p:transition/>
+  <p:timing>
+    <p:tnLst>
+      <p:par>
+        <p:cTn id="1" dur="indefinite" restart="never" nodeType="tmRoot"/>
+      </p:par>
+    </p:tnLst>
+  </p:timing>
 </p:sld>
 </file>
 
 <file path=ppt/slides/slide10.xml><?xml version="1.0" encoding="utf-8"?>
+<p:sld xmlns:a="http://schemas.openxmlformats.org/drawingml/2006/main" xmlns:r="http://schemas.openxmlformats.org/officeDocument/2006/relationships" xmlns:p="http://schemas.openxmlformats.org/presentationml/2006/main">
+  <p:cSld>
+    <p:spTree>
+      <p:nvGrpSpPr>
+        <p:cNvPr id="1" name=""/>
+        <p:cNvGrpSpPr/>
+        <p:nvPr/>
+      </p:nvGrpSpPr>
+      <p:grpSpPr>
+        <a:xfrm>
+          <a:off x="0" y="0"/>
+          <a:ext cx="0" cy="0"/>
+          <a:chOff x="0" y="0"/>
+          <a:chExt cx="0" cy="0"/>
+        </a:xfrm>
+      </p:grpSpPr>
+      <p:sp>
+        <p:nvSpPr>
+          <p:cNvPr id="1048608" name="Titel 1"/>
+          <p:cNvSpPr>
+            <a:spLocks noGrp="1"/>
+          </p:cNvSpPr>
+          <p:nvPr>
+            <p:ph type="title"/>
+          </p:nvPr>
+        </p:nvSpPr>
+        <p:spPr/>
+        <p:txBody>
+          <a:bodyPr/>
+          <a:lstStyle/>
+          <a:p>
+            <a:r>
+              <a:rPr lang="de-DE" altLang="zh-CN" dirty="0" smtClean="0"/>
+              <a:t>Fahrmodus 1: Hinderniserkennung und Spurwechsel („</a:t>
+            </a:r>
+            <a:r>
+              <a:rPr lang="de-DE" altLang="zh-CN" dirty="0" err="1" smtClean="0"/>
+              <a:t>drive</a:t>
+            </a:r>
+            <a:r>
+              <a:rPr lang="de-DE" altLang="zh-CN" dirty="0" smtClean="0"/>
+              <a:t> </a:t>
+            </a:r>
+            <a:r>
+              <a:rPr lang="de-DE" altLang="zh-CN" dirty="0" err="1" smtClean="0"/>
+              <a:t>mode</a:t>
+            </a:r>
+            <a:r>
+              <a:rPr lang="de-DE" altLang="zh-CN" dirty="0" smtClean="0"/>
+              <a:t>“)</a:t>
+            </a:r>
+          </a:p>
+        </p:txBody>
+      </p:sp>
+      <p:sp>
+        <p:nvSpPr>
+          <p:cNvPr id="1048609" name="Inhaltsplatzhalter 2"/>
+          <p:cNvSpPr>
+            <a:spLocks noGrp="1"/>
+          </p:cNvSpPr>
+          <p:nvPr>
+            <p:ph idx="1"/>
+          </p:nvPr>
+        </p:nvSpPr>
+        <p:spPr>
+          <a:xfrm>
+            <a:off x="323725" y="1484784"/>
+            <a:ext cx="6408515" cy="4968875"/>
+          </a:xfrm>
+        </p:spPr>
+        <p:txBody>
+          <a:bodyPr/>
+          <a:lstStyle/>
+          <a:p>
+            <a:r>
+              <a:rPr lang="de-DE" altLang="zh-CN" dirty="0" smtClean="0"/>
+              <a:t>Konstante Fahrgeschwindigkeit</a:t>
+            </a:r>
+          </a:p>
+          <a:p>
+            <a:r>
+              <a:rPr lang="de-DE" altLang="zh-CN" dirty="0" smtClean="0"/>
+              <a:t>Fahrzeugposition wird durch den PD-Regler geregelt</a:t>
+            </a:r>
+          </a:p>
+          <a:p>
+            <a:r>
+              <a:rPr lang="de-DE" altLang="zh-CN" dirty="0" smtClean="0"/>
+              <a:t>Bezugspunkt der Regelung ist die jeweils äußere Markierung der aktuellen Fahrspur (grüne Linie)</a:t>
+            </a:r>
+          </a:p>
+          <a:p>
+            <a:r>
+              <a:rPr lang="de-DE" altLang="zh-CN" dirty="0" smtClean="0"/>
+              <a:t>Hinderniserkennung läuft permanent</a:t>
+            </a:r>
+          </a:p>
+        </p:txBody>
+      </p:sp>
+      <p:graphicFrame>
+        <p:nvGraphicFramePr>
+          <p:cNvPr id="5" name="Diagramm 4"/>
+          <p:cNvGraphicFramePr/>
+          <p:nvPr/>
+        </p:nvGraphicFramePr>
+        <p:xfrm>
+          <a:off x="395536" y="3284984"/>
+          <a:ext cx="8424936" cy="3240360"/>
+        </p:xfrm>
+        <a:graphic>
+          <a:graphicData uri="http://schemas.openxmlformats.org/drawingml/2006/diagram">
+            <dgm:relIds xmlns:dgm="http://schemas.openxmlformats.org/drawingml/2006/diagram" xmlns:r="http://schemas.openxmlformats.org/officeDocument/2006/relationships" r:dm="rId3" r:lo="rId4" r:qs="rId5" r:cs="rId6"/>
+          </a:graphicData>
+        </a:graphic>
+      </p:graphicFrame>
+      <p:pic>
+        <p:nvPicPr>
+          <p:cNvPr id="7" name="Picture 6" descr="D:\OneDrive\Uni\Projektseminar AUDO\Präsentationen\obstacle_bw.png"/>
+          <p:cNvPicPr>
+            <a:picLocks noChangeAspect="1" noChangeArrowheads="1"/>
+          </p:cNvPicPr>
+          <p:nvPr/>
+        </p:nvPicPr>
+        <p:blipFill>
+          <a:blip r:embed="rId8" cstate="print"/>
+          <a:srcRect t="9909" r="4685"/>
+          <a:stretch>
+            <a:fillRect/>
+          </a:stretch>
+        </p:blipFill>
+        <p:spPr bwMode="auto">
+          <a:xfrm>
+            <a:off x="7020272" y="1628800"/>
+            <a:ext cx="1440160" cy="1501845"/>
+          </a:xfrm>
+          <a:prstGeom prst="rect">
+            <a:avLst/>
+          </a:prstGeom>
+          <a:noFill/>
+        </p:spPr>
+      </p:pic>
+    </p:spTree>
+  </p:cSld>
+  <p:clrMapOvr>
+    <a:masterClrMapping/>
+  </p:clrMapOvr>
+  <p:timing>
+    <p:tnLst>
+      <p:par>
+        <p:cTn id="1" dur="indefinite" restart="never" nodeType="tmRoot"/>
+      </p:par>
+    </p:tnLst>
+  </p:timing>
+</p:sld>
+</file>
+
+<file path=ppt/slides/slide11.xml><?xml version="1.0" encoding="utf-8"?>
+<p:sld xmlns:a="http://schemas.openxmlformats.org/drawingml/2006/main" xmlns:r="http://schemas.openxmlformats.org/officeDocument/2006/relationships" xmlns:p="http://schemas.openxmlformats.org/presentationml/2006/main">
+  <p:cSld>
+    <p:spTree>
+      <p:nvGrpSpPr>
+        <p:cNvPr id="1" name=""/>
+        <p:cNvGrpSpPr/>
+        <p:nvPr/>
+      </p:nvGrpSpPr>
+      <p:grpSpPr>
+        <a:xfrm>
+          <a:off x="0" y="0"/>
+          <a:ext cx="0" cy="0"/>
+          <a:chOff x="0" y="0"/>
+          <a:chExt cx="0" cy="0"/>
+        </a:xfrm>
+      </p:grpSpPr>
+      <p:sp>
+        <p:nvSpPr>
+          <p:cNvPr id="1048608" name="Titel 1"/>
+          <p:cNvSpPr>
+            <a:spLocks noGrp="1"/>
+          </p:cNvSpPr>
+          <p:nvPr>
+            <p:ph type="title"/>
+          </p:nvPr>
+        </p:nvSpPr>
+        <p:spPr/>
+        <p:txBody>
+          <a:bodyPr/>
+          <a:lstStyle/>
+          <a:p>
+            <a:r>
+              <a:rPr lang="de-DE" altLang="zh-CN" dirty="0" smtClean="0"/>
+              <a:t>Fahrmodus 2: optimierte Geschwindigkeit („</a:t>
+            </a:r>
+            <a:r>
+              <a:rPr lang="de-DE" altLang="zh-CN" dirty="0" err="1" smtClean="0"/>
+              <a:t>race</a:t>
+            </a:r>
+            <a:r>
+              <a:rPr lang="de-DE" altLang="zh-CN" dirty="0" smtClean="0"/>
+              <a:t> </a:t>
+            </a:r>
+            <a:r>
+              <a:rPr lang="de-DE" altLang="zh-CN" dirty="0" err="1" smtClean="0"/>
+              <a:t>mode</a:t>
+            </a:r>
+            <a:r>
+              <a:rPr lang="de-DE" altLang="zh-CN" dirty="0" smtClean="0"/>
+              <a:t>“)</a:t>
+            </a:r>
+          </a:p>
+        </p:txBody>
+      </p:sp>
+      <p:sp>
+        <p:nvSpPr>
+          <p:cNvPr id="1048609" name="Inhaltsplatzhalter 2"/>
+          <p:cNvSpPr>
+            <a:spLocks noGrp="1"/>
+          </p:cNvSpPr>
+          <p:nvPr>
+            <p:ph idx="1"/>
+          </p:nvPr>
+        </p:nvSpPr>
+        <p:spPr>
+          <a:xfrm>
+            <a:off x="323725" y="1484784"/>
+            <a:ext cx="7128595" cy="4968875"/>
+          </a:xfrm>
+        </p:spPr>
+        <p:txBody>
+          <a:bodyPr/>
+          <a:lstStyle/>
+          <a:p>
+            <a:r>
+              <a:rPr lang="de-DE" altLang="zh-CN" dirty="0" smtClean="0"/>
+              <a:t>Dynamische Geschwindigkeitsanpassung in Abhängigkeit der Fahrsituation</a:t>
+            </a:r>
+          </a:p>
+          <a:p>
+            <a:r>
+              <a:rPr lang="de-DE" altLang="zh-CN" dirty="0" smtClean="0"/>
+              <a:t>Fahrzeugposition wird durch den PD-Regler geregelt</a:t>
+            </a:r>
+          </a:p>
+          <a:p>
+            <a:r>
+              <a:rPr lang="de-DE" altLang="zh-CN" dirty="0" smtClean="0"/>
+              <a:t>Bezugspunkt der Regelung ist immer die äußere Markierung der Rennstrecke</a:t>
+            </a:r>
+          </a:p>
+          <a:p>
+            <a:r>
+              <a:rPr lang="de-DE" altLang="zh-CN" dirty="0" smtClean="0"/>
+              <a:t>Abstand zum Fahrbahnrand vergrößert</a:t>
+            </a:r>
+          </a:p>
+          <a:p>
+            <a:r>
+              <a:rPr lang="de-DE" altLang="zh-CN" dirty="0" smtClean="0"/>
+              <a:t>Hinderniserkennung ist deaktiviert</a:t>
+            </a:r>
+          </a:p>
+        </p:txBody>
+      </p:sp>
+    </p:spTree>
+  </p:cSld>
+  <p:clrMapOvr>
+    <a:masterClrMapping/>
+  </p:clrMapOvr>
+  <p:timing>
+    <p:tnLst>
+      <p:par>
+        <p:cTn id="1" dur="indefinite" restart="never" nodeType="tmRoot"/>
+      </p:par>
+    </p:tnLst>
+  </p:timing>
+</p:sld>
+</file>
+
+<file path=ppt/slides/slide12.xml><?xml version="1.0" encoding="utf-8"?>
 <p:sld xmlns:a="http://schemas.openxmlformats.org/drawingml/2006/main" xmlns:r="http://schemas.openxmlformats.org/officeDocument/2006/relationships" xmlns:p="http://schemas.openxmlformats.org/presentationml/2006/main">
   <p:cSld>
     <p:spTree>
@@ -15985,10 +16413,17 @@
   <p:clrMapOvr>
     <a:masterClrMapping/>
   </p:clrMapOvr>
+  <p:timing>
+    <p:tnLst>
+      <p:par>
+        <p:cTn id="1" dur="indefinite" restart="never" nodeType="tmRoot"/>
+      </p:par>
+    </p:tnLst>
+  </p:timing>
 </p:sld>
 </file>
 
-<file path=ppt/slides/slide11.xml><?xml version="1.0" encoding="utf-8"?>
+<file path=ppt/slides/slide13.xml><?xml version="1.0" encoding="utf-8"?>
 <p:sld xmlns:a="http://schemas.openxmlformats.org/drawingml/2006/main" xmlns:r="http://schemas.openxmlformats.org/officeDocument/2006/relationships" xmlns:p="http://schemas.openxmlformats.org/presentationml/2006/main">
   <p:cSld>
     <p:spTree>
@@ -16060,6 +16495,101 @@
   <p:clrMapOvr>
     <a:masterClrMapping/>
   </p:clrMapOvr>
+  <p:timing>
+    <p:tnLst>
+      <p:par>
+        <p:cTn id="1" dur="indefinite" restart="never" nodeType="tmRoot"/>
+      </p:par>
+    </p:tnLst>
+  </p:timing>
+</p:sld>
+</file>
+
+<file path=ppt/slides/slide14.xml><?xml version="1.0" encoding="utf-8"?>
+<p:sld xmlns:a="http://schemas.openxmlformats.org/drawingml/2006/main" xmlns:r="http://schemas.openxmlformats.org/officeDocument/2006/relationships" xmlns:p="http://schemas.openxmlformats.org/presentationml/2006/main">
+  <p:cSld>
+    <p:spTree>
+      <p:nvGrpSpPr>
+        <p:cNvPr id="1" name=""/>
+        <p:cNvGrpSpPr/>
+        <p:nvPr/>
+      </p:nvGrpSpPr>
+      <p:grpSpPr>
+        <a:xfrm>
+          <a:off x="0" y="0"/>
+          <a:ext cx="0" cy="0"/>
+          <a:chOff x="0" y="0"/>
+          <a:chExt cx="0" cy="0"/>
+        </a:xfrm>
+      </p:grpSpPr>
+      <p:sp>
+        <p:nvSpPr>
+          <p:cNvPr id="2" name="Titel 1"/>
+          <p:cNvSpPr>
+            <a:spLocks noGrp="1"/>
+          </p:cNvSpPr>
+          <p:nvPr>
+            <p:ph type="title"/>
+          </p:nvPr>
+        </p:nvSpPr>
+        <p:spPr/>
+        <p:txBody>
+          <a:bodyPr/>
+          <a:lstStyle/>
+          <a:p>
+            <a:endParaRPr lang="de-DE"/>
+          </a:p>
+        </p:txBody>
+      </p:sp>
+      <p:sp>
+        <p:nvSpPr>
+          <p:cNvPr id="3" name="Inhaltsplatzhalter 2"/>
+          <p:cNvSpPr>
+            <a:spLocks noGrp="1"/>
+          </p:cNvSpPr>
+          <p:nvPr>
+            <p:ph idx="1"/>
+          </p:nvPr>
+        </p:nvSpPr>
+        <p:spPr/>
+        <p:txBody>
+          <a:bodyPr/>
+          <a:lstStyle/>
+          <a:p>
+            <a:pPr marL="0" indent="0" algn="ctr">
+              <a:buNone/>
+            </a:pPr>
+            <a:endParaRPr lang="de-CH" sz="4800" dirty="0" smtClean="0"/>
+          </a:p>
+          <a:p>
+            <a:pPr marL="0" indent="0" algn="ctr">
+              <a:buNone/>
+            </a:pPr>
+            <a:r>
+              <a:rPr lang="de-CH" sz="4800" dirty="0" smtClean="0"/>
+              <a:t>Vielen Dank für Ihre Aufmerksamkeit</a:t>
+            </a:r>
+            <a:endParaRPr lang="de-DE" sz="4800" dirty="0"/>
+          </a:p>
+        </p:txBody>
+      </p:sp>
+    </p:spTree>
+    <p:extLst>
+      <p:ext uri="{BB962C8B-B14F-4D97-AF65-F5344CB8AC3E}">
+        <p14:creationId xmlns:p14="http://schemas.microsoft.com/office/powerpoint/2010/main" val="412314351"/>
+      </p:ext>
+    </p:extLst>
+  </p:cSld>
+  <p:clrMapOvr>
+    <a:masterClrMapping/>
+  </p:clrMapOvr>
+  <p:timing>
+    <p:tnLst>
+      <p:par>
+        <p:cTn id="1" dur="indefinite" restart="never" nodeType="tmRoot"/>
+      </p:par>
+    </p:tnLst>
+  </p:timing>
 </p:sld>
 </file>
 
@@ -16085,7 +16615,7 @@
           <p:cNvPr id="2" name="Titel 1">
             <a:extLst>
               <a:ext uri="{FF2B5EF4-FFF2-40B4-BE49-F238E27FC236}">
-                <a16:creationId xmlns:a16="http://schemas.microsoft.com/office/drawing/2014/main" xmlns="" id="{24452668-05B8-45C3-9C30-2FC567BF5B34}"/>
+                <a16:creationId xmlns="" xmlns:a16="http://schemas.microsoft.com/office/drawing/2014/main" id="{24452668-05B8-45C3-9C30-2FC567BF5B34}"/>
               </a:ext>
             </a:extLst>
           </p:cNvPr>
@@ -16114,7 +16644,7 @@
           <p:cNvPr id="3" name="Inhaltsplatzhalter 2">
             <a:extLst>
               <a:ext uri="{FF2B5EF4-FFF2-40B4-BE49-F238E27FC236}">
-                <a16:creationId xmlns:a16="http://schemas.microsoft.com/office/drawing/2014/main" xmlns="" id="{6F95FF9C-402A-4AAD-8E88-8EE33D2499FD}"/>
+                <a16:creationId xmlns="" xmlns:a16="http://schemas.microsoft.com/office/drawing/2014/main" id="{6F95FF9C-402A-4AAD-8E88-8EE33D2499FD}"/>
               </a:ext>
             </a:extLst>
           </p:cNvPr>
@@ -16130,92 +16660,446 @@
           <a:bodyPr/>
           <a:lstStyle/>
           <a:p>
-            <a:r>
-              <a:rPr lang="en-GB" sz="2400" dirty="0" smtClean="0"/>
-              <a:t>(die </a:t>
-            </a:r>
-            <a:r>
-              <a:rPr lang="en-GB" sz="2400" dirty="0" err="1" smtClean="0"/>
+            <a:pPr>
+              <a:lnSpc>
+                <a:spcPct val="150000"/>
+              </a:lnSpc>
+            </a:pPr>
+            <a:r>
+              <a:rPr lang="en-GB" dirty="0" smtClean="0"/>
+              <a:t>Organisation</a:t>
+            </a:r>
+          </a:p>
+          <a:p>
+            <a:pPr>
+              <a:lnSpc>
+                <a:spcPct val="150000"/>
+              </a:lnSpc>
+            </a:pPr>
+            <a:r>
+              <a:rPr lang="en-GB" dirty="0" smtClean="0"/>
+              <a:t>Hardware</a:t>
+            </a:r>
+          </a:p>
+          <a:p>
+            <a:pPr>
+              <a:lnSpc>
+                <a:spcPct val="150000"/>
+              </a:lnSpc>
+            </a:pPr>
+            <a:r>
+              <a:rPr lang="en-GB" dirty="0" err="1" smtClean="0"/>
               <a:t>Bildverarbeitung</a:t>
             </a:r>
-            <a:r>
-              <a:rPr lang="en-GB" sz="2400" dirty="0" smtClean="0"/>
+            <a:endParaRPr lang="en-GB" dirty="0" smtClean="0"/>
+          </a:p>
+          <a:p>
+            <a:pPr>
+              <a:lnSpc>
+                <a:spcPct val="150000"/>
+              </a:lnSpc>
+            </a:pPr>
+            <a:r>
+              <a:rPr lang="en-GB" dirty="0" err="1" smtClean="0"/>
+              <a:t>Regelungstechnik</a:t>
+            </a:r>
+            <a:endParaRPr lang="en-GB" dirty="0" smtClean="0"/>
+          </a:p>
+          <a:p>
+            <a:pPr lvl="2">
+              <a:lnSpc>
+                <a:spcPct val="150000"/>
+              </a:lnSpc>
+              <a:buFont typeface="Wingdings" panose="05000000000000000000" pitchFamily="2" charset="2"/>
+              <a:buChar char="§"/>
+            </a:pPr>
+            <a:r>
+              <a:rPr lang="de-DE" altLang="zh-CN" sz="2000" dirty="0"/>
+              <a:t>Hinderniserkennung und </a:t>
+            </a:r>
+            <a:r>
+              <a:rPr lang="de-DE" altLang="zh-CN" sz="2000" dirty="0" smtClean="0"/>
+              <a:t>Spurwechsel</a:t>
+            </a:r>
+          </a:p>
+          <a:p>
+            <a:pPr lvl="2">
+              <a:lnSpc>
+                <a:spcPct val="150000"/>
+              </a:lnSpc>
+              <a:buFont typeface="Wingdings" panose="05000000000000000000" pitchFamily="2" charset="2"/>
+              <a:buChar char="§"/>
+            </a:pPr>
+            <a:r>
+              <a:rPr lang="de-DE" altLang="zh-CN" sz="2000" dirty="0" smtClean="0"/>
+              <a:t>„</a:t>
+            </a:r>
+            <a:r>
+              <a:rPr lang="de-DE" altLang="zh-CN" sz="2000" dirty="0" err="1"/>
+              <a:t>race</a:t>
+            </a:r>
+            <a:r>
+              <a:rPr lang="de-DE" altLang="zh-CN" sz="2000" dirty="0"/>
               <a:t> </a:t>
             </a:r>
             <a:r>
-              <a:rPr lang="en-GB" sz="2400" dirty="0" err="1" smtClean="0"/>
-              <a:t>sollte</a:t>
-            </a:r>
-            <a:r>
-              <a:rPr lang="en-GB" sz="2400" dirty="0" smtClean="0"/>
-              <a:t> </a:t>
-            </a:r>
-            <a:r>
-              <a:rPr lang="en-GB" sz="2400" dirty="0" err="1" smtClean="0"/>
-              <a:t>vor</a:t>
-            </a:r>
-            <a:r>
-              <a:rPr lang="en-GB" sz="2400" dirty="0" smtClean="0"/>
-              <a:t> </a:t>
-            </a:r>
-            <a:r>
-              <a:rPr lang="en-GB" sz="2400" dirty="0" err="1" smtClean="0"/>
-              <a:t>der</a:t>
-            </a:r>
-            <a:r>
-              <a:rPr lang="en-GB" sz="2400" dirty="0" smtClean="0"/>
-              <a:t> </a:t>
-            </a:r>
-            <a:r>
-              <a:rPr lang="en-GB" sz="2400" dirty="0" err="1" smtClean="0"/>
-              <a:t>Regelungstechnik</a:t>
-            </a:r>
-            <a:r>
-              <a:rPr lang="en-GB" sz="2400" dirty="0" smtClean="0"/>
-              <a:t> </a:t>
-            </a:r>
-            <a:r>
-              <a:rPr lang="en-GB" sz="2400" dirty="0" err="1" smtClean="0"/>
-              <a:t>erklärt</a:t>
-            </a:r>
-            <a:r>
-              <a:rPr lang="en-GB" sz="2400" dirty="0" smtClean="0"/>
-              <a:t> </a:t>
-            </a:r>
-            <a:r>
-              <a:rPr lang="en-GB" sz="2400" dirty="0" err="1" smtClean="0"/>
-              <a:t>werden</a:t>
-            </a:r>
-            <a:r>
-              <a:rPr lang="en-GB" sz="2400" dirty="0" smtClean="0"/>
-              <a:t>, </a:t>
-            </a:r>
-            <a:r>
-              <a:rPr lang="en-GB" sz="2400" dirty="0" err="1" smtClean="0"/>
-              <a:t>Anm</a:t>
-            </a:r>
-            <a:r>
-              <a:rPr lang="en-GB" sz="2400" dirty="0" smtClean="0"/>
-              <a:t>. d. Red.)</a:t>
-            </a:r>
-            <a:endParaRPr lang="en-GB" sz="2400" dirty="0"/>
+              <a:rPr lang="de-DE" altLang="zh-CN" sz="2000" dirty="0" err="1" smtClean="0"/>
+              <a:t>mode</a:t>
+            </a:r>
+            <a:r>
+              <a:rPr lang="de-DE" altLang="zh-CN" sz="2000" dirty="0" smtClean="0"/>
+              <a:t>“</a:t>
+            </a:r>
+          </a:p>
+          <a:p>
+            <a:pPr>
+              <a:lnSpc>
+                <a:spcPct val="150000"/>
+              </a:lnSpc>
+            </a:pPr>
+            <a:r>
+              <a:rPr lang="en-GB" dirty="0" err="1" smtClean="0"/>
+              <a:t>Probleme</a:t>
+            </a:r>
+            <a:endParaRPr lang="en-GB" dirty="0" smtClean="0"/>
+          </a:p>
+          <a:p>
+            <a:pPr>
+              <a:lnSpc>
+                <a:spcPct val="150000"/>
+              </a:lnSpc>
+            </a:pPr>
+            <a:r>
+              <a:rPr lang="en-GB" dirty="0" err="1" smtClean="0"/>
+              <a:t>Fazit</a:t>
+            </a:r>
+            <a:r>
+              <a:rPr lang="en-GB" dirty="0" smtClean="0"/>
+              <a:t> und </a:t>
+            </a:r>
+            <a:r>
+              <a:rPr lang="en-GB" dirty="0" err="1" smtClean="0"/>
+              <a:t>Ausblick</a:t>
+            </a:r>
+            <a:endParaRPr lang="en-GB" dirty="0" smtClean="0"/>
           </a:p>
         </p:txBody>
       </p:sp>
     </p:spTree>
     <p:extLst>
       <p:ext uri="{BB962C8B-B14F-4D97-AF65-F5344CB8AC3E}">
-        <p14:creationId xmlns:p14="http://schemas.microsoft.com/office/powerpoint/2010/main" xmlns="" val="2622745934"/>
+        <p14:creationId xmlns:p14="http://schemas.microsoft.com/office/powerpoint/2010/main" val="2622745934"/>
       </p:ext>
     </p:extLst>
   </p:cSld>
   <p:clrMapOvr>
     <a:masterClrMapping/>
   </p:clrMapOvr>
+  <p:timing>
+    <p:tnLst>
+      <p:par>
+        <p:cTn id="1" dur="indefinite" restart="never" nodeType="tmRoot"/>
+      </p:par>
+    </p:tnLst>
+  </p:timing>
 </p:sld>
 </file>
 
 <file path=ppt/slides/slide3.xml><?xml version="1.0" encoding="utf-8"?>
+<p:sld xmlns:a="http://schemas.openxmlformats.org/drawingml/2006/main" xmlns:r="http://schemas.openxmlformats.org/officeDocument/2006/relationships" xmlns:p="http://schemas.openxmlformats.org/presentationml/2006/main">
+  <p:cSld>
+    <p:spTree>
+      <p:nvGrpSpPr>
+        <p:cNvPr id="1" name=""/>
+        <p:cNvGrpSpPr/>
+        <p:nvPr/>
+      </p:nvGrpSpPr>
+      <p:grpSpPr>
+        <a:xfrm>
+          <a:off x="0" y="0"/>
+          <a:ext cx="0" cy="0"/>
+          <a:chOff x="0" y="0"/>
+          <a:chExt cx="0" cy="0"/>
+        </a:xfrm>
+      </p:grpSpPr>
+      <p:sp>
+        <p:nvSpPr>
+          <p:cNvPr id="2" name="Titel 1"/>
+          <p:cNvSpPr>
+            <a:spLocks noGrp="1"/>
+          </p:cNvSpPr>
+          <p:nvPr>
+            <p:ph type="title"/>
+          </p:nvPr>
+        </p:nvSpPr>
+        <p:spPr/>
+        <p:txBody>
+          <a:bodyPr/>
+          <a:lstStyle/>
+          <a:p>
+            <a:r>
+              <a:rPr lang="de-CH" dirty="0" smtClean="0"/>
+              <a:t>Organisation des Teams</a:t>
+            </a:r>
+            <a:endParaRPr lang="de-DE" dirty="0"/>
+          </a:p>
+        </p:txBody>
+      </p:sp>
+      <p:sp>
+        <p:nvSpPr>
+          <p:cNvPr id="3" name="Inhaltsplatzhalter 2"/>
+          <p:cNvSpPr>
+            <a:spLocks noGrp="1"/>
+          </p:cNvSpPr>
+          <p:nvPr>
+            <p:ph idx="1"/>
+          </p:nvPr>
+        </p:nvSpPr>
+        <p:spPr/>
+        <p:txBody>
+          <a:bodyPr/>
+          <a:lstStyle/>
+          <a:p>
+            <a:r>
+              <a:rPr lang="de-CH" dirty="0"/>
+              <a:t>Versionsverwaltung mit </a:t>
+            </a:r>
+            <a:r>
+              <a:rPr lang="de-CH" dirty="0" err="1" smtClean="0"/>
+              <a:t>GitHub</a:t>
+            </a:r>
+            <a:endParaRPr lang="de-CH" dirty="0" smtClean="0"/>
+          </a:p>
+          <a:p>
+            <a:endParaRPr lang="de-CH" dirty="0"/>
+          </a:p>
+          <a:p>
+            <a:r>
+              <a:rPr lang="de-CH" dirty="0" smtClean="0"/>
+              <a:t>Aufgabenverwaltung mit </a:t>
+            </a:r>
+            <a:r>
+              <a:rPr lang="de-CH" dirty="0" err="1" smtClean="0"/>
+              <a:t>Trello</a:t>
+            </a:r>
+            <a:endParaRPr lang="de-CH" dirty="0" smtClean="0"/>
+          </a:p>
+          <a:p>
+            <a:endParaRPr lang="de-CH" dirty="0"/>
+          </a:p>
+        </p:txBody>
+      </p:sp>
+      <p:pic>
+        <p:nvPicPr>
+          <p:cNvPr id="1026" name="Picture 2" descr="C:\Users\blume\Dropbox\Uni\_PSES\AUDO\Dokumente\Bericht\images\Trello.png"/>
+          <p:cNvPicPr>
+            <a:picLocks noChangeAspect="1" noChangeArrowheads="1"/>
+          </p:cNvPicPr>
+          <p:nvPr/>
+        </p:nvPicPr>
+        <p:blipFill>
+          <a:blip r:embed="rId2">
+            <a:extLst>
+              <a:ext uri="{28A0092B-C50C-407E-A947-70E740481C1C}">
+                <a14:useLocalDpi xmlns:a14="http://schemas.microsoft.com/office/drawing/2010/main" val="0"/>
+              </a:ext>
+            </a:extLst>
+          </a:blip>
+          <a:srcRect/>
+          <a:stretch>
+            <a:fillRect/>
+          </a:stretch>
+        </p:blipFill>
+        <p:spPr bwMode="auto">
+          <a:xfrm>
+            <a:off x="539552" y="2774013"/>
+            <a:ext cx="6620172" cy="3501620"/>
+          </a:xfrm>
+          <a:prstGeom prst="rect">
+            <a:avLst/>
+          </a:prstGeom>
+          <a:noFill/>
+          <a:extLst>
+            <a:ext uri="{909E8E84-426E-40DD-AFC4-6F175D3DCCD1}">
+              <a14:hiddenFill xmlns:a14="http://schemas.microsoft.com/office/drawing/2010/main">
+                <a:solidFill>
+                  <a:srgbClr val="FFFFFF"/>
+                </a:solidFill>
+              </a14:hiddenFill>
+            </a:ext>
+          </a:extLst>
+        </p:spPr>
+      </p:pic>
+    </p:spTree>
+    <p:extLst>
+      <p:ext uri="{BB962C8B-B14F-4D97-AF65-F5344CB8AC3E}">
+        <p14:creationId xmlns:p14="http://schemas.microsoft.com/office/powerpoint/2010/main" val="983291378"/>
+      </p:ext>
+    </p:extLst>
+  </p:cSld>
+  <p:clrMapOvr>
+    <a:masterClrMapping/>
+  </p:clrMapOvr>
+  <p:timing>
+    <p:tnLst>
+      <p:par>
+        <p:cTn id="1" dur="indefinite" restart="never" nodeType="tmRoot"/>
+      </p:par>
+    </p:tnLst>
+  </p:timing>
+</p:sld>
+</file>
+
+<file path=ppt/slides/slide4.xml><?xml version="1.0" encoding="utf-8"?>
+<p:sld xmlns:a="http://schemas.openxmlformats.org/drawingml/2006/main" xmlns:r="http://schemas.openxmlformats.org/officeDocument/2006/relationships" xmlns:p="http://schemas.openxmlformats.org/presentationml/2006/main">
+  <p:cSld>
+    <p:spTree>
+      <p:nvGrpSpPr>
+        <p:cNvPr id="1" name=""/>
+        <p:cNvGrpSpPr/>
+        <p:nvPr/>
+      </p:nvGrpSpPr>
+      <p:grpSpPr>
+        <a:xfrm>
+          <a:off x="0" y="0"/>
+          <a:ext cx="0" cy="0"/>
+          <a:chOff x="0" y="0"/>
+          <a:chExt cx="0" cy="0"/>
+        </a:xfrm>
+      </p:grpSpPr>
+      <p:sp>
+        <p:nvSpPr>
+          <p:cNvPr id="2" name="Titel 1"/>
+          <p:cNvSpPr>
+            <a:spLocks noGrp="1"/>
+          </p:cNvSpPr>
+          <p:nvPr>
+            <p:ph type="title"/>
+          </p:nvPr>
+        </p:nvSpPr>
+        <p:spPr/>
+        <p:txBody>
+          <a:bodyPr/>
+          <a:lstStyle/>
+          <a:p>
+            <a:r>
+              <a:rPr lang="de-CH" dirty="0" smtClean="0"/>
+              <a:t>Gruppentreffen</a:t>
+            </a:r>
+            <a:endParaRPr lang="de-DE" dirty="0"/>
+          </a:p>
+        </p:txBody>
+      </p:sp>
+      <p:sp>
+        <p:nvSpPr>
+          <p:cNvPr id="3" name="Inhaltsplatzhalter 2"/>
+          <p:cNvSpPr>
+            <a:spLocks noGrp="1"/>
+          </p:cNvSpPr>
+          <p:nvPr>
+            <p:ph idx="1"/>
+          </p:nvPr>
+        </p:nvSpPr>
+        <p:spPr/>
+        <p:txBody>
+          <a:bodyPr/>
+          <a:lstStyle/>
+          <a:p>
+            <a:r>
+              <a:rPr lang="de-CH" dirty="0" err="1" smtClean="0"/>
+              <a:t>Regelmä</a:t>
+            </a:r>
+            <a:r>
+              <a:rPr lang="de-DE" dirty="0" err="1" smtClean="0"/>
+              <a:t>ßige</a:t>
+            </a:r>
+            <a:r>
+              <a:rPr lang="de-DE" dirty="0" smtClean="0"/>
+              <a:t> </a:t>
+            </a:r>
+            <a:r>
+              <a:rPr lang="de-DE" dirty="0"/>
+              <a:t>wöchentliche </a:t>
+            </a:r>
+            <a:r>
+              <a:rPr lang="de-DE" dirty="0" smtClean="0"/>
+              <a:t>Treffen</a:t>
+            </a:r>
+          </a:p>
+          <a:p>
+            <a:endParaRPr lang="de-CH" dirty="0"/>
+          </a:p>
+          <a:p>
+            <a:r>
+              <a:rPr lang="de-CH" dirty="0" smtClean="0"/>
+              <a:t>Flexible Treffen zur Aufgabenbearbeitung</a:t>
+            </a:r>
+            <a:endParaRPr lang="de-DE" dirty="0"/>
+          </a:p>
+        </p:txBody>
+      </p:sp>
+      <p:pic>
+        <p:nvPicPr>
+          <p:cNvPr id="4" name="Picture 2" descr="C:\Users\blume\Dropbox\Uni\_PSES\AUDO\Dokumente\Bericht\images\Gruppentreffen.jpg"/>
+          <p:cNvPicPr>
+            <a:picLocks noChangeAspect="1" noChangeArrowheads="1"/>
+          </p:cNvPicPr>
+          <p:nvPr/>
+        </p:nvPicPr>
+        <p:blipFill>
+          <a:blip r:embed="rId2" cstate="print">
+            <a:extLst>
+              <a:ext uri="{28A0092B-C50C-407E-A947-70E740481C1C}">
+                <a14:useLocalDpi xmlns:a14="http://schemas.microsoft.com/office/drawing/2010/main" val="0"/>
+              </a:ext>
+            </a:extLst>
+          </a:blip>
+          <a:srcRect/>
+          <a:stretch>
+            <a:fillRect/>
+          </a:stretch>
+        </p:blipFill>
+        <p:spPr bwMode="auto">
+          <a:xfrm>
+            <a:off x="552168" y="2734512"/>
+            <a:ext cx="6227200" cy="3502800"/>
+          </a:xfrm>
+          <a:prstGeom prst="rect">
+            <a:avLst/>
+          </a:prstGeom>
+          <a:noFill/>
+          <a:extLst>
+            <a:ext uri="{909E8E84-426E-40DD-AFC4-6F175D3DCCD1}">
+              <a14:hiddenFill xmlns:a14="http://schemas.microsoft.com/office/drawing/2010/main">
+                <a:solidFill>
+                  <a:srgbClr val="FFFFFF"/>
+                </a:solidFill>
+              </a14:hiddenFill>
+            </a:ext>
+          </a:extLst>
+        </p:spPr>
+      </p:pic>
+    </p:spTree>
+    <p:extLst>
+      <p:ext uri="{BB962C8B-B14F-4D97-AF65-F5344CB8AC3E}">
+        <p14:creationId xmlns:p14="http://schemas.microsoft.com/office/powerpoint/2010/main" val="617314025"/>
+      </p:ext>
+    </p:extLst>
+  </p:cSld>
+  <p:clrMapOvr>
+    <a:masterClrMapping/>
+  </p:clrMapOvr>
+  <p:timing>
+    <p:tnLst>
+      <p:par>
+        <p:cTn id="1" dur="indefinite" restart="never" nodeType="tmRoot"/>
+      </p:par>
+    </p:tnLst>
+  </p:timing>
+</p:sld>
+</file>
+
+<file path=ppt/slides/slide5.xml><?xml version="1.0" encoding="utf-8"?>
 <p:sld xmlns:a="http://schemas.openxmlformats.org/drawingml/2006/main" xmlns:r="http://schemas.openxmlformats.org/officeDocument/2006/relationships" xmlns:p="http://schemas.openxmlformats.org/presentationml/2006/main">
   <p:cSld>
     <p:spTree>
@@ -16347,10 +17231,17 @@
   <p:clrMapOvr>
     <a:masterClrMapping/>
   </p:clrMapOvr>
+  <p:timing>
+    <p:tnLst>
+      <p:par>
+        <p:cTn id="1" dur="indefinite" restart="never" nodeType="tmRoot"/>
+      </p:par>
+    </p:tnLst>
+  </p:timing>
 </p:sld>
 </file>
 
-<file path=ppt/slides/slide4.xml><?xml version="1.0" encoding="utf-8"?>
+<file path=ppt/slides/slide6.xml><?xml version="1.0" encoding="utf-8"?>
 <p:sld xmlns:a="http://schemas.openxmlformats.org/drawingml/2006/main" xmlns:r="http://schemas.openxmlformats.org/officeDocument/2006/relationships" xmlns:p="http://schemas.openxmlformats.org/presentationml/2006/main">
   <p:cSld>
     <p:spTree>
@@ -16422,10 +17313,17 @@
   <p:clrMapOvr>
     <a:masterClrMapping/>
   </p:clrMapOvr>
+  <p:timing>
+    <p:tnLst>
+      <p:par>
+        <p:cTn id="1" dur="indefinite" restart="never" nodeType="tmRoot"/>
+      </p:par>
+    </p:tnLst>
+  </p:timing>
 </p:sld>
 </file>
 
-<file path=ppt/slides/slide5.xml><?xml version="1.0" encoding="utf-8"?>
+<file path=ppt/slides/slide7.xml><?xml version="1.0" encoding="utf-8"?>
 <p:sld xmlns:a="http://schemas.openxmlformats.org/drawingml/2006/main" xmlns:r="http://schemas.openxmlformats.org/officeDocument/2006/relationships" xmlns:p="http://schemas.openxmlformats.org/presentationml/2006/main">
   <p:cSld>
     <p:spTree>
@@ -16630,10 +17528,17 @@
   <p:clrMapOvr>
     <a:masterClrMapping/>
   </p:clrMapOvr>
+  <p:timing>
+    <p:tnLst>
+      <p:par>
+        <p:cTn id="1" dur="indefinite" restart="never" nodeType="tmRoot"/>
+      </p:par>
+    </p:tnLst>
+  </p:timing>
 </p:sld>
 </file>
 
-<file path=ppt/slides/slide6.xml><?xml version="1.0" encoding="utf-8"?>
+<file path=ppt/slides/slide8.xml><?xml version="1.0" encoding="utf-8"?>
 <p:sld xmlns:a="http://schemas.openxmlformats.org/drawingml/2006/main" xmlns:r="http://schemas.openxmlformats.org/officeDocument/2006/relationships" xmlns:p="http://schemas.openxmlformats.org/presentationml/2006/main">
   <p:cSld>
     <p:spTree>
@@ -16785,10 +17690,17 @@
   <p:clrMapOvr>
     <a:masterClrMapping/>
   </p:clrMapOvr>
+  <p:timing>
+    <p:tnLst>
+      <p:par>
+        <p:cTn id="1" dur="indefinite" restart="never" nodeType="tmRoot"/>
+      </p:par>
+    </p:tnLst>
+  </p:timing>
 </p:sld>
 </file>
 
-<file path=ppt/slides/slide7.xml><?xml version="1.0" encoding="utf-8"?>
+<file path=ppt/slides/slide9.xml><?xml version="1.0" encoding="utf-8"?>
 <p:sld xmlns:a="http://schemas.openxmlformats.org/drawingml/2006/main" xmlns:r="http://schemas.openxmlformats.org/officeDocument/2006/relationships" xmlns:p="http://schemas.openxmlformats.org/presentationml/2006/main">
   <p:cSld>
     <p:spTree>
@@ -17099,302 +18011,6 @@
           </a:graphicData>
         </a:graphic>
       </p:graphicFrame>
-    </p:spTree>
-  </p:cSld>
-  <p:clrMapOvr>
-    <a:masterClrMapping/>
-  </p:clrMapOvr>
-  <p:timing>
-    <p:tnLst>
-      <p:par>
-        <p:cTn id="1" dur="indefinite" restart="never" nodeType="tmRoot"/>
-      </p:par>
-    </p:tnLst>
-  </p:timing>
-</p:sld>
-</file>
-
-<file path=ppt/slides/slide8.xml><?xml version="1.0" encoding="utf-8"?>
-<p:sld xmlns:a="http://schemas.openxmlformats.org/drawingml/2006/main" xmlns:r="http://schemas.openxmlformats.org/officeDocument/2006/relationships" xmlns:p="http://schemas.openxmlformats.org/presentationml/2006/main">
-  <p:cSld>
-    <p:spTree>
-      <p:nvGrpSpPr>
-        <p:cNvPr id="1" name=""/>
-        <p:cNvGrpSpPr/>
-        <p:nvPr/>
-      </p:nvGrpSpPr>
-      <p:grpSpPr>
-        <a:xfrm>
-          <a:off x="0" y="0"/>
-          <a:ext cx="0" cy="0"/>
-          <a:chOff x="0" y="0"/>
-          <a:chExt cx="0" cy="0"/>
-        </a:xfrm>
-      </p:grpSpPr>
-      <p:sp>
-        <p:nvSpPr>
-          <p:cNvPr id="1048608" name="Titel 1"/>
-          <p:cNvSpPr>
-            <a:spLocks noGrp="1"/>
-          </p:cNvSpPr>
-          <p:nvPr>
-            <p:ph type="title"/>
-          </p:nvPr>
-        </p:nvSpPr>
-        <p:spPr/>
-        <p:txBody>
-          <a:bodyPr/>
-          <a:lstStyle/>
-          <a:p>
-            <a:r>
-              <a:rPr lang="de-DE" altLang="zh-CN" dirty="0" smtClean="0"/>
-              <a:t>Fahrmodus 1: Hinderniserkennung und Spurwechsel („</a:t>
-            </a:r>
-            <a:r>
-              <a:rPr lang="de-DE" altLang="zh-CN" dirty="0" err="1" smtClean="0"/>
-              <a:t>drive</a:t>
-            </a:r>
-            <a:r>
-              <a:rPr lang="de-DE" altLang="zh-CN" dirty="0" smtClean="0"/>
-              <a:t> </a:t>
-            </a:r>
-            <a:r>
-              <a:rPr lang="de-DE" altLang="zh-CN" dirty="0" err="1" smtClean="0"/>
-              <a:t>mode</a:t>
-            </a:r>
-            <a:r>
-              <a:rPr lang="de-DE" altLang="zh-CN" dirty="0" smtClean="0"/>
-              <a:t>“)</a:t>
-            </a:r>
-          </a:p>
-        </p:txBody>
-      </p:sp>
-      <p:sp>
-        <p:nvSpPr>
-          <p:cNvPr id="1048609" name="Inhaltsplatzhalter 2"/>
-          <p:cNvSpPr>
-            <a:spLocks noGrp="1"/>
-          </p:cNvSpPr>
-          <p:nvPr>
-            <p:ph idx="1"/>
-          </p:nvPr>
-        </p:nvSpPr>
-        <p:spPr>
-          <a:xfrm>
-            <a:off x="323725" y="1484784"/>
-            <a:ext cx="6408515" cy="4968875"/>
-          </a:xfrm>
-        </p:spPr>
-        <p:txBody>
-          <a:bodyPr/>
-          <a:lstStyle/>
-          <a:p>
-            <a:r>
-              <a:rPr lang="de-DE" altLang="zh-CN" dirty="0" smtClean="0"/>
-              <a:t>Konstante Fahrgeschwindigkeit</a:t>
-            </a:r>
-            <a:endParaRPr lang="de-DE" altLang="zh-CN" dirty="0" smtClean="0"/>
-          </a:p>
-          <a:p>
-            <a:r>
-              <a:rPr lang="de-DE" altLang="zh-CN" dirty="0" smtClean="0"/>
-              <a:t>Fahrzeugposition wird durch den PD-Regler geregelt</a:t>
-            </a:r>
-          </a:p>
-          <a:p>
-            <a:r>
-              <a:rPr lang="de-DE" altLang="zh-CN" dirty="0" smtClean="0"/>
-              <a:t>Bezugspunkt der Regelung ist die jeweils äußere Markierung der aktuellen Fahrspur (grüne Linie)</a:t>
-            </a:r>
-          </a:p>
-          <a:p>
-            <a:r>
-              <a:rPr lang="de-DE" altLang="zh-CN" dirty="0" smtClean="0"/>
-              <a:t>Hinderniserkennung läuft permanent</a:t>
-            </a:r>
-            <a:endParaRPr lang="de-DE" altLang="zh-CN" dirty="0" smtClean="0"/>
-          </a:p>
-        </p:txBody>
-      </p:sp>
-      <p:graphicFrame>
-        <p:nvGraphicFramePr>
-          <p:cNvPr id="5" name="Diagramm 4"/>
-          <p:cNvGraphicFramePr/>
-          <p:nvPr/>
-        </p:nvGraphicFramePr>
-        <p:xfrm>
-          <a:off x="395536" y="3284984"/>
-          <a:ext cx="8424936" cy="3240360"/>
-        </p:xfrm>
-        <a:graphic>
-          <a:graphicData uri="http://schemas.openxmlformats.org/drawingml/2006/diagram">
-            <dgm:relIds xmlns:dgm="http://schemas.openxmlformats.org/drawingml/2006/diagram" xmlns:r="http://schemas.openxmlformats.org/officeDocument/2006/relationships" r:dm="rId3" r:lo="rId4" r:qs="rId5" r:cs="rId6"/>
-          </a:graphicData>
-        </a:graphic>
-      </p:graphicFrame>
-      <p:pic>
-        <p:nvPicPr>
-          <p:cNvPr id="7" name="Picture 6" descr="D:\OneDrive\Uni\Projektseminar AUDO\Präsentationen\obstacle_bw.png"/>
-          <p:cNvPicPr>
-            <a:picLocks noChangeAspect="1" noChangeArrowheads="1"/>
-          </p:cNvPicPr>
-          <p:nvPr/>
-        </p:nvPicPr>
-        <p:blipFill>
-          <a:blip r:embed="rId8" cstate="print"/>
-          <a:srcRect t="9909" r="4685"/>
-          <a:stretch>
-            <a:fillRect/>
-          </a:stretch>
-        </p:blipFill>
-        <p:spPr bwMode="auto">
-          <a:xfrm>
-            <a:off x="7020272" y="1628800"/>
-            <a:ext cx="1440160" cy="1501845"/>
-          </a:xfrm>
-          <a:prstGeom prst="rect">
-            <a:avLst/>
-          </a:prstGeom>
-          <a:noFill/>
-        </p:spPr>
-      </p:pic>
-    </p:spTree>
-  </p:cSld>
-  <p:clrMapOvr>
-    <a:masterClrMapping/>
-  </p:clrMapOvr>
-  <p:timing>
-    <p:tnLst>
-      <p:par>
-        <p:cTn id="1" dur="indefinite" restart="never" nodeType="tmRoot"/>
-      </p:par>
-    </p:tnLst>
-  </p:timing>
-</p:sld>
-</file>
-
-<file path=ppt/slides/slide9.xml><?xml version="1.0" encoding="utf-8"?>
-<p:sld xmlns:a="http://schemas.openxmlformats.org/drawingml/2006/main" xmlns:r="http://schemas.openxmlformats.org/officeDocument/2006/relationships" xmlns:p="http://schemas.openxmlformats.org/presentationml/2006/main">
-  <p:cSld>
-    <p:spTree>
-      <p:nvGrpSpPr>
-        <p:cNvPr id="1" name=""/>
-        <p:cNvGrpSpPr/>
-        <p:nvPr/>
-      </p:nvGrpSpPr>
-      <p:grpSpPr>
-        <a:xfrm>
-          <a:off x="0" y="0"/>
-          <a:ext cx="0" cy="0"/>
-          <a:chOff x="0" y="0"/>
-          <a:chExt cx="0" cy="0"/>
-        </a:xfrm>
-      </p:grpSpPr>
-      <p:sp>
-        <p:nvSpPr>
-          <p:cNvPr id="1048608" name="Titel 1"/>
-          <p:cNvSpPr>
-            <a:spLocks noGrp="1"/>
-          </p:cNvSpPr>
-          <p:nvPr>
-            <p:ph type="title"/>
-          </p:nvPr>
-        </p:nvSpPr>
-        <p:spPr/>
-        <p:txBody>
-          <a:bodyPr/>
-          <a:lstStyle/>
-          <a:p>
-            <a:r>
-              <a:rPr lang="de-DE" altLang="zh-CN" dirty="0" smtClean="0"/>
-              <a:t>Fahrmodus 2: optimierte Geschwindigkeit („</a:t>
-            </a:r>
-            <a:r>
-              <a:rPr lang="de-DE" altLang="zh-CN" dirty="0" err="1" smtClean="0"/>
-              <a:t>race</a:t>
-            </a:r>
-            <a:r>
-              <a:rPr lang="de-DE" altLang="zh-CN" dirty="0" smtClean="0"/>
-              <a:t> </a:t>
-            </a:r>
-            <a:r>
-              <a:rPr lang="de-DE" altLang="zh-CN" dirty="0" err="1" smtClean="0"/>
-              <a:t>mode</a:t>
-            </a:r>
-            <a:r>
-              <a:rPr lang="de-DE" altLang="zh-CN" dirty="0" smtClean="0"/>
-              <a:t>“)</a:t>
-            </a:r>
-          </a:p>
-        </p:txBody>
-      </p:sp>
-      <p:sp>
-        <p:nvSpPr>
-          <p:cNvPr id="1048609" name="Inhaltsplatzhalter 2"/>
-          <p:cNvSpPr>
-            <a:spLocks noGrp="1"/>
-          </p:cNvSpPr>
-          <p:nvPr>
-            <p:ph idx="1"/>
-          </p:nvPr>
-        </p:nvSpPr>
-        <p:spPr>
-          <a:xfrm>
-            <a:off x="323725" y="1484784"/>
-            <a:ext cx="7128595" cy="4968875"/>
-          </a:xfrm>
-        </p:spPr>
-        <p:txBody>
-          <a:bodyPr/>
-          <a:lstStyle/>
-          <a:p>
-            <a:r>
-              <a:rPr lang="de-DE" altLang="zh-CN" dirty="0" smtClean="0"/>
-              <a:t>Dynamische Geschwindigkeitsanpassung in Abhängigkeit der Fahrsituation</a:t>
-            </a:r>
-            <a:endParaRPr lang="de-DE" altLang="zh-CN" dirty="0" smtClean="0"/>
-          </a:p>
-          <a:p>
-            <a:r>
-              <a:rPr lang="de-DE" altLang="zh-CN" dirty="0" smtClean="0"/>
-              <a:t>Fahrzeugposition wird durch den PD-Regler </a:t>
-            </a:r>
-            <a:r>
-              <a:rPr lang="de-DE" altLang="zh-CN" dirty="0" smtClean="0"/>
-              <a:t>geregelt</a:t>
-            </a:r>
-            <a:endParaRPr lang="de-DE" altLang="zh-CN" dirty="0" smtClean="0"/>
-          </a:p>
-          <a:p>
-            <a:r>
-              <a:rPr lang="de-DE" altLang="zh-CN" dirty="0" smtClean="0"/>
-              <a:t>Bezugspunkt der Regelung ist </a:t>
-            </a:r>
-            <a:r>
-              <a:rPr lang="de-DE" altLang="zh-CN" dirty="0" smtClean="0"/>
-              <a:t>immer die äußere Markierung der Rennstrecke</a:t>
-            </a:r>
-          </a:p>
-          <a:p>
-            <a:r>
-              <a:rPr lang="de-DE" altLang="zh-CN" dirty="0" smtClean="0"/>
-              <a:t>Abstand zum Fahrbahnrand vergrößert</a:t>
-            </a:r>
-            <a:endParaRPr lang="de-DE" altLang="zh-CN" dirty="0" smtClean="0"/>
-          </a:p>
-          <a:p>
-            <a:r>
-              <a:rPr lang="de-DE" altLang="zh-CN" dirty="0" smtClean="0"/>
-              <a:t>Hinderniserkennung </a:t>
-            </a:r>
-            <a:r>
-              <a:rPr lang="de-DE" altLang="zh-CN" dirty="0" smtClean="0"/>
-              <a:t>ist deaktiviert</a:t>
-            </a:r>
-            <a:endParaRPr lang="de-DE" altLang="zh-CN" dirty="0" smtClean="0"/>
-          </a:p>
-        </p:txBody>
-      </p:sp>
     </p:spTree>
   </p:cSld>
   <p:clrMapOvr>

</xml_diff>

<commit_message>
Präsentation, Bericht, Readme kleine Verbesserungen
</commit_message>
<xml_diff>
--- a/Dokumente/Präsentationen/Abschlusspräsentation.pptx
+++ b/Dokumente/Präsentationen/Abschlusspräsentation.pptx
@@ -24,7 +24,7 @@
     <p:sldId id="268" r:id="rId12"/>
     <p:sldId id="261" r:id="rId13"/>
     <p:sldId id="262" r:id="rId14"/>
-    <p:sldId id="275" r:id="rId15"/>
+    <p:sldId id="276" r:id="rId15"/>
   </p:sldIdLst>
   <p:sldSz cx="9144000" cy="6858000" type="screen4x3"/>
   <p:notesSz cx="6797675" cy="9926638"/>
@@ -195,7 +195,7 @@
   </p:defaultTextStyle>
   <p:extLst>
     <p:ext uri="{EFAFB233-063F-42B5-8137-9DF3F51BA10A}">
-      <p15:sldGuideLst xmlns:p15="http://schemas.microsoft.com/office/powerpoint/2012/main" xmlns="">
+      <p15:sldGuideLst xmlns="" xmlns:p15="http://schemas.microsoft.com/office/powerpoint/2012/main">
         <p15:guide id="1" orient="horz" pos="4319">
           <p15:clr>
             <a:srgbClr val="A4A3A4"/>
@@ -209,7 +209,7 @@
       </p15:sldGuideLst>
     </p:ext>
     <p:ext uri="{2D200454-40CA-4A62-9FC3-DE9A4176ACB9}">
-      <p15:notesGuideLst xmlns:p15="http://schemas.microsoft.com/office/powerpoint/2012/main" xmlns="">
+      <p15:notesGuideLst xmlns="" xmlns:p15="http://schemas.microsoft.com/office/powerpoint/2012/main">
         <p15:guide id="1" orient="horz" pos="2874">
           <p15:clr>
             <a:srgbClr val="A4A3A4"/>
@@ -2325,32 +2325,32 @@
   </dgm:ptLst>
   <dgm:cxnLst>
     <dgm:cxn modelId="{6F7BB68A-0B71-491E-8D6E-DC8B76730EB3}" type="presOf" srcId="{9C262D38-C23F-46A9-B2F7-AD02E33616FF}" destId="{ADCC66F3-B14D-44B1-8B1E-5A57D0293F83}" srcOrd="0" destOrd="0" presId="urn:microsoft.com/office/officeart/2005/8/layout/cycle5"/>
+    <dgm:cxn modelId="{6749EC41-312E-4702-AE93-417101E72446}" type="presOf" srcId="{12DBF135-D93E-4E14-AEB2-5C4A533E7B5D}" destId="{0E8FB463-07BE-482A-BC43-61AF7FD595C1}" srcOrd="0" destOrd="0" presId="urn:microsoft.com/office/officeart/2005/8/layout/cycle5"/>
+    <dgm:cxn modelId="{8E92716F-26B5-48CB-9A00-5C3373317CD3}" type="presOf" srcId="{8946F9DE-07C3-4686-9856-6B2582DD3106}" destId="{0EC62B5A-E703-4913-9127-81806E8ABEC7}" srcOrd="0" destOrd="0" presId="urn:microsoft.com/office/officeart/2005/8/layout/cycle5"/>
+    <dgm:cxn modelId="{7C9F5033-8032-4928-BA9F-5E3EA4B9BF79}" srcId="{097DC993-72A3-4244-AFD6-0815E77788A4}" destId="{ACE2CC2F-AAD9-4D05-8B40-547E3B539AA8}" srcOrd="1" destOrd="0" parTransId="{247F8999-C927-44AD-A8A4-ACF4DF7446C5}" sibTransId="{8B9E9675-B7D5-4D3D-AA5A-60329BC021AC}"/>
     <dgm:cxn modelId="{866FAEBD-B319-41E9-8E07-12BC3EDA4B0E}" type="presOf" srcId="{FF517022-E8A5-401C-BEFF-859908823049}" destId="{322F2889-427F-4255-96FE-7A663EF3A95F}" srcOrd="0" destOrd="0" presId="urn:microsoft.com/office/officeart/2005/8/layout/cycle5"/>
-    <dgm:cxn modelId="{865AAAEF-C0D8-4B99-8355-9BA75E218C62}" srcId="{9C262D38-C23F-46A9-B2F7-AD02E33616FF}" destId="{17393C64-41B8-4541-B793-D79216D0230D}" srcOrd="2" destOrd="0" parTransId="{3C0033BF-238A-4AAE-BE08-3C2F777F0BAB}" sibTransId="{256E034F-7A83-4132-AD3E-FC88A31B3171}"/>
-    <dgm:cxn modelId="{8B41DED6-B2BA-4000-9CC0-7E8CC3DEB9EE}" type="presOf" srcId="{5B0E89E7-AC0B-4EB0-A717-91ED139CDD67}" destId="{F289F93E-06E5-4979-920E-3478F87B263A}" srcOrd="0" destOrd="0" presId="urn:microsoft.com/office/officeart/2005/8/layout/cycle5"/>
+    <dgm:cxn modelId="{A8A36C32-F17B-4246-9A36-013688B8CADE}" type="presOf" srcId="{17393C64-41B8-4541-B793-D79216D0230D}" destId="{7DF9A944-9651-4414-985F-9C465760A763}" srcOrd="0" destOrd="0" presId="urn:microsoft.com/office/officeart/2005/8/layout/cycle5"/>
+    <dgm:cxn modelId="{3AB39C81-ACA0-4389-93FD-F278E26CC96D}" srcId="{9C262D38-C23F-46A9-B2F7-AD02E33616FF}" destId="{8946F9DE-07C3-4686-9856-6B2582DD3106}" srcOrd="1" destOrd="0" parTransId="{975B95CE-EE56-4169-AE2B-9ACD786ED702}" sibTransId="{EFAA9E13-0438-42E3-A7FC-26537FB853BC}"/>
+    <dgm:cxn modelId="{9350CCA3-652E-4BF3-9834-DDA1168358CB}" type="presOf" srcId="{097DC993-72A3-4244-AFD6-0815E77788A4}" destId="{51070C73-9ABB-4CBE-BF7F-197499FA4E9F}" srcOrd="0" destOrd="0" presId="urn:microsoft.com/office/officeart/2005/8/layout/cycle5"/>
     <dgm:cxn modelId="{521A4830-26D1-4BA7-AC54-7A0EEFE775FD}" type="presOf" srcId="{EAE6104A-0D3A-40D0-B9AA-3C115D31E63D}" destId="{322F2889-427F-4255-96FE-7A663EF3A95F}" srcOrd="0" destOrd="2" presId="urn:microsoft.com/office/officeart/2005/8/layout/cycle5"/>
-    <dgm:cxn modelId="{9350CCA3-652E-4BF3-9834-DDA1168358CB}" type="presOf" srcId="{097DC993-72A3-4244-AFD6-0815E77788A4}" destId="{51070C73-9ABB-4CBE-BF7F-197499FA4E9F}" srcOrd="0" destOrd="0" presId="urn:microsoft.com/office/officeart/2005/8/layout/cycle5"/>
-    <dgm:cxn modelId="{314F8DD0-0B29-4706-8EEE-BAAFD74FBEB6}" srcId="{097DC993-72A3-4244-AFD6-0815E77788A4}" destId="{D62CCB92-B222-40DF-8910-3148B3994A10}" srcOrd="0" destOrd="0" parTransId="{D152CB20-4ABC-4DDA-A92D-C16D4F2B7CD2}" sibTransId="{57CDC721-343F-44D8-90E2-558FDBF3070C}"/>
-    <dgm:cxn modelId="{0AEE111E-0CF7-46B6-B51F-F81DA5D8D01F}" type="presOf" srcId="{D62CCB92-B222-40DF-8910-3148B3994A10}" destId="{51070C73-9ABB-4CBE-BF7F-197499FA4E9F}" srcOrd="0" destOrd="1" presId="urn:microsoft.com/office/officeart/2005/8/layout/cycle5"/>
     <dgm:cxn modelId="{BC416615-A145-46B5-BFA3-B5DC7DB689E8}" srcId="{9C262D38-C23F-46A9-B2F7-AD02E33616FF}" destId="{097DC993-72A3-4244-AFD6-0815E77788A4}" srcOrd="3" destOrd="0" parTransId="{A9F536AC-C72D-492A-AE1B-9C1C204A8896}" sibTransId="{12DBF135-D93E-4E14-AEB2-5C4A533E7B5D}"/>
-    <dgm:cxn modelId="{F148F9A0-762A-46AE-82B5-003BC8579357}" srcId="{9C262D38-C23F-46A9-B2F7-AD02E33616FF}" destId="{FF517022-E8A5-401C-BEFF-859908823049}" srcOrd="0" destOrd="0" parTransId="{DA34CBC9-6E5B-4881-9037-B6C720FFA15E}" sibTransId="{B14546C0-114D-408B-9FD0-5FFE00C38A13}"/>
-    <dgm:cxn modelId="{6749EC41-312E-4702-AE93-417101E72446}" type="presOf" srcId="{12DBF135-D93E-4E14-AEB2-5C4A533E7B5D}" destId="{0E8FB463-07BE-482A-BC43-61AF7FD595C1}" srcOrd="0" destOrd="0" presId="urn:microsoft.com/office/officeart/2005/8/layout/cycle5"/>
-    <dgm:cxn modelId="{F2047F85-9621-4FCB-B383-604EB64D5252}" srcId="{FF517022-E8A5-401C-BEFF-859908823049}" destId="{EAE6104A-0D3A-40D0-B9AA-3C115D31E63D}" srcOrd="1" destOrd="0" parTransId="{DF429748-4078-437E-91B8-F006D4A71A50}" sibTransId="{82834DA9-4A09-4E78-B60B-A67DACB77507}"/>
-    <dgm:cxn modelId="{24394471-5ADE-4691-8F52-2F36A64596C8}" type="presOf" srcId="{477FC51F-3263-43C0-8AF5-0B7CB46EA1BD}" destId="{21E62269-EC77-4B92-819E-7AD572501D51}" srcOrd="0" destOrd="0" presId="urn:microsoft.com/office/officeart/2005/8/layout/cycle5"/>
-    <dgm:cxn modelId="{3AB39C81-ACA0-4389-93FD-F278E26CC96D}" srcId="{9C262D38-C23F-46A9-B2F7-AD02E33616FF}" destId="{8946F9DE-07C3-4686-9856-6B2582DD3106}" srcOrd="1" destOrd="0" parTransId="{975B95CE-EE56-4169-AE2B-9ACD786ED702}" sibTransId="{EFAA9E13-0438-42E3-A7FC-26537FB853BC}"/>
+    <dgm:cxn modelId="{47A7DB7C-BE0F-4751-A725-2CB710F1F10D}" srcId="{FF517022-E8A5-401C-BEFF-859908823049}" destId="{EA98858B-2958-46B2-B90A-604982431D71}" srcOrd="0" destOrd="0" parTransId="{F0D89781-7E9B-42B4-9C21-DEAE5EC81703}" sibTransId="{4FAAD27D-EE34-40E4-9E67-FFAFB62FB61F}"/>
+    <dgm:cxn modelId="{92C98818-1344-408C-BB49-BB4B253A5100}" type="presOf" srcId="{2D86A2BF-5B6A-4D76-94CC-99797484151B}" destId="{92E93751-1EDC-4F0A-98BC-A5C9AA6C1D5F}" srcOrd="0" destOrd="0" presId="urn:microsoft.com/office/officeart/2005/8/layout/cycle5"/>
     <dgm:cxn modelId="{2F84FA07-936E-4B7E-A03B-A194E9052312}" type="presOf" srcId="{B14546C0-114D-408B-9FD0-5FFE00C38A13}" destId="{E04CC487-1C5B-45B6-8D5E-C8D4066D0943}" srcOrd="0" destOrd="0" presId="urn:microsoft.com/office/officeart/2005/8/layout/cycle5"/>
-    <dgm:cxn modelId="{7BAC0309-2F85-440B-A73B-E46466658077}" type="presOf" srcId="{256E034F-7A83-4132-AD3E-FC88A31B3171}" destId="{C2088CE8-813B-404D-9C15-5986F4B492B7}" srcOrd="0" destOrd="0" presId="urn:microsoft.com/office/officeart/2005/8/layout/cycle5"/>
-    <dgm:cxn modelId="{47A7DB7C-BE0F-4751-A725-2CB710F1F10D}" srcId="{FF517022-E8A5-401C-BEFF-859908823049}" destId="{EA98858B-2958-46B2-B90A-604982431D71}" srcOrd="0" destOrd="0" parTransId="{F0D89781-7E9B-42B4-9C21-DEAE5EC81703}" sibTransId="{4FAAD27D-EE34-40E4-9E67-FFAFB62FB61F}"/>
-    <dgm:cxn modelId="{ECE19E7E-DAB2-4039-85CD-2A4A148F666B}" srcId="{9C262D38-C23F-46A9-B2F7-AD02E33616FF}" destId="{5B0E89E7-AC0B-4EB0-A717-91ED139CDD67}" srcOrd="4" destOrd="0" parTransId="{BA3E99B5-3D07-45F0-9FD6-DBF9FBFAFCB3}" sibTransId="{2D86A2BF-5B6A-4D76-94CC-99797484151B}"/>
-    <dgm:cxn modelId="{3E697076-F8A8-4CD1-B192-113D0F0FC04A}" type="presOf" srcId="{ACE2CC2F-AAD9-4D05-8B40-547E3B539AA8}" destId="{51070C73-9ABB-4CBE-BF7F-197499FA4E9F}" srcOrd="0" destOrd="2" presId="urn:microsoft.com/office/officeart/2005/8/layout/cycle5"/>
     <dgm:cxn modelId="{C247594F-E5B6-4B62-830C-92DEEA205355}" type="presOf" srcId="{EFAA9E13-0438-42E3-A7FC-26537FB853BC}" destId="{5627CC50-5788-4218-BE49-84D13277FE07}" srcOrd="0" destOrd="0" presId="urn:microsoft.com/office/officeart/2005/8/layout/cycle5"/>
     <dgm:cxn modelId="{F4874C69-53D7-4214-A10B-196EA99201CB}" type="presOf" srcId="{EA98858B-2958-46B2-B90A-604982431D71}" destId="{322F2889-427F-4255-96FE-7A663EF3A95F}" srcOrd="0" destOrd="1" presId="urn:microsoft.com/office/officeart/2005/8/layout/cycle5"/>
-    <dgm:cxn modelId="{A8A36C32-F17B-4246-9A36-013688B8CADE}" type="presOf" srcId="{17393C64-41B8-4541-B793-D79216D0230D}" destId="{7DF9A944-9651-4414-985F-9C465760A763}" srcOrd="0" destOrd="0" presId="urn:microsoft.com/office/officeart/2005/8/layout/cycle5"/>
-    <dgm:cxn modelId="{8E92716F-26B5-48CB-9A00-5C3373317CD3}" type="presOf" srcId="{8946F9DE-07C3-4686-9856-6B2582DD3106}" destId="{0EC62B5A-E703-4913-9127-81806E8ABEC7}" srcOrd="0" destOrd="0" presId="urn:microsoft.com/office/officeart/2005/8/layout/cycle5"/>
     <dgm:cxn modelId="{DBE0F657-601C-4DD8-A03D-5355C31A7FDF}" type="presOf" srcId="{D7962C6A-858D-4AB6-AAF5-72BB61C3BCC6}" destId="{06095F51-3C94-4EFF-917D-25EAB90C3F30}" srcOrd="0" destOrd="0" presId="urn:microsoft.com/office/officeart/2005/8/layout/cycle5"/>
-    <dgm:cxn modelId="{7C9F5033-8032-4928-BA9F-5E3EA4B9BF79}" srcId="{097DC993-72A3-4244-AFD6-0815E77788A4}" destId="{ACE2CC2F-AAD9-4D05-8B40-547E3B539AA8}" srcOrd="1" destOrd="0" parTransId="{247F8999-C927-44AD-A8A4-ACF4DF7446C5}" sibTransId="{8B9E9675-B7D5-4D3D-AA5A-60329BC021AC}"/>
+    <dgm:cxn modelId="{3E697076-F8A8-4CD1-B192-113D0F0FC04A}" type="presOf" srcId="{ACE2CC2F-AAD9-4D05-8B40-547E3B539AA8}" destId="{51070C73-9ABB-4CBE-BF7F-197499FA4E9F}" srcOrd="0" destOrd="2" presId="urn:microsoft.com/office/officeart/2005/8/layout/cycle5"/>
+    <dgm:cxn modelId="{24394471-5ADE-4691-8F52-2F36A64596C8}" type="presOf" srcId="{477FC51F-3263-43C0-8AF5-0B7CB46EA1BD}" destId="{21E62269-EC77-4B92-819E-7AD572501D51}" srcOrd="0" destOrd="0" presId="urn:microsoft.com/office/officeart/2005/8/layout/cycle5"/>
+    <dgm:cxn modelId="{865AAAEF-C0D8-4B99-8355-9BA75E218C62}" srcId="{9C262D38-C23F-46A9-B2F7-AD02E33616FF}" destId="{17393C64-41B8-4541-B793-D79216D0230D}" srcOrd="2" destOrd="0" parTransId="{3C0033BF-238A-4AAE-BE08-3C2F777F0BAB}" sibTransId="{256E034F-7A83-4132-AD3E-FC88A31B3171}"/>
+    <dgm:cxn modelId="{F2047F85-9621-4FCB-B383-604EB64D5252}" srcId="{FF517022-E8A5-401C-BEFF-859908823049}" destId="{EAE6104A-0D3A-40D0-B9AA-3C115D31E63D}" srcOrd="1" destOrd="0" parTransId="{DF429748-4078-437E-91B8-F006D4A71A50}" sibTransId="{82834DA9-4A09-4E78-B60B-A67DACB77507}"/>
+    <dgm:cxn modelId="{7BAC0309-2F85-440B-A73B-E46466658077}" type="presOf" srcId="{256E034F-7A83-4132-AD3E-FC88A31B3171}" destId="{C2088CE8-813B-404D-9C15-5986F4B492B7}" srcOrd="0" destOrd="0" presId="urn:microsoft.com/office/officeart/2005/8/layout/cycle5"/>
+    <dgm:cxn modelId="{314F8DD0-0B29-4706-8EEE-BAAFD74FBEB6}" srcId="{097DC993-72A3-4244-AFD6-0815E77788A4}" destId="{D62CCB92-B222-40DF-8910-3148B3994A10}" srcOrd="0" destOrd="0" parTransId="{D152CB20-4ABC-4DDA-A92D-C16D4F2B7CD2}" sibTransId="{57CDC721-343F-44D8-90E2-558FDBF3070C}"/>
+    <dgm:cxn modelId="{ECE19E7E-DAB2-4039-85CD-2A4A148F666B}" srcId="{9C262D38-C23F-46A9-B2F7-AD02E33616FF}" destId="{5B0E89E7-AC0B-4EB0-A717-91ED139CDD67}" srcOrd="4" destOrd="0" parTransId="{BA3E99B5-3D07-45F0-9FD6-DBF9FBFAFCB3}" sibTransId="{2D86A2BF-5B6A-4D76-94CC-99797484151B}"/>
+    <dgm:cxn modelId="{8B41DED6-B2BA-4000-9CC0-7E8CC3DEB9EE}" type="presOf" srcId="{5B0E89E7-AC0B-4EB0-A717-91ED139CDD67}" destId="{F289F93E-06E5-4979-920E-3478F87B263A}" srcOrd="0" destOrd="0" presId="urn:microsoft.com/office/officeart/2005/8/layout/cycle5"/>
     <dgm:cxn modelId="{2BD4F86B-4469-454E-86A1-0BABCC4E1081}" srcId="{9C262D38-C23F-46A9-B2F7-AD02E33616FF}" destId="{D7962C6A-858D-4AB6-AAF5-72BB61C3BCC6}" srcOrd="5" destOrd="0" parTransId="{D726EDDA-5EDB-4813-8144-3C7BAC923A21}" sibTransId="{477FC51F-3263-43C0-8AF5-0B7CB46EA1BD}"/>
-    <dgm:cxn modelId="{92C98818-1344-408C-BB49-BB4B253A5100}" type="presOf" srcId="{2D86A2BF-5B6A-4D76-94CC-99797484151B}" destId="{92E93751-1EDC-4F0A-98BC-A5C9AA6C1D5F}" srcOrd="0" destOrd="0" presId="urn:microsoft.com/office/officeart/2005/8/layout/cycle5"/>
+    <dgm:cxn modelId="{0AEE111E-0CF7-46B6-B51F-F81DA5D8D01F}" type="presOf" srcId="{D62CCB92-B222-40DF-8910-3148B3994A10}" destId="{51070C73-9ABB-4CBE-BF7F-197499FA4E9F}" srcOrd="0" destOrd="1" presId="urn:microsoft.com/office/officeart/2005/8/layout/cycle5"/>
+    <dgm:cxn modelId="{F148F9A0-762A-46AE-82B5-003BC8579357}" srcId="{9C262D38-C23F-46A9-B2F7-AD02E33616FF}" destId="{FF517022-E8A5-401C-BEFF-859908823049}" srcOrd="0" destOrd="0" parTransId="{DA34CBC9-6E5B-4881-9037-B6C720FFA15E}" sibTransId="{B14546C0-114D-408B-9FD0-5FFE00C38A13}"/>
     <dgm:cxn modelId="{801764BC-29FB-4785-96D9-841BC3CBC9A2}" type="presParOf" srcId="{ADCC66F3-B14D-44B1-8B1E-5A57D0293F83}" destId="{322F2889-427F-4255-96FE-7A663EF3A95F}" srcOrd="0" destOrd="0" presId="urn:microsoft.com/office/officeart/2005/8/layout/cycle5"/>
     <dgm:cxn modelId="{5CD37A18-92DD-4ACF-BC50-73AE0766C367}" type="presParOf" srcId="{ADCC66F3-B14D-44B1-8B1E-5A57D0293F83}" destId="{BBF5FDF9-DFFC-4812-ACBB-83C47312AC25}" srcOrd="1" destOrd="0" presId="urn:microsoft.com/office/officeart/2005/8/layout/cycle5"/>
     <dgm:cxn modelId="{2589A008-D537-4A14-9AA3-9F201D07A230}" type="presParOf" srcId="{ADCC66F3-B14D-44B1-8B1E-5A57D0293F83}" destId="{E04CC487-1C5B-45B6-8D5E-C8D4066D0943}" srcOrd="2" destOrd="0" presId="urn:microsoft.com/office/officeart/2005/8/layout/cycle5"/>
@@ -2374,7 +2374,7 @@
   <dgm:whole/>
   <dgm:extLst>
     <a:ext uri="http://schemas.microsoft.com/office/drawing/2008/diagram">
-      <dsp:dataModelExt xmlns:dsp="http://schemas.microsoft.com/office/drawing/2008/diagram" xmlns="" relId="rId9" minVer="http://schemas.openxmlformats.org/drawingml/2006/diagram"/>
+      <dsp:dataModelExt xmlns:dsp="http://schemas.microsoft.com/office/drawing/2008/diagram" relId="rId9" minVer="http://schemas.openxmlformats.org/drawingml/2006/diagram"/>
     </a:ext>
   </dgm:extLst>
 </dgm:dataModel>
@@ -2824,29 +2824,29 @@
     </dgm:pt>
   </dgm:ptLst>
   <dgm:cxnLst>
+    <dgm:cxn modelId="{BF074302-ADFE-4998-83F4-B5B8D4077EC4}" srcId="{F6E47ECC-1CC7-4BF8-A40F-F7C26A4BFA09}" destId="{685F4625-0840-46FA-B858-0C8623E3CC8D}" srcOrd="5" destOrd="0" parTransId="{7D57000E-778C-4CFD-B686-F2117CC1C858}" sibTransId="{067EF79F-A2B5-4E85-B591-BE8A5BA165D0}"/>
+    <dgm:cxn modelId="{122B0E85-1F4F-4FBF-88BC-60F4A6515555}" type="presOf" srcId="{D9C1DE2A-C919-439D-83D8-65D74A775FB6}" destId="{F750DCCB-0DB3-4943-9436-F897320A4A5D}" srcOrd="0" destOrd="0" presId="urn:microsoft.com/office/officeart/2005/8/layout/process5"/>
+    <dgm:cxn modelId="{EB029169-2D09-4502-A4F8-18C1302FF6FA}" type="presOf" srcId="{AF275174-F4D7-4107-9340-9F31FFAE84C6}" destId="{B064BFA8-682D-4757-ADFC-2CABBAA0A8B1}" srcOrd="1" destOrd="0" presId="urn:microsoft.com/office/officeart/2005/8/layout/process5"/>
+    <dgm:cxn modelId="{F1B9939C-663B-47F3-A7C2-D59B6CD8ABAD}" type="presOf" srcId="{0A5440AC-4116-4C27-9264-16AACB669E12}" destId="{07284E07-4408-4BF2-9E53-8B0D5A353C3A}" srcOrd="0" destOrd="0" presId="urn:microsoft.com/office/officeart/2005/8/layout/process5"/>
+    <dgm:cxn modelId="{C5AF9FAD-37EE-43C3-A9CC-1DE309D0D09C}" type="presOf" srcId="{BA46942A-95B1-4525-A038-6C19F1DA6537}" destId="{FAC03DC4-EE0B-4F48-810D-D7D90D29CDA7}" srcOrd="0" destOrd="0" presId="urn:microsoft.com/office/officeart/2005/8/layout/process5"/>
+    <dgm:cxn modelId="{562BB721-6EDC-4053-B596-0A411EFAF9D6}" type="presOf" srcId="{F6E47ECC-1CC7-4BF8-A40F-F7C26A4BFA09}" destId="{B40BC887-7121-4751-9ED6-13E8470945BB}" srcOrd="0" destOrd="0" presId="urn:microsoft.com/office/officeart/2005/8/layout/process5"/>
+    <dgm:cxn modelId="{6BBD4478-0FC8-4791-837D-3B86DC444DFA}" srcId="{F6E47ECC-1CC7-4BF8-A40F-F7C26A4BFA09}" destId="{D9C1DE2A-C919-439D-83D8-65D74A775FB6}" srcOrd="0" destOrd="0" parTransId="{24F33364-C041-4A46-9A2C-3365A4B35E4A}" sibTransId="{0A5440AC-4116-4C27-9264-16AACB669E12}"/>
+    <dgm:cxn modelId="{1B9E96C9-9538-4A4B-916B-D10B947B15ED}" type="presOf" srcId="{685F4625-0840-46FA-B858-0C8623E3CC8D}" destId="{25B326A3-A87D-4B61-8CBD-2F11BDEA96BC}" srcOrd="0" destOrd="0" presId="urn:microsoft.com/office/officeart/2005/8/layout/process5"/>
+    <dgm:cxn modelId="{1B4527FB-7E8B-4D52-83EC-FCCF26383C20}" type="presOf" srcId="{7D600DAC-9587-44B5-AA91-D1DB1E8AF259}" destId="{0C959095-7882-4471-98AD-EDED72A06E2D}" srcOrd="0" destOrd="0" presId="urn:microsoft.com/office/officeart/2005/8/layout/process5"/>
+    <dgm:cxn modelId="{574CD3E9-96D9-455C-8E2F-35597C85EA16}" type="presOf" srcId="{D2E27AEE-DE18-437E-8ED4-085C407B02F4}" destId="{3ECB9AC3-8324-4FBC-8785-044F1DD81182}" srcOrd="0" destOrd="0" presId="urn:microsoft.com/office/officeart/2005/8/layout/process5"/>
+    <dgm:cxn modelId="{F128F62D-D92C-4CC8-B306-60C9D8EEAB3A}" type="presOf" srcId="{0A5440AC-4116-4C27-9264-16AACB669E12}" destId="{F8FFB6C0-E03E-4022-8398-9AFF5BF916E4}" srcOrd="1" destOrd="0" presId="urn:microsoft.com/office/officeart/2005/8/layout/process5"/>
+    <dgm:cxn modelId="{2D69BF81-3E5F-4B08-8400-18604264860E}" type="presOf" srcId="{7762B7C6-4F36-4B61-B445-F6FF0509CF25}" destId="{4CD77A7A-0F40-4ABE-A7EB-ED19FB09158A}" srcOrd="1" destOrd="0" presId="urn:microsoft.com/office/officeart/2005/8/layout/process5"/>
+    <dgm:cxn modelId="{A1CD72F6-11A0-4594-87FC-291C4A70D512}" type="presOf" srcId="{7762B7C6-4F36-4B61-B445-F6FF0509CF25}" destId="{B11A5A4A-6892-4B2E-B725-ECE29BCF5F77}" srcOrd="0" destOrd="0" presId="urn:microsoft.com/office/officeart/2005/8/layout/process5"/>
+    <dgm:cxn modelId="{A9D5091A-B7FB-49D9-9E39-33E16E32D6E5}" srcId="{F6E47ECC-1CC7-4BF8-A40F-F7C26A4BFA09}" destId="{6883C271-93CE-4F53-B3DB-E78414E06855}" srcOrd="1" destOrd="0" parTransId="{64D99E33-9629-4119-A130-DF85747D2256}" sibTransId="{FE6047D0-FF2D-42A2-B389-DB220F2BDF26}"/>
+    <dgm:cxn modelId="{5D1DC38D-36E9-4345-9BDA-5F37D04D90AB}" type="presOf" srcId="{FE6047D0-FF2D-42A2-B389-DB220F2BDF26}" destId="{87601AF7-0F9F-46ED-B4EE-1B62860D4BA5}" srcOrd="0" destOrd="0" presId="urn:microsoft.com/office/officeart/2005/8/layout/process5"/>
+    <dgm:cxn modelId="{47CCF4E1-A68F-439A-BB94-DD05FAF1E159}" srcId="{F6E47ECC-1CC7-4BF8-A40F-F7C26A4BFA09}" destId="{BA46942A-95B1-4525-A038-6C19F1DA6537}" srcOrd="4" destOrd="0" parTransId="{F92269B3-4B49-4BEA-BE93-2AC05ED4A544}" sibTransId="{7762B7C6-4F36-4B61-B445-F6FF0509CF25}"/>
+    <dgm:cxn modelId="{26DB8064-CA9A-49BF-B110-4A1EB040AF44}" srcId="{F6E47ECC-1CC7-4BF8-A40F-F7C26A4BFA09}" destId="{D2E27AEE-DE18-437E-8ED4-085C407B02F4}" srcOrd="2" destOrd="0" parTransId="{6C0F99BB-1AE8-491E-9E77-BB81EC71D0A5}" sibTransId="{AF275174-F4D7-4107-9340-9F31FFAE84C6}"/>
+    <dgm:cxn modelId="{3452DE59-B5DB-4659-B582-F21A0FA1069E}" type="presOf" srcId="{6883C271-93CE-4F53-B3DB-E78414E06855}" destId="{EB0F924E-08B8-4496-8F7C-D75A9D314B30}" srcOrd="0" destOrd="0" presId="urn:microsoft.com/office/officeart/2005/8/layout/process5"/>
     <dgm:cxn modelId="{F8FCC4ED-399C-4EBC-8501-E7E94B934A37}" srcId="{F6E47ECC-1CC7-4BF8-A40F-F7C26A4BFA09}" destId="{7D600DAC-9587-44B5-AA91-D1DB1E8AF259}" srcOrd="3" destOrd="0" parTransId="{C6630763-DE36-4591-8A63-8451E61C4B79}" sibTransId="{DD3CB5CF-4595-4EEC-846B-6102664F2F05}"/>
-    <dgm:cxn modelId="{BF074302-ADFE-4998-83F4-B5B8D4077EC4}" srcId="{F6E47ECC-1CC7-4BF8-A40F-F7C26A4BFA09}" destId="{685F4625-0840-46FA-B858-0C8623E3CC8D}" srcOrd="5" destOrd="0" parTransId="{7D57000E-778C-4CFD-B686-F2117CC1C858}" sibTransId="{067EF79F-A2B5-4E85-B591-BE8A5BA165D0}"/>
-    <dgm:cxn modelId="{5D1DC38D-36E9-4345-9BDA-5F37D04D90AB}" type="presOf" srcId="{FE6047D0-FF2D-42A2-B389-DB220F2BDF26}" destId="{87601AF7-0F9F-46ED-B4EE-1B62860D4BA5}" srcOrd="0" destOrd="0" presId="urn:microsoft.com/office/officeart/2005/8/layout/process5"/>
+    <dgm:cxn modelId="{74C58CEF-53B4-4388-82CD-0CB7A6CAA27A}" type="presOf" srcId="{DD3CB5CF-4595-4EEC-846B-6102664F2F05}" destId="{C187702E-51EF-4FC5-95AA-90B3C81FA086}" srcOrd="0" destOrd="0" presId="urn:microsoft.com/office/officeart/2005/8/layout/process5"/>
+    <dgm:cxn modelId="{F1423178-391C-4B6B-8F65-8CA9DBD94E60}" type="presOf" srcId="{DD3CB5CF-4595-4EEC-846B-6102664F2F05}" destId="{CAFDA7F7-B46C-4359-A129-AB4E2CE5A598}" srcOrd="1" destOrd="0" presId="urn:microsoft.com/office/officeart/2005/8/layout/process5"/>
+    <dgm:cxn modelId="{DFD6F5FA-8A31-42F7-BF3C-456A1F4586B1}" type="presOf" srcId="{AF275174-F4D7-4107-9340-9F31FFAE84C6}" destId="{57D1F035-83D0-404D-822E-A0E9FF1B02F1}" srcOrd="0" destOrd="0" presId="urn:microsoft.com/office/officeart/2005/8/layout/process5"/>
     <dgm:cxn modelId="{D877C6B4-A0E6-4AC1-AF28-FDA315E921DB}" type="presOf" srcId="{FE6047D0-FF2D-42A2-B389-DB220F2BDF26}" destId="{8EE4ED0A-418E-4458-84B0-1C7F6B4889D0}" srcOrd="1" destOrd="0" presId="urn:microsoft.com/office/officeart/2005/8/layout/process5"/>
-    <dgm:cxn modelId="{6BBD4478-0FC8-4791-837D-3B86DC444DFA}" srcId="{F6E47ECC-1CC7-4BF8-A40F-F7C26A4BFA09}" destId="{D9C1DE2A-C919-439D-83D8-65D74A775FB6}" srcOrd="0" destOrd="0" parTransId="{24F33364-C041-4A46-9A2C-3365A4B35E4A}" sibTransId="{0A5440AC-4116-4C27-9264-16AACB669E12}"/>
-    <dgm:cxn modelId="{47CCF4E1-A68F-439A-BB94-DD05FAF1E159}" srcId="{F6E47ECC-1CC7-4BF8-A40F-F7C26A4BFA09}" destId="{BA46942A-95B1-4525-A038-6C19F1DA6537}" srcOrd="4" destOrd="0" parTransId="{F92269B3-4B49-4BEA-BE93-2AC05ED4A544}" sibTransId="{7762B7C6-4F36-4B61-B445-F6FF0509CF25}"/>
-    <dgm:cxn modelId="{A9D5091A-B7FB-49D9-9E39-33E16E32D6E5}" srcId="{F6E47ECC-1CC7-4BF8-A40F-F7C26A4BFA09}" destId="{6883C271-93CE-4F53-B3DB-E78414E06855}" srcOrd="1" destOrd="0" parTransId="{64D99E33-9629-4119-A130-DF85747D2256}" sibTransId="{FE6047D0-FF2D-42A2-B389-DB220F2BDF26}"/>
-    <dgm:cxn modelId="{2D69BF81-3E5F-4B08-8400-18604264860E}" type="presOf" srcId="{7762B7C6-4F36-4B61-B445-F6FF0509CF25}" destId="{4CD77A7A-0F40-4ABE-A7EB-ED19FB09158A}" srcOrd="1" destOrd="0" presId="urn:microsoft.com/office/officeart/2005/8/layout/process5"/>
-    <dgm:cxn modelId="{1B9E96C9-9538-4A4B-916B-D10B947B15ED}" type="presOf" srcId="{685F4625-0840-46FA-B858-0C8623E3CC8D}" destId="{25B326A3-A87D-4B61-8CBD-2F11BDEA96BC}" srcOrd="0" destOrd="0" presId="urn:microsoft.com/office/officeart/2005/8/layout/process5"/>
-    <dgm:cxn modelId="{574CD3E9-96D9-455C-8E2F-35597C85EA16}" type="presOf" srcId="{D2E27AEE-DE18-437E-8ED4-085C407B02F4}" destId="{3ECB9AC3-8324-4FBC-8785-044F1DD81182}" srcOrd="0" destOrd="0" presId="urn:microsoft.com/office/officeart/2005/8/layout/process5"/>
-    <dgm:cxn modelId="{1B4527FB-7E8B-4D52-83EC-FCCF26383C20}" type="presOf" srcId="{7D600DAC-9587-44B5-AA91-D1DB1E8AF259}" destId="{0C959095-7882-4471-98AD-EDED72A06E2D}" srcOrd="0" destOrd="0" presId="urn:microsoft.com/office/officeart/2005/8/layout/process5"/>
-    <dgm:cxn modelId="{EB029169-2D09-4502-A4F8-18C1302FF6FA}" type="presOf" srcId="{AF275174-F4D7-4107-9340-9F31FFAE84C6}" destId="{B064BFA8-682D-4757-ADFC-2CABBAA0A8B1}" srcOrd="1" destOrd="0" presId="urn:microsoft.com/office/officeart/2005/8/layout/process5"/>
-    <dgm:cxn modelId="{122B0E85-1F4F-4FBF-88BC-60F4A6515555}" type="presOf" srcId="{D9C1DE2A-C919-439D-83D8-65D74A775FB6}" destId="{F750DCCB-0DB3-4943-9436-F897320A4A5D}" srcOrd="0" destOrd="0" presId="urn:microsoft.com/office/officeart/2005/8/layout/process5"/>
-    <dgm:cxn modelId="{3452DE59-B5DB-4659-B582-F21A0FA1069E}" type="presOf" srcId="{6883C271-93CE-4F53-B3DB-E78414E06855}" destId="{EB0F924E-08B8-4496-8F7C-D75A9D314B30}" srcOrd="0" destOrd="0" presId="urn:microsoft.com/office/officeart/2005/8/layout/process5"/>
-    <dgm:cxn modelId="{26DB8064-CA9A-49BF-B110-4A1EB040AF44}" srcId="{F6E47ECC-1CC7-4BF8-A40F-F7C26A4BFA09}" destId="{D2E27AEE-DE18-437E-8ED4-085C407B02F4}" srcOrd="2" destOrd="0" parTransId="{6C0F99BB-1AE8-491E-9E77-BB81EC71D0A5}" sibTransId="{AF275174-F4D7-4107-9340-9F31FFAE84C6}"/>
-    <dgm:cxn modelId="{A1CD72F6-11A0-4594-87FC-291C4A70D512}" type="presOf" srcId="{7762B7C6-4F36-4B61-B445-F6FF0509CF25}" destId="{B11A5A4A-6892-4B2E-B725-ECE29BCF5F77}" srcOrd="0" destOrd="0" presId="urn:microsoft.com/office/officeart/2005/8/layout/process5"/>
-    <dgm:cxn modelId="{C5AF9FAD-37EE-43C3-A9CC-1DE309D0D09C}" type="presOf" srcId="{BA46942A-95B1-4525-A038-6C19F1DA6537}" destId="{FAC03DC4-EE0B-4F48-810D-D7D90D29CDA7}" srcOrd="0" destOrd="0" presId="urn:microsoft.com/office/officeart/2005/8/layout/process5"/>
-    <dgm:cxn modelId="{F128F62D-D92C-4CC8-B306-60C9D8EEAB3A}" type="presOf" srcId="{0A5440AC-4116-4C27-9264-16AACB669E12}" destId="{F8FFB6C0-E03E-4022-8398-9AFF5BF916E4}" srcOrd="1" destOrd="0" presId="urn:microsoft.com/office/officeart/2005/8/layout/process5"/>
-    <dgm:cxn modelId="{74C58CEF-53B4-4388-82CD-0CB7A6CAA27A}" type="presOf" srcId="{DD3CB5CF-4595-4EEC-846B-6102664F2F05}" destId="{C187702E-51EF-4FC5-95AA-90B3C81FA086}" srcOrd="0" destOrd="0" presId="urn:microsoft.com/office/officeart/2005/8/layout/process5"/>
-    <dgm:cxn modelId="{DFD6F5FA-8A31-42F7-BF3C-456A1F4586B1}" type="presOf" srcId="{AF275174-F4D7-4107-9340-9F31FFAE84C6}" destId="{57D1F035-83D0-404D-822E-A0E9FF1B02F1}" srcOrd="0" destOrd="0" presId="urn:microsoft.com/office/officeart/2005/8/layout/process5"/>
-    <dgm:cxn modelId="{562BB721-6EDC-4053-B596-0A411EFAF9D6}" type="presOf" srcId="{F6E47ECC-1CC7-4BF8-A40F-F7C26A4BFA09}" destId="{B40BC887-7121-4751-9ED6-13E8470945BB}" srcOrd="0" destOrd="0" presId="urn:microsoft.com/office/officeart/2005/8/layout/process5"/>
-    <dgm:cxn modelId="{F1423178-391C-4B6B-8F65-8CA9DBD94E60}" type="presOf" srcId="{DD3CB5CF-4595-4EEC-846B-6102664F2F05}" destId="{CAFDA7F7-B46C-4359-A129-AB4E2CE5A598}" srcOrd="1" destOrd="0" presId="urn:microsoft.com/office/officeart/2005/8/layout/process5"/>
-    <dgm:cxn modelId="{F1B9939C-663B-47F3-A7C2-D59B6CD8ABAD}" type="presOf" srcId="{0A5440AC-4116-4C27-9264-16AACB669E12}" destId="{07284E07-4408-4BF2-9E53-8B0D5A353C3A}" srcOrd="0" destOrd="0" presId="urn:microsoft.com/office/officeart/2005/8/layout/process5"/>
     <dgm:cxn modelId="{77C33F04-EC4C-4CB4-9EDE-8EF7E2C47CCA}" type="presParOf" srcId="{B40BC887-7121-4751-9ED6-13E8470945BB}" destId="{F750DCCB-0DB3-4943-9436-F897320A4A5D}" srcOrd="0" destOrd="0" presId="urn:microsoft.com/office/officeart/2005/8/layout/process5"/>
     <dgm:cxn modelId="{24402445-5195-4B9A-B6CD-28CA16B8D05E}" type="presParOf" srcId="{B40BC887-7121-4751-9ED6-13E8470945BB}" destId="{07284E07-4408-4BF2-9E53-8B0D5A353C3A}" srcOrd="1" destOrd="0" presId="urn:microsoft.com/office/officeart/2005/8/layout/process5"/>
     <dgm:cxn modelId="{D8BFFAC4-70EB-44CF-B73B-532597EF203E}" type="presParOf" srcId="{07284E07-4408-4BF2-9E53-8B0D5A353C3A}" destId="{F8FFB6C0-E03E-4022-8398-9AFF5BF916E4}" srcOrd="0" destOrd="0" presId="urn:microsoft.com/office/officeart/2005/8/layout/process5"/>
@@ -2868,14 +2868,14 @@
   <dgm:whole/>
   <dgm:extLst>
     <a:ext uri="http://schemas.microsoft.com/office/drawing/2008/diagram">
-      <dsp:dataModelExt xmlns:dsp="http://schemas.microsoft.com/office/drawing/2008/diagram" xmlns="" relId="rId7" minVer="http://schemas.openxmlformats.org/drawingml/2006/diagram"/>
+      <dsp:dataModelExt xmlns:dsp="http://schemas.microsoft.com/office/drawing/2008/diagram" relId="rId7" minVer="http://schemas.openxmlformats.org/drawingml/2006/diagram"/>
     </a:ext>
   </dgm:extLst>
 </dgm:dataModel>
 </file>
 
 <file path=ppt/diagrams/drawing1.xml><?xml version="1.0" encoding="utf-8"?>
-<dsp:drawing xmlns:dgm="http://schemas.openxmlformats.org/drawingml/2006/diagram" xmlns:a="http://schemas.openxmlformats.org/drawingml/2006/main" xmlns:dsp="http://schemas.microsoft.com/office/drawing/2008/diagram">
+<dsp:drawing xmlns:dgm="http://schemas.openxmlformats.org/drawingml/2006/diagram" xmlns:dsp="http://schemas.microsoft.com/office/drawing/2008/diagram" xmlns:a="http://schemas.openxmlformats.org/drawingml/2006/main">
   <dsp:spTree>
     <dsp:nvGrpSpPr>
       <dsp:cNvPr id="0" name=""/>
@@ -3007,8 +3007,8 @@
         </a:p>
       </dsp:txBody>
       <dsp:txXfrm>
-        <a:off x="2123729" y="-7"/>
-        <a:ext cx="2155945" cy="1079579"/>
+        <a:off x="2176430" y="52694"/>
+        <a:ext cx="2050543" cy="974177"/>
       </dsp:txXfrm>
     </dsp:sp>
     <dsp:sp modelId="{E04CC487-1C5B-45B6-8D5E-C8D4066D0943}">
@@ -3156,8 +3156,8 @@
         </a:p>
       </dsp:txBody>
       <dsp:txXfrm>
-        <a:off x="4355982" y="1224132"/>
-        <a:ext cx="1870494" cy="856972"/>
+        <a:off x="4397816" y="1265966"/>
+        <a:ext cx="1786826" cy="773304"/>
       </dsp:txXfrm>
     </dsp:sp>
     <dsp:sp modelId="{5627CC50-5788-4218-BE49-84D13277FE07}">
@@ -3305,8 +3305,8 @@
         </a:p>
       </dsp:txBody>
       <dsp:txXfrm>
-        <a:off x="4427982" y="2520276"/>
-        <a:ext cx="1696713" cy="856972"/>
+        <a:off x="4469816" y="2562110"/>
+        <a:ext cx="1613045" cy="773304"/>
       </dsp:txXfrm>
     </dsp:sp>
     <dsp:sp modelId="{C2088CE8-813B-404D-9C15-5986F4B492B7}">
@@ -3496,8 +3496,8 @@
         </a:p>
       </dsp:txBody>
       <dsp:txXfrm>
-        <a:off x="2123726" y="3672401"/>
-        <a:ext cx="2244741" cy="1121031"/>
+        <a:off x="2178450" y="3727125"/>
+        <a:ext cx="2135293" cy="1011583"/>
       </dsp:txXfrm>
     </dsp:sp>
     <dsp:sp modelId="{0E8FB463-07BE-482A-BC43-61AF7FD595C1}">
@@ -3645,8 +3645,8 @@
         </a:p>
       </dsp:txBody>
       <dsp:txXfrm>
-        <a:off x="395541" y="2520281"/>
-        <a:ext cx="2053464" cy="856972"/>
+        <a:off x="437375" y="2562115"/>
+        <a:ext cx="1969796" cy="773304"/>
       </dsp:txXfrm>
     </dsp:sp>
     <dsp:sp modelId="{92E93751-1EDC-4F0A-98BC-A5C9AA6C1D5F}">
@@ -3794,8 +3794,8 @@
         </a:p>
       </dsp:txBody>
       <dsp:txXfrm>
-        <a:off x="440328" y="1224137"/>
-        <a:ext cx="1824903" cy="856972"/>
+        <a:off x="482162" y="1265971"/>
+        <a:ext cx="1741235" cy="773304"/>
       </dsp:txXfrm>
     </dsp:sp>
     <dsp:sp modelId="{21E62269-EC77-4B92-819E-7AD572501D51}">
@@ -3865,7 +3865,7 @@
 </file>
 
 <file path=ppt/diagrams/drawing2.xml><?xml version="1.0" encoding="utf-8"?>
-<dsp:drawing xmlns:dgm="http://schemas.openxmlformats.org/drawingml/2006/diagram" xmlns:a="http://schemas.openxmlformats.org/drawingml/2006/main" xmlns:dsp="http://schemas.microsoft.com/office/drawing/2008/diagram">
+<dsp:drawing xmlns:dgm="http://schemas.openxmlformats.org/drawingml/2006/diagram" xmlns:dsp="http://schemas.microsoft.com/office/drawing/2008/diagram" xmlns:a="http://schemas.openxmlformats.org/drawingml/2006/main">
   <dsp:spTree>
     <dsp:nvGrpSpPr>
       <dsp:cNvPr id="0" name=""/>
@@ -3957,8 +3957,8 @@
         </a:p>
       </dsp:txBody>
       <dsp:txXfrm>
-        <a:off x="0" y="144019"/>
-        <a:ext cx="1403185" cy="929912"/>
+        <a:off x="27236" y="171255"/>
+        <a:ext cx="1348713" cy="875440"/>
       </dsp:txXfrm>
     </dsp:sp>
     <dsp:sp modelId="{07284E07-4408-4BF2-9E53-8B0D5A353C3A}">
@@ -4037,9 +4037,9 @@
           <a:endParaRPr lang="de-DE" sz="2000" kern="1200"/>
         </a:p>
       </dsp:txBody>
-      <dsp:txXfrm rot="25898">
-        <a:off x="1712301" y="344958"/>
-        <a:ext cx="744736" cy="548871"/>
+      <dsp:txXfrm>
+        <a:off x="1712303" y="454112"/>
+        <a:ext cx="580075" cy="329323"/>
       </dsp:txXfrm>
     </dsp:sp>
     <dsp:sp modelId="{EB0F924E-08B8-4496-8F7C-D75A9D314B30}">
@@ -4127,8 +4127,8 @@
         </a:p>
       </dsp:txBody>
       <dsp:txXfrm>
-        <a:off x="2808308" y="144019"/>
-        <a:ext cx="2259092" cy="978673"/>
+        <a:off x="2836972" y="172683"/>
+        <a:ext cx="2201764" cy="921345"/>
       </dsp:txXfrm>
     </dsp:sp>
     <dsp:sp modelId="{87601AF7-0F9F-46ED-B4EE-1B62860D4BA5}">
@@ -4207,9 +4207,9 @@
           <a:endParaRPr lang="de-DE" sz="2000" kern="1200"/>
         </a:p>
       </dsp:txBody>
-      <dsp:txXfrm rot="21569511">
-        <a:off x="5299112" y="344371"/>
-        <a:ext cx="558260" cy="548871"/>
+      <dsp:txXfrm>
+        <a:off x="5299115" y="454875"/>
+        <a:ext cx="393599" cy="329323"/>
       </dsp:txXfrm>
     </dsp:sp>
     <dsp:sp modelId="{3ECB9AC3-8324-4FBC-8785-044F1DD81182}">
@@ -4301,8 +4301,8 @@
         </a:p>
       </dsp:txBody>
       <dsp:txXfrm>
-        <a:off x="6120681" y="72006"/>
-        <a:ext cx="2213191" cy="1064350"/>
+        <a:off x="6151855" y="103180"/>
+        <a:ext cx="2150843" cy="1002002"/>
       </dsp:txXfrm>
     </dsp:sp>
     <dsp:sp modelId="{57D1F035-83D0-404D-822E-A0E9FF1B02F1}">
@@ -4381,9 +4381,9 @@
           <a:endParaRPr lang="de-DE" sz="2000" kern="1200"/>
         </a:p>
       </dsp:txBody>
-      <dsp:txXfrm rot="5400000">
-        <a:off x="7070441" y="1148960"/>
-        <a:ext cx="313671" cy="548871"/>
+      <dsp:txXfrm rot="-5400000">
+        <a:off x="7062616" y="1266560"/>
+        <a:ext cx="329323" cy="219570"/>
       </dsp:txXfrm>
     </dsp:sp>
     <dsp:sp modelId="{0C959095-7882-4471-98AD-EDED72A06E2D}">
@@ -4471,8 +4471,8 @@
         </a:p>
       </dsp:txBody>
       <dsp:txXfrm>
-        <a:off x="6120681" y="1728190"/>
-        <a:ext cx="2213191" cy="1066647"/>
+        <a:off x="6151922" y="1759431"/>
+        <a:ext cx="2150709" cy="1004165"/>
       </dsp:txXfrm>
     </dsp:sp>
     <dsp:sp modelId="{C187702E-51EF-4FC5-95AA-90B3C81FA086}">
@@ -4551,9 +4551,9 @@
           <a:endParaRPr lang="de-DE" sz="2500" kern="1200"/>
         </a:p>
       </dsp:txBody>
-      <dsp:txXfrm rot="10821407">
-        <a:off x="5458313" y="1977520"/>
-        <a:ext cx="468079" cy="548871"/>
+      <dsp:txXfrm rot="10800000">
+        <a:off x="5598736" y="2087731"/>
+        <a:ext cx="327655" cy="329323"/>
       </dsp:txXfrm>
     </dsp:sp>
     <dsp:sp modelId="{FAC03DC4-EE0B-4F48-810D-D7D90D29CDA7}">
@@ -4641,8 +4641,8 @@
         </a:p>
       </dsp:txBody>
       <dsp:txXfrm>
-        <a:off x="3024338" y="1728197"/>
-        <a:ext cx="2213191" cy="1028071"/>
+        <a:off x="3054449" y="1758308"/>
+        <a:ext cx="2152969" cy="967849"/>
       </dsp:txXfrm>
     </dsp:sp>
     <dsp:sp modelId="{B11A5A4A-6892-4B2E-B725-ECE29BCF5F77}">
@@ -4721,9 +4721,9 @@
           <a:endParaRPr lang="de-DE" sz="2500" kern="1200"/>
         </a:p>
       </dsp:txBody>
-      <dsp:txXfrm rot="10815290">
-        <a:off x="2415975" y="1961125"/>
-        <a:ext cx="429912" cy="548871"/>
+      <dsp:txXfrm rot="10800000">
+        <a:off x="2544948" y="2071186"/>
+        <a:ext cx="300938" cy="329323"/>
       </dsp:txXfrm>
     </dsp:sp>
     <dsp:sp modelId="{25B326A3-A87D-4B61-8CBD-2F11BDEA96BC}">
@@ -4811,8 +4811,8 @@
         </a:p>
       </dsp:txBody>
       <dsp:txXfrm>
-        <a:off x="0" y="1728190"/>
-        <a:ext cx="2213191" cy="1001181"/>
+        <a:off x="29324" y="1757514"/>
+        <a:ext cx="2154543" cy="942533"/>
       </dsp:txXfrm>
     </dsp:sp>
   </dsp:spTree>
@@ -8079,7 +8079,7 @@
     </p:spTree>
     <p:extLst>
       <p:ext uri="{BB962C8B-B14F-4D97-AF65-F5344CB8AC3E}">
-        <p14:creationId xmlns:p14="http://schemas.microsoft.com/office/powerpoint/2010/main" xmlns="" val="3306506664"/>
+        <p14:creationId xmlns:p14="http://schemas.microsoft.com/office/powerpoint/2010/main" val="3306506664"/>
       </p:ext>
     </p:extLst>
   </p:cSld>
@@ -8655,7 +8655,7 @@
     </p:spTree>
     <p:extLst>
       <p:ext uri="{BB962C8B-B14F-4D97-AF65-F5344CB8AC3E}">
-        <p14:creationId xmlns:p14="http://schemas.microsoft.com/office/powerpoint/2010/main" xmlns="" val="3290858648"/>
+        <p14:creationId xmlns:p14="http://schemas.microsoft.com/office/powerpoint/2010/main" val="3290858648"/>
       </p:ext>
     </p:extLst>
   </p:cSld>
@@ -9626,9 +9626,698 @@
     </p:spTree>
     <p:extLst>
       <p:ext uri="{BB962C8B-B14F-4D97-AF65-F5344CB8AC3E}">
-        <p14:creationId xmlns:p14="http://schemas.microsoft.com/office/powerpoint/2010/main" xmlns="" val="3579872104"/>
+        <p14:creationId xmlns:p14="http://schemas.microsoft.com/office/powerpoint/2010/main" val="3579872104"/>
       </p:ext>
     </p:extLst>
+  </p:cSld>
+  <p:clrMapOvr>
+    <a:masterClrMapping/>
+  </p:clrMapOvr>
+</p:notes>
+</file>
+
+<file path=ppt/notesSlides/notesSlide11.xml><?xml version="1.0" encoding="utf-8"?>
+<p:notes xmlns:a="http://schemas.openxmlformats.org/drawingml/2006/main" xmlns:r="http://schemas.openxmlformats.org/officeDocument/2006/relationships" xmlns:p="http://schemas.openxmlformats.org/presentationml/2006/main">
+  <p:cSld>
+    <p:spTree>
+      <p:nvGrpSpPr>
+        <p:cNvPr id="1" name=""/>
+        <p:cNvGrpSpPr/>
+        <p:nvPr/>
+      </p:nvGrpSpPr>
+      <p:grpSpPr>
+        <a:xfrm>
+          <a:off x="0" y="0"/>
+          <a:ext cx="0" cy="0"/>
+          <a:chOff x="0" y="0"/>
+          <a:chExt cx="0" cy="0"/>
+        </a:xfrm>
+      </p:grpSpPr>
+      <p:sp>
+        <p:nvSpPr>
+          <p:cNvPr id="1048599" name="Rectangle 3"/>
+          <p:cNvSpPr>
+            <a:spLocks noGrp="1" noChangeArrowheads="1"/>
+          </p:cNvSpPr>
+          <p:nvPr>
+            <p:ph type="dt" sz="quarter"/>
+          </p:nvPr>
+        </p:nvSpPr>
+        <p:spPr>
+          <a:noFill/>
+        </p:spPr>
+        <p:txBody>
+          <a:bodyPr/>
+          <a:lstStyle>
+            <a:lvl1pPr eaLnBrk="0" hangingPunct="0">
+              <a:tabLst>
+                <a:tab pos="719339" algn="l"/>
+                <a:tab pos="1438679" algn="l"/>
+              </a:tabLst>
+              <a:defRPr>
+                <a:solidFill>
+                  <a:schemeClr val="bg1"/>
+                </a:solidFill>
+                <a:latin typeface="Arial" pitchFamily="34" charset="0"/>
+              </a:defRPr>
+            </a:lvl1pPr>
+            <a:lvl2pPr marL="738269" indent="-283950" eaLnBrk="0" hangingPunct="0">
+              <a:tabLst>
+                <a:tab pos="719339" algn="l"/>
+                <a:tab pos="1438679" algn="l"/>
+              </a:tabLst>
+              <a:defRPr>
+                <a:solidFill>
+                  <a:schemeClr val="bg1"/>
+                </a:solidFill>
+                <a:latin typeface="Arial" pitchFamily="34" charset="0"/>
+              </a:defRPr>
+            </a:lvl2pPr>
+            <a:lvl3pPr marL="1135799" indent="-227160" eaLnBrk="0" hangingPunct="0">
+              <a:tabLst>
+                <a:tab pos="719339" algn="l"/>
+                <a:tab pos="1438679" algn="l"/>
+              </a:tabLst>
+              <a:defRPr>
+                <a:solidFill>
+                  <a:schemeClr val="bg1"/>
+                </a:solidFill>
+                <a:latin typeface="Arial" pitchFamily="34" charset="0"/>
+              </a:defRPr>
+            </a:lvl3pPr>
+            <a:lvl4pPr marL="1590119" indent="-227160" eaLnBrk="0" hangingPunct="0">
+              <a:tabLst>
+                <a:tab pos="719339" algn="l"/>
+                <a:tab pos="1438679" algn="l"/>
+              </a:tabLst>
+              <a:defRPr>
+                <a:solidFill>
+                  <a:schemeClr val="bg1"/>
+                </a:solidFill>
+                <a:latin typeface="Arial" pitchFamily="34" charset="0"/>
+              </a:defRPr>
+            </a:lvl4pPr>
+            <a:lvl5pPr marL="2044438" indent="-227160" eaLnBrk="0" hangingPunct="0">
+              <a:tabLst>
+                <a:tab pos="719339" algn="l"/>
+                <a:tab pos="1438679" algn="l"/>
+              </a:tabLst>
+              <a:defRPr>
+                <a:solidFill>
+                  <a:schemeClr val="bg1"/>
+                </a:solidFill>
+                <a:latin typeface="Arial" pitchFamily="34" charset="0"/>
+              </a:defRPr>
+            </a:lvl5pPr>
+            <a:lvl6pPr marL="2498758" indent="-227160" algn="ctr" defTabSz="446433" eaLnBrk="0" fontAlgn="base" hangingPunct="0">
+              <a:lnSpc>
+                <a:spcPct val="93000"/>
+              </a:lnSpc>
+              <a:spcBef>
+                <a:spcPct val="0"/>
+              </a:spcBef>
+              <a:spcAft>
+                <a:spcPct val="0"/>
+              </a:spcAft>
+              <a:buClr>
+                <a:srgbClr val="000000"/>
+              </a:buClr>
+              <a:buSzPct val="100000"/>
+              <a:buFont typeface="Arial" pitchFamily="34" charset="0"/>
+              <a:tabLst>
+                <a:tab pos="719339" algn="l"/>
+                <a:tab pos="1438679" algn="l"/>
+              </a:tabLst>
+              <a:defRPr>
+                <a:solidFill>
+                  <a:schemeClr val="bg1"/>
+                </a:solidFill>
+                <a:latin typeface="Arial" pitchFamily="34" charset="0"/>
+              </a:defRPr>
+            </a:lvl6pPr>
+            <a:lvl7pPr marL="2953078" indent="-227160" algn="ctr" defTabSz="446433" eaLnBrk="0" fontAlgn="base" hangingPunct="0">
+              <a:lnSpc>
+                <a:spcPct val="93000"/>
+              </a:lnSpc>
+              <a:spcBef>
+                <a:spcPct val="0"/>
+              </a:spcBef>
+              <a:spcAft>
+                <a:spcPct val="0"/>
+              </a:spcAft>
+              <a:buClr>
+                <a:srgbClr val="000000"/>
+              </a:buClr>
+              <a:buSzPct val="100000"/>
+              <a:buFont typeface="Arial" pitchFamily="34" charset="0"/>
+              <a:tabLst>
+                <a:tab pos="719339" algn="l"/>
+                <a:tab pos="1438679" algn="l"/>
+              </a:tabLst>
+              <a:defRPr>
+                <a:solidFill>
+                  <a:schemeClr val="bg1"/>
+                </a:solidFill>
+                <a:latin typeface="Arial" pitchFamily="34" charset="0"/>
+              </a:defRPr>
+            </a:lvl7pPr>
+            <a:lvl8pPr marL="3407397" indent="-227160" algn="ctr" defTabSz="446433" eaLnBrk="0" fontAlgn="base" hangingPunct="0">
+              <a:lnSpc>
+                <a:spcPct val="93000"/>
+              </a:lnSpc>
+              <a:spcBef>
+                <a:spcPct val="0"/>
+              </a:spcBef>
+              <a:spcAft>
+                <a:spcPct val="0"/>
+              </a:spcAft>
+              <a:buClr>
+                <a:srgbClr val="000000"/>
+              </a:buClr>
+              <a:buSzPct val="100000"/>
+              <a:buFont typeface="Arial" pitchFamily="34" charset="0"/>
+              <a:tabLst>
+                <a:tab pos="719339" algn="l"/>
+                <a:tab pos="1438679" algn="l"/>
+              </a:tabLst>
+              <a:defRPr>
+                <a:solidFill>
+                  <a:schemeClr val="bg1"/>
+                </a:solidFill>
+                <a:latin typeface="Arial" pitchFamily="34" charset="0"/>
+              </a:defRPr>
+            </a:lvl8pPr>
+            <a:lvl9pPr marL="3861717" indent="-227160" algn="ctr" defTabSz="446433" eaLnBrk="0" fontAlgn="base" hangingPunct="0">
+              <a:lnSpc>
+                <a:spcPct val="93000"/>
+              </a:lnSpc>
+              <a:spcBef>
+                <a:spcPct val="0"/>
+              </a:spcBef>
+              <a:spcAft>
+                <a:spcPct val="0"/>
+              </a:spcAft>
+              <a:buClr>
+                <a:srgbClr val="000000"/>
+              </a:buClr>
+              <a:buSzPct val="100000"/>
+              <a:buFont typeface="Arial" pitchFamily="34" charset="0"/>
+              <a:tabLst>
+                <a:tab pos="719339" algn="l"/>
+                <a:tab pos="1438679" algn="l"/>
+              </a:tabLst>
+              <a:defRPr>
+                <a:solidFill>
+                  <a:schemeClr val="bg1"/>
+                </a:solidFill>
+                <a:latin typeface="Arial" pitchFamily="34" charset="0"/>
+              </a:defRPr>
+            </a:lvl9pPr>
+          </a:lstStyle>
+          <a:p>
+            <a:pPr eaLnBrk="1" hangingPunct="1"/>
+            <a:r>
+              <a:rPr lang="en-GB" dirty="0">
+                <a:solidFill>
+                  <a:srgbClr val="000000"/>
+                </a:solidFill>
+                <a:latin typeface="Stafford" pitchFamily="2" charset="0"/>
+              </a:rPr>
+              <a:t>November 19, 2007</a:t>
+            </a:r>
+          </a:p>
+        </p:txBody>
+      </p:sp>
+      <p:sp>
+        <p:nvSpPr>
+          <p:cNvPr id="1048600" name="Rectangle 6"/>
+          <p:cNvSpPr>
+            <a:spLocks noGrp="1" noChangeArrowheads="1"/>
+          </p:cNvSpPr>
+          <p:nvPr>
+            <p:ph type="ftr" sz="quarter"/>
+          </p:nvPr>
+        </p:nvSpPr>
+        <p:spPr>
+          <a:noFill/>
+        </p:spPr>
+        <p:txBody>
+          <a:bodyPr/>
+          <a:lstStyle>
+            <a:lvl1pPr eaLnBrk="0" hangingPunct="0">
+              <a:tabLst>
+                <a:tab pos="719339" algn="l"/>
+                <a:tab pos="1438679" algn="l"/>
+                <a:tab pos="2158018" algn="l"/>
+                <a:tab pos="2877358" algn="l"/>
+                <a:tab pos="3596697" algn="l"/>
+              </a:tabLst>
+              <a:defRPr>
+                <a:solidFill>
+                  <a:schemeClr val="bg1"/>
+                </a:solidFill>
+                <a:latin typeface="Arial" pitchFamily="34" charset="0"/>
+              </a:defRPr>
+            </a:lvl1pPr>
+            <a:lvl2pPr marL="738269" indent="-283950" eaLnBrk="0" hangingPunct="0">
+              <a:tabLst>
+                <a:tab pos="719339" algn="l"/>
+                <a:tab pos="1438679" algn="l"/>
+                <a:tab pos="2158018" algn="l"/>
+                <a:tab pos="2877358" algn="l"/>
+                <a:tab pos="3596697" algn="l"/>
+              </a:tabLst>
+              <a:defRPr>
+                <a:solidFill>
+                  <a:schemeClr val="bg1"/>
+                </a:solidFill>
+                <a:latin typeface="Arial" pitchFamily="34" charset="0"/>
+              </a:defRPr>
+            </a:lvl2pPr>
+            <a:lvl3pPr marL="1135799" indent="-227160" eaLnBrk="0" hangingPunct="0">
+              <a:tabLst>
+                <a:tab pos="719339" algn="l"/>
+                <a:tab pos="1438679" algn="l"/>
+                <a:tab pos="2158018" algn="l"/>
+                <a:tab pos="2877358" algn="l"/>
+                <a:tab pos="3596697" algn="l"/>
+              </a:tabLst>
+              <a:defRPr>
+                <a:solidFill>
+                  <a:schemeClr val="bg1"/>
+                </a:solidFill>
+                <a:latin typeface="Arial" pitchFamily="34" charset="0"/>
+              </a:defRPr>
+            </a:lvl3pPr>
+            <a:lvl4pPr marL="1590119" indent="-227160" eaLnBrk="0" hangingPunct="0">
+              <a:tabLst>
+                <a:tab pos="719339" algn="l"/>
+                <a:tab pos="1438679" algn="l"/>
+                <a:tab pos="2158018" algn="l"/>
+                <a:tab pos="2877358" algn="l"/>
+                <a:tab pos="3596697" algn="l"/>
+              </a:tabLst>
+              <a:defRPr>
+                <a:solidFill>
+                  <a:schemeClr val="bg1"/>
+                </a:solidFill>
+                <a:latin typeface="Arial" pitchFamily="34" charset="0"/>
+              </a:defRPr>
+            </a:lvl4pPr>
+            <a:lvl5pPr marL="2044438" indent="-227160" eaLnBrk="0" hangingPunct="0">
+              <a:tabLst>
+                <a:tab pos="719339" algn="l"/>
+                <a:tab pos="1438679" algn="l"/>
+                <a:tab pos="2158018" algn="l"/>
+                <a:tab pos="2877358" algn="l"/>
+                <a:tab pos="3596697" algn="l"/>
+              </a:tabLst>
+              <a:defRPr>
+                <a:solidFill>
+                  <a:schemeClr val="bg1"/>
+                </a:solidFill>
+                <a:latin typeface="Arial" pitchFamily="34" charset="0"/>
+              </a:defRPr>
+            </a:lvl5pPr>
+            <a:lvl6pPr marL="2498758" indent="-227160" algn="ctr" defTabSz="446433" eaLnBrk="0" fontAlgn="base" hangingPunct="0">
+              <a:lnSpc>
+                <a:spcPct val="93000"/>
+              </a:lnSpc>
+              <a:spcBef>
+                <a:spcPct val="0"/>
+              </a:spcBef>
+              <a:spcAft>
+                <a:spcPct val="0"/>
+              </a:spcAft>
+              <a:buClr>
+                <a:srgbClr val="000000"/>
+              </a:buClr>
+              <a:buSzPct val="100000"/>
+              <a:buFont typeface="Arial" pitchFamily="34" charset="0"/>
+              <a:tabLst>
+                <a:tab pos="719339" algn="l"/>
+                <a:tab pos="1438679" algn="l"/>
+                <a:tab pos="2158018" algn="l"/>
+                <a:tab pos="2877358" algn="l"/>
+                <a:tab pos="3596697" algn="l"/>
+              </a:tabLst>
+              <a:defRPr>
+                <a:solidFill>
+                  <a:schemeClr val="bg1"/>
+                </a:solidFill>
+                <a:latin typeface="Arial" pitchFamily="34" charset="0"/>
+              </a:defRPr>
+            </a:lvl6pPr>
+            <a:lvl7pPr marL="2953078" indent="-227160" algn="ctr" defTabSz="446433" eaLnBrk="0" fontAlgn="base" hangingPunct="0">
+              <a:lnSpc>
+                <a:spcPct val="93000"/>
+              </a:lnSpc>
+              <a:spcBef>
+                <a:spcPct val="0"/>
+              </a:spcBef>
+              <a:spcAft>
+                <a:spcPct val="0"/>
+              </a:spcAft>
+              <a:buClr>
+                <a:srgbClr val="000000"/>
+              </a:buClr>
+              <a:buSzPct val="100000"/>
+              <a:buFont typeface="Arial" pitchFamily="34" charset="0"/>
+              <a:tabLst>
+                <a:tab pos="719339" algn="l"/>
+                <a:tab pos="1438679" algn="l"/>
+                <a:tab pos="2158018" algn="l"/>
+                <a:tab pos="2877358" algn="l"/>
+                <a:tab pos="3596697" algn="l"/>
+              </a:tabLst>
+              <a:defRPr>
+                <a:solidFill>
+                  <a:schemeClr val="bg1"/>
+                </a:solidFill>
+                <a:latin typeface="Arial" pitchFamily="34" charset="0"/>
+              </a:defRPr>
+            </a:lvl7pPr>
+            <a:lvl8pPr marL="3407397" indent="-227160" algn="ctr" defTabSz="446433" eaLnBrk="0" fontAlgn="base" hangingPunct="0">
+              <a:lnSpc>
+                <a:spcPct val="93000"/>
+              </a:lnSpc>
+              <a:spcBef>
+                <a:spcPct val="0"/>
+              </a:spcBef>
+              <a:spcAft>
+                <a:spcPct val="0"/>
+              </a:spcAft>
+              <a:buClr>
+                <a:srgbClr val="000000"/>
+              </a:buClr>
+              <a:buSzPct val="100000"/>
+              <a:buFont typeface="Arial" pitchFamily="34" charset="0"/>
+              <a:tabLst>
+                <a:tab pos="719339" algn="l"/>
+                <a:tab pos="1438679" algn="l"/>
+                <a:tab pos="2158018" algn="l"/>
+                <a:tab pos="2877358" algn="l"/>
+                <a:tab pos="3596697" algn="l"/>
+              </a:tabLst>
+              <a:defRPr>
+                <a:solidFill>
+                  <a:schemeClr val="bg1"/>
+                </a:solidFill>
+                <a:latin typeface="Arial" pitchFamily="34" charset="0"/>
+              </a:defRPr>
+            </a:lvl8pPr>
+            <a:lvl9pPr marL="3861717" indent="-227160" algn="ctr" defTabSz="446433" eaLnBrk="0" fontAlgn="base" hangingPunct="0">
+              <a:lnSpc>
+                <a:spcPct val="93000"/>
+              </a:lnSpc>
+              <a:spcBef>
+                <a:spcPct val="0"/>
+              </a:spcBef>
+              <a:spcAft>
+                <a:spcPct val="0"/>
+              </a:spcAft>
+              <a:buClr>
+                <a:srgbClr val="000000"/>
+              </a:buClr>
+              <a:buSzPct val="100000"/>
+              <a:buFont typeface="Arial" pitchFamily="34" charset="0"/>
+              <a:tabLst>
+                <a:tab pos="719339" algn="l"/>
+                <a:tab pos="1438679" algn="l"/>
+                <a:tab pos="2158018" algn="l"/>
+                <a:tab pos="2877358" algn="l"/>
+                <a:tab pos="3596697" algn="l"/>
+              </a:tabLst>
+              <a:defRPr>
+                <a:solidFill>
+                  <a:schemeClr val="bg1"/>
+                </a:solidFill>
+                <a:latin typeface="Arial" pitchFamily="34" charset="0"/>
+              </a:defRPr>
+            </a:lvl9pPr>
+          </a:lstStyle>
+          <a:p>
+            <a:pPr eaLnBrk="1" hangingPunct="1"/>
+            <a:r>
+              <a:rPr lang="en-GB" dirty="0">
+                <a:solidFill>
+                  <a:srgbClr val="000000"/>
+                </a:solidFill>
+                <a:latin typeface="Stafford" pitchFamily="2" charset="0"/>
+              </a:rPr>
+              <a:t>|  </a:t>
+            </a:r>
+          </a:p>
+        </p:txBody>
+      </p:sp>
+      <p:sp>
+        <p:nvSpPr>
+          <p:cNvPr id="1048601" name="Rectangle 7"/>
+          <p:cNvSpPr>
+            <a:spLocks noGrp="1" noChangeArrowheads="1"/>
+          </p:cNvSpPr>
+          <p:nvPr>
+            <p:ph type="sldNum" sz="quarter"/>
+          </p:nvPr>
+        </p:nvSpPr>
+        <p:spPr>
+          <a:noFill/>
+        </p:spPr>
+        <p:txBody>
+          <a:bodyPr/>
+          <a:lstStyle>
+            <a:lvl1pPr eaLnBrk="0" hangingPunct="0">
+              <a:tabLst>
+                <a:tab pos="719339" algn="l"/>
+              </a:tabLst>
+              <a:defRPr>
+                <a:solidFill>
+                  <a:schemeClr val="bg1"/>
+                </a:solidFill>
+                <a:latin typeface="Arial" pitchFamily="34" charset="0"/>
+              </a:defRPr>
+            </a:lvl1pPr>
+            <a:lvl2pPr marL="738269" indent="-283950" eaLnBrk="0" hangingPunct="0">
+              <a:tabLst>
+                <a:tab pos="719339" algn="l"/>
+              </a:tabLst>
+              <a:defRPr>
+                <a:solidFill>
+                  <a:schemeClr val="bg1"/>
+                </a:solidFill>
+                <a:latin typeface="Arial" pitchFamily="34" charset="0"/>
+              </a:defRPr>
+            </a:lvl2pPr>
+            <a:lvl3pPr marL="1135799" indent="-227160" eaLnBrk="0" hangingPunct="0">
+              <a:tabLst>
+                <a:tab pos="719339" algn="l"/>
+              </a:tabLst>
+              <a:defRPr>
+                <a:solidFill>
+                  <a:schemeClr val="bg1"/>
+                </a:solidFill>
+                <a:latin typeface="Arial" pitchFamily="34" charset="0"/>
+              </a:defRPr>
+            </a:lvl3pPr>
+            <a:lvl4pPr marL="1590119" indent="-227160" eaLnBrk="0" hangingPunct="0">
+              <a:tabLst>
+                <a:tab pos="719339" algn="l"/>
+              </a:tabLst>
+              <a:defRPr>
+                <a:solidFill>
+                  <a:schemeClr val="bg1"/>
+                </a:solidFill>
+                <a:latin typeface="Arial" pitchFamily="34" charset="0"/>
+              </a:defRPr>
+            </a:lvl4pPr>
+            <a:lvl5pPr marL="2044438" indent="-227160" eaLnBrk="0" hangingPunct="0">
+              <a:tabLst>
+                <a:tab pos="719339" algn="l"/>
+              </a:tabLst>
+              <a:defRPr>
+                <a:solidFill>
+                  <a:schemeClr val="bg1"/>
+                </a:solidFill>
+                <a:latin typeface="Arial" pitchFamily="34" charset="0"/>
+              </a:defRPr>
+            </a:lvl5pPr>
+            <a:lvl6pPr marL="2498758" indent="-227160" algn="ctr" defTabSz="446433" eaLnBrk="0" fontAlgn="base" hangingPunct="0">
+              <a:lnSpc>
+                <a:spcPct val="93000"/>
+              </a:lnSpc>
+              <a:spcBef>
+                <a:spcPct val="0"/>
+              </a:spcBef>
+              <a:spcAft>
+                <a:spcPct val="0"/>
+              </a:spcAft>
+              <a:buClr>
+                <a:srgbClr val="000000"/>
+              </a:buClr>
+              <a:buSzPct val="100000"/>
+              <a:buFont typeface="Arial" pitchFamily="34" charset="0"/>
+              <a:tabLst>
+                <a:tab pos="719339" algn="l"/>
+              </a:tabLst>
+              <a:defRPr>
+                <a:solidFill>
+                  <a:schemeClr val="bg1"/>
+                </a:solidFill>
+                <a:latin typeface="Arial" pitchFamily="34" charset="0"/>
+              </a:defRPr>
+            </a:lvl6pPr>
+            <a:lvl7pPr marL="2953078" indent="-227160" algn="ctr" defTabSz="446433" eaLnBrk="0" fontAlgn="base" hangingPunct="0">
+              <a:lnSpc>
+                <a:spcPct val="93000"/>
+              </a:lnSpc>
+              <a:spcBef>
+                <a:spcPct val="0"/>
+              </a:spcBef>
+              <a:spcAft>
+                <a:spcPct val="0"/>
+              </a:spcAft>
+              <a:buClr>
+                <a:srgbClr val="000000"/>
+              </a:buClr>
+              <a:buSzPct val="100000"/>
+              <a:buFont typeface="Arial" pitchFamily="34" charset="0"/>
+              <a:tabLst>
+                <a:tab pos="719339" algn="l"/>
+              </a:tabLst>
+              <a:defRPr>
+                <a:solidFill>
+                  <a:schemeClr val="bg1"/>
+                </a:solidFill>
+                <a:latin typeface="Arial" pitchFamily="34" charset="0"/>
+              </a:defRPr>
+            </a:lvl7pPr>
+            <a:lvl8pPr marL="3407397" indent="-227160" algn="ctr" defTabSz="446433" eaLnBrk="0" fontAlgn="base" hangingPunct="0">
+              <a:lnSpc>
+                <a:spcPct val="93000"/>
+              </a:lnSpc>
+              <a:spcBef>
+                <a:spcPct val="0"/>
+              </a:spcBef>
+              <a:spcAft>
+                <a:spcPct val="0"/>
+              </a:spcAft>
+              <a:buClr>
+                <a:srgbClr val="000000"/>
+              </a:buClr>
+              <a:buSzPct val="100000"/>
+              <a:buFont typeface="Arial" pitchFamily="34" charset="0"/>
+              <a:tabLst>
+                <a:tab pos="719339" algn="l"/>
+              </a:tabLst>
+              <a:defRPr>
+                <a:solidFill>
+                  <a:schemeClr val="bg1"/>
+                </a:solidFill>
+                <a:latin typeface="Arial" pitchFamily="34" charset="0"/>
+              </a:defRPr>
+            </a:lvl8pPr>
+            <a:lvl9pPr marL="3861717" indent="-227160" algn="ctr" defTabSz="446433" eaLnBrk="0" fontAlgn="base" hangingPunct="0">
+              <a:lnSpc>
+                <a:spcPct val="93000"/>
+              </a:lnSpc>
+              <a:spcBef>
+                <a:spcPct val="0"/>
+              </a:spcBef>
+              <a:spcAft>
+                <a:spcPct val="0"/>
+              </a:spcAft>
+              <a:buClr>
+                <a:srgbClr val="000000"/>
+              </a:buClr>
+              <a:buSzPct val="100000"/>
+              <a:buFont typeface="Arial" pitchFamily="34" charset="0"/>
+              <a:tabLst>
+                <a:tab pos="719339" algn="l"/>
+              </a:tabLst>
+              <a:defRPr>
+                <a:solidFill>
+                  <a:schemeClr val="bg1"/>
+                </a:solidFill>
+                <a:latin typeface="Arial" pitchFamily="34" charset="0"/>
+              </a:defRPr>
+            </a:lvl9pPr>
+          </a:lstStyle>
+          <a:p>
+            <a:pPr eaLnBrk="1" hangingPunct="1"/>
+            <a:r>
+              <a:rPr lang="en-GB" dirty="0">
+                <a:solidFill>
+                  <a:srgbClr val="000000"/>
+                </a:solidFill>
+                <a:latin typeface="Stafford" pitchFamily="2" charset="0"/>
+              </a:rPr>
+              <a:t>|  </a:t>
+            </a:r>
+            <a:fld id="{182A058B-C42E-403D-AC0C-8E31B078BE7A}" type="slidenum">
+              <a:rPr lang="en-GB" smtClean="0">
+                <a:solidFill>
+                  <a:srgbClr val="000000"/>
+                </a:solidFill>
+                <a:latin typeface="Stafford" pitchFamily="2" charset="0"/>
+              </a:rPr>
+              <a:pPr eaLnBrk="1" hangingPunct="1"/>
+              <a:t>14</a:t>
+            </a:fld>
+            <a:endParaRPr lang="en-GB" dirty="0">
+              <a:solidFill>
+                <a:srgbClr val="000000"/>
+              </a:solidFill>
+              <a:latin typeface="Stafford" pitchFamily="2" charset="0"/>
+            </a:endParaRPr>
+          </a:p>
+        </p:txBody>
+      </p:sp>
+      <p:sp>
+        <p:nvSpPr>
+          <p:cNvPr id="1048602" name="Rectangle 2"/>
+          <p:cNvSpPr>
+            <a:spLocks noGrp="1" noRot="1" noChangeAspect="1" noChangeArrowheads="1" noTextEdit="1"/>
+          </p:cNvSpPr>
+          <p:nvPr>
+            <p:ph type="sldImg"/>
+          </p:nvPr>
+        </p:nvSpPr>
+        <p:spPr>
+          <a:xfrm>
+            <a:off x="1168400" y="1004888"/>
+            <a:ext cx="4440238" cy="3330575"/>
+          </a:xfrm>
+        </p:spPr>
+      </p:sp>
+      <p:sp>
+        <p:nvSpPr>
+          <p:cNvPr id="1048603" name="Rectangle 3"/>
+          <p:cNvSpPr>
+            <a:spLocks noGrp="1" noChangeArrowheads="1"/>
+          </p:cNvSpPr>
+          <p:nvPr>
+            <p:ph type="body" idx="1"/>
+          </p:nvPr>
+        </p:nvSpPr>
+        <p:spPr>
+          <a:xfrm>
+            <a:off x="188827" y="4649648"/>
+            <a:ext cx="6418453" cy="4648061"/>
+          </a:xfrm>
+          <a:noFill/>
+        </p:spPr>
+        <p:txBody>
+          <a:bodyPr/>
+          <a:lstStyle/>
+          <a:p>
+            <a:endParaRPr lang="en-US" dirty="0"/>
+          </a:p>
+        </p:txBody>
+      </p:sp>
+    </p:spTree>
+    <p:custDataLst>
+      <p:tags r:id="rId1"/>
+    </p:custDataLst>
   </p:cSld>
   <p:clrMapOvr>
     <a:masterClrMapping/>
@@ -9762,7 +10451,7 @@
     </p:spTree>
     <p:extLst>
       <p:ext uri="{BB962C8B-B14F-4D97-AF65-F5344CB8AC3E}">
-        <p14:creationId xmlns:p14="http://schemas.microsoft.com/office/powerpoint/2010/main" xmlns="" val="4086205857"/>
+        <p14:creationId xmlns:p14="http://schemas.microsoft.com/office/powerpoint/2010/main" val="4086205857"/>
       </p:ext>
     </p:extLst>
   </p:cSld>
@@ -9898,7 +10587,7 @@
     </p:spTree>
     <p:extLst>
       <p:ext uri="{BB962C8B-B14F-4D97-AF65-F5344CB8AC3E}">
-        <p14:creationId xmlns:p14="http://schemas.microsoft.com/office/powerpoint/2010/main" xmlns="" val="3979630434"/>
+        <p14:creationId xmlns:p14="http://schemas.microsoft.com/office/powerpoint/2010/main" val="3979630434"/>
       </p:ext>
     </p:extLst>
   </p:cSld>
@@ -10034,7 +10723,7 @@
     </p:spTree>
     <p:extLst>
       <p:ext uri="{BB962C8B-B14F-4D97-AF65-F5344CB8AC3E}">
-        <p14:creationId xmlns:p14="http://schemas.microsoft.com/office/powerpoint/2010/main" xmlns="" val="894590783"/>
+        <p14:creationId xmlns:p14="http://schemas.microsoft.com/office/powerpoint/2010/main" val="894590783"/>
       </p:ext>
     </p:extLst>
   </p:cSld>
@@ -10170,7 +10859,7 @@
     </p:spTree>
     <p:extLst>
       <p:ext uri="{BB962C8B-B14F-4D97-AF65-F5344CB8AC3E}">
-        <p14:creationId xmlns:p14="http://schemas.microsoft.com/office/powerpoint/2010/main" xmlns="" val="894590783"/>
+        <p14:creationId xmlns:p14="http://schemas.microsoft.com/office/powerpoint/2010/main" val="894590783"/>
       </p:ext>
     </p:extLst>
   </p:cSld>
@@ -10306,7 +10995,7 @@
     </p:spTree>
     <p:extLst>
       <p:ext uri="{BB962C8B-B14F-4D97-AF65-F5344CB8AC3E}">
-        <p14:creationId xmlns:p14="http://schemas.microsoft.com/office/powerpoint/2010/main" xmlns="" val="894590783"/>
+        <p14:creationId xmlns:p14="http://schemas.microsoft.com/office/powerpoint/2010/main" val="894590783"/>
       </p:ext>
     </p:extLst>
   </p:cSld>
@@ -10442,7 +11131,7 @@
     </p:spTree>
     <p:extLst>
       <p:ext uri="{BB962C8B-B14F-4D97-AF65-F5344CB8AC3E}">
-        <p14:creationId xmlns:p14="http://schemas.microsoft.com/office/powerpoint/2010/main" xmlns="" val="894590783"/>
+        <p14:creationId xmlns:p14="http://schemas.microsoft.com/office/powerpoint/2010/main" val="894590783"/>
       </p:ext>
     </p:extLst>
   </p:cSld>
@@ -10578,7 +11267,7 @@
     </p:spTree>
     <p:extLst>
       <p:ext uri="{BB962C8B-B14F-4D97-AF65-F5344CB8AC3E}">
-        <p14:creationId xmlns:p14="http://schemas.microsoft.com/office/powerpoint/2010/main" xmlns="" val="894590783"/>
+        <p14:creationId xmlns:p14="http://schemas.microsoft.com/office/powerpoint/2010/main" val="894590783"/>
       </p:ext>
     </p:extLst>
   </p:cSld>
@@ -10714,7 +11403,7 @@
     </p:spTree>
     <p:extLst>
       <p:ext uri="{BB962C8B-B14F-4D97-AF65-F5344CB8AC3E}">
-        <p14:creationId xmlns:p14="http://schemas.microsoft.com/office/powerpoint/2010/main" xmlns="" val="1472061649"/>
+        <p14:creationId xmlns:p14="http://schemas.microsoft.com/office/powerpoint/2010/main" val="1472061649"/>
       </p:ext>
     </p:extLst>
   </p:cSld>
@@ -15260,7 +15949,7 @@
                 <a:buFont typeface="Arial" pitchFamily="34" charset="0"/>
                 <a:buNone/>
               </a:pPr>
-              <a:t>3. März 2019</a:t>
+              <a:t>4. März 2019</a:t>
             </a:fld>
             <a:r>
               <a:rPr kumimoji="0" lang="en-US" sz="1100" b="0" i="0" u="none" strike="noStrike" kern="1200" cap="none" spc="0" normalizeH="0" baseline="0" noProof="0" dirty="0">
@@ -15838,7 +16527,11 @@
             </a:r>
             <a:r>
               <a:rPr lang="de-DE" dirty="0" err="1"/>
-              <a:t>etit</a:t>
+              <a:t>E</a:t>
+            </a:r>
+            <a:r>
+              <a:rPr lang="de-DE" dirty="0" err="1" smtClean="0"/>
+              <a:t>tit</a:t>
             </a:r>
             <a:endParaRPr lang="de-DE" dirty="0"/>
           </a:p>
@@ -16404,6 +17097,106 @@
           <a:bodyPr/>
           <a:lstStyle/>
           <a:p>
+            <a:pPr marL="0" indent="0">
+              <a:buNone/>
+            </a:pPr>
+            <a:r>
+              <a:rPr lang="de-DE" b="1" dirty="0" smtClean="0"/>
+              <a:t>Probleme</a:t>
+            </a:r>
+          </a:p>
+          <a:p>
+            <a:r>
+              <a:rPr lang="de-DE" dirty="0" smtClean="0"/>
+              <a:t>Bildprobleme mit der </a:t>
+            </a:r>
+            <a:r>
+              <a:rPr lang="de-DE" dirty="0" err="1" smtClean="0"/>
+              <a:t>Kinect</a:t>
+            </a:r>
+            <a:endParaRPr lang="de-DE" dirty="0" smtClean="0"/>
+          </a:p>
+          <a:p>
+            <a:r>
+              <a:rPr lang="de-DE" dirty="0" smtClean="0"/>
+              <a:t>Belichtungskorrektur der Weitwinkelkamera nicht abschaltbar</a:t>
+            </a:r>
+          </a:p>
+          <a:p>
+            <a:r>
+              <a:rPr lang="de-DE" dirty="0" smtClean="0"/>
+              <a:t>Begrenzung des Lenkwinkels durch das Gehäuse</a:t>
+            </a:r>
+          </a:p>
+          <a:p>
+            <a:r>
+              <a:rPr lang="de-DE" dirty="0" smtClean="0"/>
+              <a:t>Falschwerte des Front-Ultraschallsensors</a:t>
+            </a:r>
+          </a:p>
+          <a:p>
+            <a:endParaRPr lang="de-DE" dirty="0" smtClean="0"/>
+          </a:p>
+          <a:p>
+            <a:pPr marL="0" indent="0">
+              <a:buNone/>
+            </a:pPr>
+            <a:r>
+              <a:rPr lang="de-DE" b="1" dirty="0" smtClean="0"/>
+              <a:t>Verworfene Ansätze</a:t>
+            </a:r>
+            <a:endParaRPr lang="de-DE" b="1" dirty="0"/>
+          </a:p>
+          <a:p>
+            <a:r>
+              <a:rPr lang="de-DE" dirty="0" smtClean="0"/>
+              <a:t>Einbeziehung der </a:t>
+            </a:r>
+            <a:r>
+              <a:rPr lang="de-DE" dirty="0" err="1" smtClean="0"/>
+              <a:t>Odometriedaten</a:t>
+            </a:r>
+            <a:r>
+              <a:rPr lang="de-DE" dirty="0" smtClean="0"/>
+              <a:t> zur Positionsbestimmung</a:t>
+            </a:r>
+          </a:p>
+          <a:p>
+            <a:r>
+              <a:rPr lang="de-DE" dirty="0" smtClean="0"/>
+              <a:t>Bildfilterung und Edge </a:t>
+            </a:r>
+            <a:r>
+              <a:rPr lang="de-DE" dirty="0" err="1" smtClean="0"/>
+              <a:t>Detection</a:t>
+            </a:r>
+            <a:r>
+              <a:rPr lang="de-DE" dirty="0" smtClean="0"/>
+              <a:t> mit </a:t>
+            </a:r>
+            <a:r>
+              <a:rPr lang="de-DE" dirty="0" err="1" smtClean="0"/>
+              <a:t>Canny</a:t>
+            </a:r>
+            <a:endParaRPr lang="de-DE" dirty="0" smtClean="0"/>
+          </a:p>
+          <a:p>
+            <a:r>
+              <a:rPr lang="de-DE" dirty="0" err="1" smtClean="0"/>
+              <a:t>Countour</a:t>
+            </a:r>
+            <a:r>
+              <a:rPr lang="de-DE" dirty="0" smtClean="0"/>
+              <a:t> </a:t>
+            </a:r>
+            <a:r>
+              <a:rPr lang="de-DE" dirty="0" err="1" smtClean="0"/>
+              <a:t>Detection</a:t>
+            </a:r>
+            <a:r>
+              <a:rPr lang="de-DE" dirty="0" smtClean="0"/>
+              <a:t> und malen des kleinsten umrandenden Rechtecks</a:t>
+            </a:r>
             <a:endParaRPr lang="de-DE" dirty="0"/>
           </a:p>
         </p:txBody>
@@ -16486,6 +17279,42 @@
           <a:bodyPr/>
           <a:lstStyle/>
           <a:p>
+            <a:r>
+              <a:rPr lang="de-DE" dirty="0" smtClean="0"/>
+              <a:t>Relativ robuste ruhige Regelung</a:t>
+            </a:r>
+          </a:p>
+          <a:p>
+            <a:r>
+              <a:rPr lang="de-DE" dirty="0" smtClean="0"/>
+              <a:t>Großer Einfluss der Lichtverhältnisse</a:t>
+            </a:r>
+          </a:p>
+          <a:p>
+            <a:endParaRPr lang="de-DE" dirty="0" smtClean="0"/>
+          </a:p>
+          <a:p>
+            <a:endParaRPr lang="de-DE" dirty="0" smtClean="0"/>
+          </a:p>
+          <a:p>
+            <a:r>
+              <a:rPr lang="de-DE" dirty="0" smtClean="0"/>
+              <a:t>Standardisierte Halterung der Weitwinkelkamera entwickeln</a:t>
+            </a:r>
+          </a:p>
+          <a:p>
+            <a:r>
+              <a:rPr lang="de-DE" dirty="0" smtClean="0"/>
+              <a:t>Word-</a:t>
+            </a:r>
+            <a:r>
+              <a:rPr lang="de-DE" dirty="0" err="1" smtClean="0"/>
+              <a:t>Around</a:t>
+            </a:r>
+            <a:r>
+              <a:rPr lang="de-DE" dirty="0" smtClean="0"/>
+              <a:t> für Belichtungseinstellung</a:t>
+            </a:r>
             <a:endParaRPr lang="de-DE" dirty="0"/>
           </a:p>
         </p:txBody>
@@ -16524,7 +17353,7 @@
       </p:grpSpPr>
       <p:sp>
         <p:nvSpPr>
-          <p:cNvPr id="2" name="Titel 1"/>
+          <p:cNvPr id="1048595" name="Titel 2"/>
           <p:cNvSpPr>
             <a:spLocks noGrp="1"/>
           </p:cNvSpPr>
@@ -16537,13 +17366,243 @@
           <a:bodyPr/>
           <a:lstStyle/>
           <a:p>
-            <a:endParaRPr lang="de-DE"/>
+            <a:r>
+              <a:rPr lang="en-US" dirty="0"/>
+              <a:t>AUDO - Autonomous Unmanned Driving Object</a:t>
+            </a:r>
           </a:p>
         </p:txBody>
       </p:sp>
       <p:sp>
         <p:nvSpPr>
-          <p:cNvPr id="3" name="Inhaltsplatzhalter 2"/>
+          <p:cNvPr id="1048598" name="Text Box 6"/>
+          <p:cNvSpPr txBox="1">
+            <a:spLocks noChangeArrowheads="1"/>
+          </p:cNvSpPr>
+          <p:nvPr/>
+        </p:nvSpPr>
+        <p:spPr bwMode="auto">
+          <a:xfrm>
+            <a:off x="250825" y="6174423"/>
+            <a:ext cx="208281" cy="231140"/>
+          </a:xfrm>
+          <a:prstGeom prst="rect">
+            <a:avLst/>
+          </a:prstGeom>
+          <a:noFill/>
+          <a:ln>
+            <a:noFill/>
+          </a:ln>
+          <a:effectLst/>
+        </p:spPr>
+        <p:txBody>
+          <a:bodyPr wrap="none" anchor="b">
+            <a:spAutoFit/>
+          </a:bodyPr>
+          <a:lstStyle>
+            <a:lvl1pPr eaLnBrk="0" hangingPunct="0">
+              <a:defRPr>
+                <a:solidFill>
+                  <a:schemeClr val="bg1"/>
+                </a:solidFill>
+                <a:latin typeface="Arial" pitchFamily="34" charset="0"/>
+              </a:defRPr>
+            </a:lvl1pPr>
+            <a:lvl2pPr marL="742950" indent="-285750" eaLnBrk="0" hangingPunct="0">
+              <a:defRPr>
+                <a:solidFill>
+                  <a:schemeClr val="bg1"/>
+                </a:solidFill>
+                <a:latin typeface="Arial" pitchFamily="34" charset="0"/>
+              </a:defRPr>
+            </a:lvl2pPr>
+            <a:lvl3pPr marL="1143000" indent="-228600" eaLnBrk="0" hangingPunct="0">
+              <a:defRPr>
+                <a:solidFill>
+                  <a:schemeClr val="bg1"/>
+                </a:solidFill>
+                <a:latin typeface="Arial" pitchFamily="34" charset="0"/>
+              </a:defRPr>
+            </a:lvl3pPr>
+            <a:lvl4pPr marL="1600200" indent="-228600" eaLnBrk="0" hangingPunct="0">
+              <a:defRPr>
+                <a:solidFill>
+                  <a:schemeClr val="bg1"/>
+                </a:solidFill>
+                <a:latin typeface="Arial" pitchFamily="34" charset="0"/>
+              </a:defRPr>
+            </a:lvl4pPr>
+            <a:lvl5pPr marL="2057400" indent="-228600" eaLnBrk="0" hangingPunct="0">
+              <a:defRPr>
+                <a:solidFill>
+                  <a:schemeClr val="bg1"/>
+                </a:solidFill>
+                <a:latin typeface="Arial" pitchFamily="34" charset="0"/>
+              </a:defRPr>
+            </a:lvl5pPr>
+            <a:lvl6pPr marL="2514600" indent="-228600" algn="ctr" defTabSz="449263" eaLnBrk="0" fontAlgn="base" hangingPunct="0">
+              <a:lnSpc>
+                <a:spcPct val="93000"/>
+              </a:lnSpc>
+              <a:spcBef>
+                <a:spcPct val="0"/>
+              </a:spcBef>
+              <a:spcAft>
+                <a:spcPct val="0"/>
+              </a:spcAft>
+              <a:buClr>
+                <a:srgbClr val="000000"/>
+              </a:buClr>
+              <a:buSzPct val="100000"/>
+              <a:buFont typeface="Arial" pitchFamily="34" charset="0"/>
+              <a:defRPr>
+                <a:solidFill>
+                  <a:schemeClr val="bg1"/>
+                </a:solidFill>
+                <a:latin typeface="Arial" pitchFamily="34" charset="0"/>
+              </a:defRPr>
+            </a:lvl6pPr>
+            <a:lvl7pPr marL="2971800" indent="-228600" algn="ctr" defTabSz="449263" eaLnBrk="0" fontAlgn="base" hangingPunct="0">
+              <a:lnSpc>
+                <a:spcPct val="93000"/>
+              </a:lnSpc>
+              <a:spcBef>
+                <a:spcPct val="0"/>
+              </a:spcBef>
+              <a:spcAft>
+                <a:spcPct val="0"/>
+              </a:spcAft>
+              <a:buClr>
+                <a:srgbClr val="000000"/>
+              </a:buClr>
+              <a:buSzPct val="100000"/>
+              <a:buFont typeface="Arial" pitchFamily="34" charset="0"/>
+              <a:defRPr>
+                <a:solidFill>
+                  <a:schemeClr val="bg1"/>
+                </a:solidFill>
+                <a:latin typeface="Arial" pitchFamily="34" charset="0"/>
+              </a:defRPr>
+            </a:lvl7pPr>
+            <a:lvl8pPr marL="3429000" indent="-228600" algn="ctr" defTabSz="449263" eaLnBrk="0" fontAlgn="base" hangingPunct="0">
+              <a:lnSpc>
+                <a:spcPct val="93000"/>
+              </a:lnSpc>
+              <a:spcBef>
+                <a:spcPct val="0"/>
+              </a:spcBef>
+              <a:spcAft>
+                <a:spcPct val="0"/>
+              </a:spcAft>
+              <a:buClr>
+                <a:srgbClr val="000000"/>
+              </a:buClr>
+              <a:buSzPct val="100000"/>
+              <a:buFont typeface="Arial" pitchFamily="34" charset="0"/>
+              <a:defRPr>
+                <a:solidFill>
+                  <a:schemeClr val="bg1"/>
+                </a:solidFill>
+                <a:latin typeface="Arial" pitchFamily="34" charset="0"/>
+              </a:defRPr>
+            </a:lvl8pPr>
+            <a:lvl9pPr marL="3886200" indent="-228600" algn="ctr" defTabSz="449263" eaLnBrk="0" fontAlgn="base" hangingPunct="0">
+              <a:lnSpc>
+                <a:spcPct val="93000"/>
+              </a:lnSpc>
+              <a:spcBef>
+                <a:spcPct val="0"/>
+              </a:spcBef>
+              <a:spcAft>
+                <a:spcPct val="0"/>
+              </a:spcAft>
+              <a:buClr>
+                <a:srgbClr val="000000"/>
+              </a:buClr>
+              <a:buSzPct val="100000"/>
+              <a:buFont typeface="Arial" pitchFamily="34" charset="0"/>
+              <a:defRPr>
+                <a:solidFill>
+                  <a:schemeClr val="bg1"/>
+                </a:solidFill>
+                <a:latin typeface="Arial" pitchFamily="34" charset="0"/>
+              </a:defRPr>
+            </a:lvl9pPr>
+          </a:lstStyle>
+          <a:p>
+            <a:pPr algn="l">
+              <a:lnSpc>
+                <a:spcPct val="100000"/>
+              </a:lnSpc>
+              <a:spcAft>
+                <a:spcPct val="10000"/>
+              </a:spcAft>
+              <a:buClr>
+                <a:schemeClr val="tx1"/>
+              </a:buClr>
+              <a:buFontTx/>
+              <a:buNone/>
+            </a:pPr>
+            <a:r>
+              <a:rPr lang="en-US" sz="1000" dirty="0">
+                <a:solidFill>
+                  <a:schemeClr val="tx1"/>
+                </a:solidFill>
+              </a:rPr>
+              <a:t>                    </a:t>
+            </a:r>
+            <a:endParaRPr lang="en-US" sz="1000" b="1" dirty="0">
+              <a:solidFill>
+                <a:schemeClr val="tx1"/>
+              </a:solidFill>
+            </a:endParaRPr>
+          </a:p>
+        </p:txBody>
+      </p:sp>
+      <p:pic>
+        <p:nvPicPr>
+          <p:cNvPr id="7" name="Picture 2" descr="C:\Users\blume\Dropbox\Uni\_PSES\AUDO\Dokumente\Bericht\images\Gruppentreffen.jpg"/>
+          <p:cNvPicPr>
+            <a:picLocks noChangeAspect="1" noChangeArrowheads="1"/>
+          </p:cNvPicPr>
+          <p:nvPr/>
+        </p:nvPicPr>
+        <p:blipFill>
+          <a:blip r:embed="rId3" cstate="print">
+            <a:extLst>
+              <a:ext uri="{28A0092B-C50C-407E-A947-70E740481C1C}">
+                <a14:useLocalDpi xmlns:a14="http://schemas.microsoft.com/office/drawing/2010/main" val="0"/>
+              </a:ext>
+            </a:extLst>
+          </a:blip>
+          <a:srcRect/>
+          <a:stretch>
+            <a:fillRect/>
+          </a:stretch>
+        </p:blipFill>
+        <p:spPr bwMode="auto">
+          <a:xfrm>
+            <a:off x="354964" y="1484783"/>
+            <a:ext cx="8393499" cy="4721343"/>
+          </a:xfrm>
+          <a:prstGeom prst="rect">
+            <a:avLst/>
+          </a:prstGeom>
+          <a:noFill/>
+          <a:extLst>
+            <a:ext uri="{909E8E84-426E-40DD-AFC4-6F175D3DCCD1}">
+              <a14:hiddenFill xmlns:a14="http://schemas.microsoft.com/office/drawing/2010/main">
+                <a:solidFill>
+                  <a:srgbClr val="FFFFFF"/>
+                </a:solidFill>
+              </a14:hiddenFill>
+            </a:ext>
+          </a:extLst>
+        </p:spPr>
+      </p:pic>
+      <p:sp>
+        <p:nvSpPr>
+          <p:cNvPr id="2" name="Inhaltsplatzhalter 1"/>
           <p:cNvSpPr>
             <a:spLocks noGrp="1"/>
           </p:cNvSpPr>
@@ -16556,33 +17615,21 @@
           <a:bodyPr/>
           <a:lstStyle/>
           <a:p>
-            <a:pPr marL="0" indent="0" algn="ctr">
-              <a:buNone/>
-            </a:pPr>
-            <a:endParaRPr lang="de-CH" sz="4800" dirty="0" smtClean="0"/>
-          </a:p>
-          <a:p>
-            <a:pPr marL="0" indent="0" algn="ctr">
-              <a:buNone/>
-            </a:pPr>
-            <a:r>
-              <a:rPr lang="de-CH" sz="4800" dirty="0" smtClean="0"/>
-              <a:t>Vielen Dank für Ihre Aufmerksamkeit</a:t>
-            </a:r>
-            <a:endParaRPr lang="de-DE" sz="4800" dirty="0"/>
+            <a:endParaRPr lang="de-DE"/>
           </a:p>
         </p:txBody>
       </p:sp>
     </p:spTree>
     <p:extLst>
       <p:ext uri="{BB962C8B-B14F-4D97-AF65-F5344CB8AC3E}">
-        <p14:creationId xmlns:p14="http://schemas.microsoft.com/office/powerpoint/2010/main" xmlns="" val="412314351"/>
+        <p14:creationId xmlns:p14="http://schemas.microsoft.com/office/powerpoint/2010/main" val="785031693"/>
       </p:ext>
     </p:extLst>
   </p:cSld>
   <p:clrMapOvr>
     <a:masterClrMapping/>
   </p:clrMapOvr>
+  <p:transition/>
   <p:timing>
     <p:tnLst>
       <p:par>
@@ -16615,7 +17662,7 @@
           <p:cNvPr id="2" name="Titel 1">
             <a:extLst>
               <a:ext uri="{FF2B5EF4-FFF2-40B4-BE49-F238E27FC236}">
-                <a16:creationId xmlns:a16="http://schemas.microsoft.com/office/drawing/2014/main" xmlns="" id="{24452668-05B8-45C3-9C30-2FC567BF5B34}"/>
+                <a16:creationId xmlns="" xmlns:a16="http://schemas.microsoft.com/office/drawing/2014/main" id="{24452668-05B8-45C3-9C30-2FC567BF5B34}"/>
               </a:ext>
             </a:extLst>
           </p:cNvPr>
@@ -16644,7 +17691,7 @@
           <p:cNvPr id="3" name="Inhaltsplatzhalter 2">
             <a:extLst>
               <a:ext uri="{FF2B5EF4-FFF2-40B4-BE49-F238E27FC236}">
-                <a16:creationId xmlns:a16="http://schemas.microsoft.com/office/drawing/2014/main" xmlns="" id="{6F95FF9C-402A-4AAD-8E88-8EE33D2499FD}"/>
+                <a16:creationId xmlns="" xmlns:a16="http://schemas.microsoft.com/office/drawing/2014/main" id="{6F95FF9C-402A-4AAD-8E88-8EE33D2499FD}"/>
               </a:ext>
             </a:extLst>
           </p:cNvPr>
@@ -16788,7 +17835,7 @@
     </p:spTree>
     <p:extLst>
       <p:ext uri="{BB962C8B-B14F-4D97-AF65-F5344CB8AC3E}">
-        <p14:creationId xmlns:p14="http://schemas.microsoft.com/office/powerpoint/2010/main" xmlns="" val="2622745934"/>
+        <p14:creationId xmlns:p14="http://schemas.microsoft.com/office/powerpoint/2010/main" val="2622745934"/>
       </p:ext>
     </p:extLst>
   </p:cSld>
@@ -16901,7 +17948,7 @@
           <a:blip r:embed="rId2" cstate="print">
             <a:extLst>
               <a:ext uri="{28A0092B-C50C-407E-A947-70E740481C1C}">
-                <a14:useLocalDpi xmlns:a14="http://schemas.microsoft.com/office/drawing/2010/main" xmlns="" val="0"/>
+                <a14:useLocalDpi xmlns:a14="http://schemas.microsoft.com/office/drawing/2010/main" val="0"/>
               </a:ext>
             </a:extLst>
           </a:blip>
@@ -16921,7 +17968,7 @@
           <a:noFill/>
           <a:extLst>
             <a:ext uri="{909E8E84-426E-40DD-AFC4-6F175D3DCCD1}">
-              <a14:hiddenFill xmlns:a14="http://schemas.microsoft.com/office/drawing/2010/main" xmlns="">
+              <a14:hiddenFill xmlns:a14="http://schemas.microsoft.com/office/drawing/2010/main">
                 <a:solidFill>
                   <a:srgbClr val="FFFFFF"/>
                 </a:solidFill>
@@ -16933,7 +17980,7 @@
     </p:spTree>
     <p:extLst>
       <p:ext uri="{BB962C8B-B14F-4D97-AF65-F5344CB8AC3E}">
-        <p14:creationId xmlns:p14="http://schemas.microsoft.com/office/powerpoint/2010/main" xmlns="" val="983291378"/>
+        <p14:creationId xmlns:p14="http://schemas.microsoft.com/office/powerpoint/2010/main" val="983291378"/>
       </p:ext>
     </p:extLst>
   </p:cSld>
@@ -17050,7 +18097,7 @@
           <a:blip r:embed="rId2" cstate="print">
             <a:extLst>
               <a:ext uri="{28A0092B-C50C-407E-A947-70E740481C1C}">
-                <a14:useLocalDpi xmlns:a14="http://schemas.microsoft.com/office/drawing/2010/main" xmlns="" val="0"/>
+                <a14:useLocalDpi xmlns:a14="http://schemas.microsoft.com/office/drawing/2010/main" val="0"/>
               </a:ext>
             </a:extLst>
           </a:blip>
@@ -17070,7 +18117,7 @@
           <a:noFill/>
           <a:extLst>
             <a:ext uri="{909E8E84-426E-40DD-AFC4-6F175D3DCCD1}">
-              <a14:hiddenFill xmlns:a14="http://schemas.microsoft.com/office/drawing/2010/main" xmlns="">
+              <a14:hiddenFill xmlns:a14="http://schemas.microsoft.com/office/drawing/2010/main">
                 <a:solidFill>
                   <a:srgbClr val="FFFFFF"/>
                 </a:solidFill>
@@ -17082,7 +18129,7 @@
     </p:spTree>
     <p:extLst>
       <p:ext uri="{BB962C8B-B14F-4D97-AF65-F5344CB8AC3E}">
-        <p14:creationId xmlns:p14="http://schemas.microsoft.com/office/powerpoint/2010/main" xmlns="" val="617314025"/>
+        <p14:creationId xmlns:p14="http://schemas.microsoft.com/office/powerpoint/2010/main" val="617314025"/>
       </p:ext>
     </p:extLst>
   </p:cSld>
@@ -17454,75 +18501,166 @@
             </a:r>
             <a:endParaRPr lang="de-DE" altLang="zh-CN" dirty="0"/>
           </a:p>
-          <a:p>
-            <a:endParaRPr lang="de-DE" altLang="zh-CN" dirty="0" smtClean="0"/>
-          </a:p>
-          <a:p>
-            <a:r>
-              <a:rPr lang="de-DE" altLang="zh-CN" dirty="0" smtClean="0"/>
-              <a:t>Gemeinsame Konzepte und Komponenten:</a:t>
-            </a:r>
-          </a:p>
-          <a:p>
-            <a:pPr lvl="1"/>
-            <a:r>
-              <a:rPr lang="de-DE" altLang="zh-CN" dirty="0" smtClean="0"/>
-              <a:t>Bildverarbeitung</a:t>
-            </a:r>
-          </a:p>
-          <a:p>
-            <a:pPr lvl="1"/>
-            <a:r>
-              <a:rPr lang="de-DE" altLang="zh-CN" dirty="0" smtClean="0"/>
-              <a:t>Kollisionsvermeidung</a:t>
-            </a:r>
-          </a:p>
-          <a:p>
-            <a:pPr lvl="1"/>
-            <a:r>
-              <a:rPr lang="de-DE" altLang="zh-CN" dirty="0" smtClean="0"/>
-              <a:t>Aufteilung der Strecke in verschiedene Abschnitte (Kurven, Geraden)</a:t>
-            </a:r>
-          </a:p>
-          <a:p>
-            <a:pPr lvl="1"/>
-            <a:r>
-              <a:rPr lang="de-DE" altLang="zh-CN" dirty="0" smtClean="0"/>
-              <a:t>Strukturvariabler PD-Regler mit situationsabhängiger Umschaltung</a:t>
-            </a:r>
-          </a:p>
-          <a:p>
-            <a:endParaRPr lang="de-DE" altLang="zh-CN" dirty="0" smtClean="0"/>
-          </a:p>
-          <a:p>
-            <a:r>
-              <a:rPr lang="de-DE" altLang="zh-CN" dirty="0" smtClean="0"/>
-              <a:t>Unterschiede:</a:t>
-            </a:r>
-          </a:p>
-          <a:p>
-            <a:pPr lvl="1"/>
-            <a:r>
-              <a:rPr lang="de-DE" altLang="zh-CN" dirty="0" smtClean="0"/>
-              <a:t>Parametrierung des PD-Reglers</a:t>
-            </a:r>
-          </a:p>
-          <a:p>
-            <a:pPr lvl="1"/>
-            <a:r>
-              <a:rPr lang="de-DE" altLang="zh-CN" dirty="0" smtClean="0"/>
-              <a:t>Hinderniserkennung</a:t>
-            </a:r>
-          </a:p>
-          <a:p>
-            <a:pPr lvl="1"/>
-            <a:r>
-              <a:rPr lang="de-DE" altLang="zh-CN" dirty="0" smtClean="0"/>
-              <a:t>Spurwechsel</a:t>
-            </a:r>
-          </a:p>
         </p:txBody>
       </p:sp>
+      <p:graphicFrame>
+        <p:nvGraphicFramePr>
+          <p:cNvPr id="2" name="Tabelle 1"/>
+          <p:cNvGraphicFramePr>
+            <a:graphicFrameLocks noGrp="1"/>
+          </p:cNvGraphicFramePr>
+          <p:nvPr>
+            <p:extLst>
+              <p:ext uri="{D42A27DB-BD31-4B8C-83A1-F6EECF244321}">
+                <p14:modId xmlns:p14="http://schemas.microsoft.com/office/powerpoint/2010/main" val="1294336154"/>
+              </p:ext>
+            </p:extLst>
+          </p:nvPr>
+        </p:nvGraphicFramePr>
+        <p:xfrm>
+          <a:off x="395536" y="2924944"/>
+          <a:ext cx="7992888" cy="2656840"/>
+        </p:xfrm>
+        <a:graphic>
+          <a:graphicData uri="http://schemas.openxmlformats.org/drawingml/2006/table">
+            <a:tbl>
+              <a:tblPr firstRow="1" bandRow="1">
+                <a:tableStyleId>{E8B1032C-EA38-4F05-BA0D-38AFFFC7BED3}</a:tableStyleId>
+              </a:tblPr>
+              <a:tblGrid>
+                <a:gridCol w="3996444"/>
+                <a:gridCol w="3996444"/>
+              </a:tblGrid>
+              <a:tr h="370840">
+                <a:tc>
+                  <a:txBody>
+                    <a:bodyPr/>
+                    <a:lstStyle/>
+                    <a:p>
+                      <a:r>
+                        <a:rPr lang="de-DE" dirty="0" smtClean="0"/>
+                        <a:t>Gemeinsame</a:t>
+                      </a:r>
+                      <a:r>
+                        <a:rPr lang="de-DE" baseline="0" dirty="0" smtClean="0"/>
+                        <a:t> Komponenten</a:t>
+                      </a:r>
+                      <a:endParaRPr lang="de-DE" dirty="0"/>
+                    </a:p>
+                  </a:txBody>
+                  <a:tcPr/>
+                </a:tc>
+                <a:tc>
+                  <a:txBody>
+                    <a:bodyPr/>
+                    <a:lstStyle/>
+                    <a:p>
+                      <a:r>
+                        <a:rPr lang="de-DE" dirty="0" smtClean="0"/>
+                        <a:t>Unterschiede</a:t>
+                      </a:r>
+                      <a:endParaRPr lang="de-DE" dirty="0"/>
+                    </a:p>
+                  </a:txBody>
+                  <a:tcPr/>
+                </a:tc>
+              </a:tr>
+              <a:tr h="370840">
+                <a:tc>
+                  <a:txBody>
+                    <a:bodyPr/>
+                    <a:lstStyle/>
+                    <a:p>
+                      <a:pPr marL="285750" lvl="0" indent="-285750">
+                        <a:buFont typeface="Arial" pitchFamily="34" charset="0"/>
+                        <a:buChar char="•"/>
+                      </a:pPr>
+                      <a:r>
+                        <a:rPr lang="de-DE" altLang="zh-CN" dirty="0" smtClean="0"/>
+                        <a:t>Bildverarbeitung</a:t>
+                      </a:r>
+                    </a:p>
+                    <a:p>
+                      <a:pPr marL="285750" lvl="0" indent="-285750">
+                        <a:buFont typeface="Arial" pitchFamily="34" charset="0"/>
+                        <a:buChar char="•"/>
+                      </a:pPr>
+                      <a:r>
+                        <a:rPr lang="de-DE" altLang="zh-CN" dirty="0" smtClean="0"/>
+                        <a:t>Kollisionsvermeidung</a:t>
+                      </a:r>
+                    </a:p>
+                    <a:p>
+                      <a:pPr marL="285750" lvl="0" indent="-285750">
+                        <a:buFont typeface="Arial" pitchFamily="34" charset="0"/>
+                        <a:buChar char="•"/>
+                      </a:pPr>
+                      <a:r>
+                        <a:rPr lang="de-DE" altLang="zh-CN" dirty="0" smtClean="0"/>
+                        <a:t>Aufteilung der Strecke in verschiedene Abschnitte (Kurven, Geraden)</a:t>
+                      </a:r>
+                    </a:p>
+                    <a:p>
+                      <a:pPr marL="285750" lvl="0" indent="-285750">
+                        <a:buFont typeface="Arial" pitchFamily="34" charset="0"/>
+                        <a:buChar char="•"/>
+                      </a:pPr>
+                      <a:r>
+                        <a:rPr lang="de-DE" altLang="zh-CN" dirty="0" smtClean="0"/>
+                        <a:t>Strukturvariabler PD-Regler mit situationsabhängiger Umschaltung</a:t>
+                      </a:r>
+                    </a:p>
+                    <a:p>
+                      <a:endParaRPr lang="de-DE" dirty="0"/>
+                    </a:p>
+                  </a:txBody>
+                  <a:tcPr/>
+                </a:tc>
+                <a:tc>
+                  <a:txBody>
+                    <a:bodyPr/>
+                    <a:lstStyle/>
+                    <a:p>
+                      <a:pPr marL="285750" lvl="0" indent="-285750">
+                        <a:buFont typeface="Arial" pitchFamily="34" charset="0"/>
+                        <a:buChar char="•"/>
+                      </a:pPr>
+                      <a:r>
+                        <a:rPr lang="de-DE" altLang="zh-CN" dirty="0" smtClean="0"/>
+                        <a:t>Parametrierung des PD-Reglers</a:t>
+                      </a:r>
+                    </a:p>
+                    <a:p>
+                      <a:pPr marL="285750" lvl="0" indent="-285750">
+                        <a:buFont typeface="Arial" pitchFamily="34" charset="0"/>
+                        <a:buChar char="•"/>
+                      </a:pPr>
+                      <a:r>
+                        <a:rPr lang="de-DE" altLang="zh-CN" dirty="0" smtClean="0"/>
+                        <a:t>Hinderniserkennung</a:t>
+                      </a:r>
+                    </a:p>
+                    <a:p>
+                      <a:pPr marL="285750" lvl="0" indent="-285750">
+                        <a:buFont typeface="Arial" pitchFamily="34" charset="0"/>
+                        <a:buChar char="•"/>
+                      </a:pPr>
+                      <a:r>
+                        <a:rPr lang="de-DE" altLang="zh-CN" dirty="0" smtClean="0"/>
+                        <a:t>Spurwechsel</a:t>
+                      </a:r>
+                    </a:p>
+                    <a:p>
+                      <a:endParaRPr lang="de-DE" dirty="0"/>
+                    </a:p>
+                  </a:txBody>
+                  <a:tcPr/>
+                </a:tc>
+              </a:tr>
+            </a:tbl>
+          </a:graphicData>
+        </a:graphic>
+      </p:graphicFrame>
     </p:spTree>
   </p:cSld>
   <p:clrMapOvr>
@@ -17619,24 +18757,16 @@
           <a:p>
             <a:r>
               <a:rPr lang="de-DE" altLang="zh-CN" dirty="0" smtClean="0"/>
-              <a:t>Strukturvariabler </a:t>
-            </a:r>
+              <a:t>Strukturvariabler PD-Regler</a:t>
+            </a:r>
+          </a:p>
+          <a:p>
+            <a:endParaRPr lang="de-DE" altLang="zh-CN" dirty="0" smtClean="0"/>
+          </a:p>
+          <a:p>
             <a:r>
               <a:rPr lang="de-DE" altLang="zh-CN" dirty="0" smtClean="0"/>
-              <a:t>PD-Regler</a:t>
-            </a:r>
-          </a:p>
-          <a:p>
-            <a:endParaRPr lang="de-DE" altLang="zh-CN" dirty="0" smtClean="0"/>
-          </a:p>
-          <a:p>
-            <a:r>
-              <a:rPr lang="de-DE" altLang="zh-CN" dirty="0" smtClean="0"/>
-              <a:t>Vorteil</a:t>
-            </a:r>
-            <a:r>
-              <a:rPr lang="de-DE" altLang="zh-CN" dirty="0" smtClean="0"/>
-              <a:t>: der Regler kann für jede Situation unabhängig optimiert werden</a:t>
+              <a:t>Vorteil: der Regler kann für jede Situation unabhängig optimiert werden</a:t>
             </a:r>
           </a:p>
           <a:p>
@@ -18010,6 +19140,12 @@
 </file>
 
 <file path=ppt/tags/tag1.xml><?xml version="1.0" encoding="utf-8"?>
+<p:tagLst xmlns:a="http://schemas.openxmlformats.org/drawingml/2006/main" xmlns:r="http://schemas.openxmlformats.org/officeDocument/2006/relationships" xmlns:p="http://schemas.openxmlformats.org/presentationml/2006/main">
+  <p:tag name="IGNORE" val="True"/>
+</p:tagLst>
+</file>
+
+<file path=ppt/tags/tag2.xml><?xml version="1.0" encoding="utf-8"?>
 <p:tagLst xmlns:a="http://schemas.openxmlformats.org/drawingml/2006/main" xmlns:r="http://schemas.openxmlformats.org/officeDocument/2006/relationships" xmlns:p="http://schemas.openxmlformats.org/presentationml/2006/main">
   <p:tag name="IGNORE" val="True"/>
 </p:tagLst>

</xml_diff>